<commit_message>
clean asyncio directory. Add itertools example.
</commit_message>
<xml_diff>
--- a/T4. Asynchronous programming/Asyncio/Demo.pptx
+++ b/T4. Asynchronous programming/Asyncio/Demo.pptx
@@ -5,24 +5,23 @@
     <p:sldMasterId id="2147483648" r:id="rId1"/>
   </p:sldMasterIdLst>
   <p:notesMasterIdLst>
-    <p:notesMasterId r:id="rId17"/>
+    <p:notesMasterId r:id="rId16"/>
   </p:notesMasterIdLst>
   <p:sldIdLst>
     <p:sldId id="258" r:id="rId2"/>
-    <p:sldId id="259" r:id="rId3"/>
-    <p:sldId id="260" r:id="rId4"/>
-    <p:sldId id="261" r:id="rId5"/>
-    <p:sldId id="262" r:id="rId6"/>
-    <p:sldId id="263" r:id="rId7"/>
-    <p:sldId id="264" r:id="rId8"/>
-    <p:sldId id="265" r:id="rId9"/>
-    <p:sldId id="266" r:id="rId10"/>
-    <p:sldId id="267" r:id="rId11"/>
-    <p:sldId id="268" r:id="rId12"/>
-    <p:sldId id="269" r:id="rId13"/>
-    <p:sldId id="270" r:id="rId14"/>
-    <p:sldId id="271" r:id="rId15"/>
-    <p:sldId id="272" r:id="rId16"/>
+    <p:sldId id="260" r:id="rId3"/>
+    <p:sldId id="261" r:id="rId4"/>
+    <p:sldId id="262" r:id="rId5"/>
+    <p:sldId id="263" r:id="rId6"/>
+    <p:sldId id="264" r:id="rId7"/>
+    <p:sldId id="265" r:id="rId8"/>
+    <p:sldId id="266" r:id="rId9"/>
+    <p:sldId id="267" r:id="rId10"/>
+    <p:sldId id="268" r:id="rId11"/>
+    <p:sldId id="269" r:id="rId12"/>
+    <p:sldId id="270" r:id="rId13"/>
+    <p:sldId id="271" r:id="rId14"/>
+    <p:sldId id="272" r:id="rId15"/>
   </p:sldIdLst>
   <p:sldSz cx="12192000" cy="6858000"/>
   <p:notesSz cx="6858000" cy="9144000"/>
@@ -211,7 +210,7 @@
           <a:p>
             <a:fld id="{C6576F63-835E-46F5-AEB3-90A06FD74112}" type="datetimeFigureOut">
               <a:rPr lang="en-US" smtClean="0"/>
-              <a:t>8/28/2018</a:t>
+              <a:t>09/24/19</a:t>
             </a:fld>
             <a:endParaRPr lang="en-US"/>
           </a:p>
@@ -523,7 +522,7 @@
           <a:lstStyle/>
           <a:p>
             <a:r>
-              <a:rPr lang="en-US" sz="1200" b="0" i="0" kern="1200" dirty="0" smtClean="0">
+              <a:rPr lang="en-US" sz="1200" b="0" i="0" kern="1200" dirty="0">
                 <a:solidFill>
                   <a:schemeClr val="tx1"/>
                 </a:solidFill>
@@ -535,7 +534,7 @@
               <a:t>In Python 3.7 </a:t>
             </a:r>
             <a:r>
-              <a:rPr lang="en-US" sz="1200" b="0" i="1" kern="1200" dirty="0" err="1" smtClean="0">
+              <a:rPr lang="en-US" sz="1200" b="0" i="1" kern="1200" dirty="0" err="1">
                 <a:solidFill>
                   <a:schemeClr val="tx1"/>
                 </a:solidFill>
@@ -547,7 +546,7 @@
               <a:t>asyncio</a:t>
             </a:r>
             <a:r>
-              <a:rPr lang="en-US" sz="1200" b="0" i="0" kern="1200" dirty="0" smtClean="0">
+              <a:rPr lang="en-US" sz="1200" b="0" i="0" kern="1200" dirty="0">
                 <a:solidFill>
                   <a:schemeClr val="tx1"/>
                 </a:solidFill>
@@ -579,7 +578,7 @@
           <a:p>
             <a:fld id="{F620B9DD-4E80-470F-B438-047D7BDD8590}" type="slidenum">
               <a:rPr lang="en-US" smtClean="0"/>
-              <a:t>3</a:t>
+              <a:t>2</a:t>
             </a:fld>
             <a:endParaRPr lang="en-US"/>
           </a:p>
@@ -643,7 +642,7 @@
           <a:lstStyle/>
           <a:p>
             <a:r>
-              <a:rPr lang="en-US" sz="1200" b="0" i="0" kern="1200" dirty="0" smtClean="0">
+              <a:rPr lang="en-US" sz="1200" b="0" i="0" kern="1200" dirty="0">
                 <a:solidFill>
                   <a:schemeClr val="tx1"/>
                 </a:solidFill>
@@ -655,7 +654,7 @@
               <a:t>Your output will, of course, vary since each task will sleep for a random amount of time, but notice how the resulting order is completely different, even though we built the array of tasks in the same order using </a:t>
             </a:r>
             <a:r>
-              <a:rPr lang="en-US" sz="1200" b="1" i="1" kern="1200" dirty="0" smtClean="0">
+              <a:rPr lang="en-US" sz="1200" b="1" i="1" kern="1200" dirty="0">
                 <a:solidFill>
                   <a:schemeClr val="tx1"/>
                 </a:solidFill>
@@ -667,7 +666,7 @@
               <a:t>range</a:t>
             </a:r>
             <a:r>
-              <a:rPr lang="en-US" sz="1200" b="0" i="0" kern="1200" dirty="0" smtClean="0">
+              <a:rPr lang="en-US" sz="1200" b="0" i="0" kern="1200" dirty="0">
                 <a:solidFill>
                   <a:schemeClr val="tx1"/>
                 </a:solidFill>
@@ -699,7 +698,7 @@
           <a:p>
             <a:fld id="{F620B9DD-4E80-470F-B438-047D7BDD8590}" type="slidenum">
               <a:rPr lang="en-US" smtClean="0"/>
-              <a:t>12</a:t>
+              <a:t>11</a:t>
             </a:fld>
             <a:endParaRPr lang="en-US"/>
           </a:p>
@@ -783,7 +782,7 @@
           <a:p>
             <a:fld id="{F620B9DD-4E80-470F-B438-047D7BDD8590}" type="slidenum">
               <a:rPr lang="en-US" smtClean="0"/>
-              <a:t>13</a:t>
+              <a:t>12</a:t>
             </a:fld>
             <a:endParaRPr lang="en-US"/>
           </a:p>
@@ -847,21 +846,21 @@
           <a:lstStyle/>
           <a:p>
             <a:r>
-              <a:rPr lang="en-US" sz="1200" dirty="0" smtClean="0"/>
+              <a:rPr lang="en-US" sz="1200" dirty="0"/>
               <a:t>Just pretend is an external </a:t>
             </a:r>
             <a:r>
-              <a:rPr lang="en-US" sz="1200" dirty="0" err="1" smtClean="0"/>
+              <a:rPr lang="en-US" sz="1200" dirty="0" err="1"/>
               <a:t>coroutine</a:t>
             </a:r>
             <a:r>
-              <a:rPr lang="en-US" sz="1200" dirty="0" smtClean="0"/>
+              <a:rPr lang="en-US" sz="1200" dirty="0"/>
               <a:t> and focus on how it’s used below.</a:t>
             </a:r>
           </a:p>
           <a:p>
             <a:r>
-              <a:rPr lang="en-US" sz="1200" b="0" i="0" kern="1200" dirty="0" smtClean="0">
+              <a:rPr lang="en-US" sz="1200" b="0" i="0" kern="1200" dirty="0">
                 <a:solidFill>
                   <a:schemeClr val="tx1"/>
                 </a:solidFill>
@@ -873,7 +872,7 @@
               <a:t>note the difference in timing, by using asynchronous calls we’re making </a:t>
             </a:r>
             <a:r>
-              <a:rPr lang="en-US" sz="1200" b="0" i="1" kern="1200" dirty="0" smtClean="0">
+              <a:rPr lang="en-US" sz="1200" b="0" i="1" kern="1200" dirty="0">
                 <a:solidFill>
                   <a:schemeClr val="tx1"/>
                 </a:solidFill>
@@ -885,7 +884,7 @@
               <a:t>at the same time</a:t>
             </a:r>
             <a:r>
-              <a:rPr lang="en-US" sz="1200" b="0" i="0" kern="1200" dirty="0" smtClean="0">
+              <a:rPr lang="en-US" sz="1200" b="0" i="0" kern="1200" dirty="0">
                 <a:solidFill>
                   <a:schemeClr val="tx1"/>
                 </a:solidFill>
@@ -899,7 +898,7 @@
           </a:p>
           <a:p>
             <a:r>
-              <a:rPr lang="en-US" sz="1200" b="0" i="0" kern="1200" dirty="0" smtClean="0">
+              <a:rPr lang="en-US" sz="1200" b="0" i="0" kern="1200" dirty="0">
                 <a:solidFill>
                   <a:schemeClr val="tx1"/>
                 </a:solidFill>
@@ -911,7 +910,7 @@
               <a:t>Also,</a:t>
             </a:r>
             <a:r>
-              <a:rPr lang="en-US" sz="1200" b="0" i="0" kern="1200" baseline="0" dirty="0" smtClean="0">
+              <a:rPr lang="en-US" sz="1200" b="0" i="0" kern="1200" baseline="0" dirty="0">
                 <a:solidFill>
                   <a:schemeClr val="tx1"/>
                 </a:solidFill>
@@ -923,7 +922,7 @@
               <a:t> l</a:t>
             </a:r>
             <a:r>
-              <a:rPr lang="en-US" sz="1200" b="0" i="0" kern="1200" dirty="0" smtClean="0">
+              <a:rPr lang="en-US" sz="1200" b="0" i="0" kern="1200" dirty="0">
                 <a:solidFill>
                   <a:schemeClr val="tx1"/>
                 </a:solidFill>
@@ -955,7 +954,7 @@
           <a:p>
             <a:fld id="{F620B9DD-4E80-470F-B438-047D7BDD8590}" type="slidenum">
               <a:rPr lang="en-US" smtClean="0"/>
-              <a:t>14</a:t>
+              <a:t>13</a:t>
             </a:fld>
             <a:endParaRPr lang="en-US"/>
           </a:p>
@@ -1019,7 +1018,7 @@
           <a:lstStyle/>
           <a:p>
             <a:r>
-              <a:rPr lang="en-US" sz="1200" b="0" i="0" kern="1200" dirty="0" smtClean="0">
+              <a:rPr lang="en-US" sz="1200" b="0" i="0" kern="1200" dirty="0">
                 <a:solidFill>
                   <a:schemeClr val="tx1"/>
                 </a:solidFill>
@@ -1033,7 +1032,7 @@
           </a:p>
           <a:p>
             <a:r>
-              <a:rPr lang="en-US" sz="1200" b="0" i="0" kern="1200" dirty="0" smtClean="0">
+              <a:rPr lang="en-US" sz="1200" b="0" i="0" kern="1200" dirty="0">
                 <a:solidFill>
                   <a:schemeClr val="tx1"/>
                 </a:solidFill>
@@ -1045,7 +1044,7 @@
               <a:t>The code in this case is only slightly different, we’re gathering the </a:t>
             </a:r>
             <a:r>
-              <a:rPr lang="en-US" sz="1200" b="0" i="0" kern="1200" dirty="0" err="1" smtClean="0">
+              <a:rPr lang="en-US" sz="1200" b="0" i="0" kern="1200" dirty="0" err="1">
                 <a:solidFill>
                   <a:schemeClr val="tx1"/>
                 </a:solidFill>
@@ -1057,7 +1056,7 @@
               <a:t>coroutines</a:t>
             </a:r>
             <a:r>
-              <a:rPr lang="en-US" sz="1200" b="0" i="0" kern="1200" dirty="0" smtClean="0">
+              <a:rPr lang="en-US" sz="1200" b="0" i="0" kern="1200" dirty="0">
                 <a:solidFill>
                   <a:schemeClr val="tx1"/>
                 </a:solidFill>
@@ -1069,7 +1068,7 @@
               <a:t> into a list, each of them ready to be scheduled and executed. The </a:t>
             </a:r>
             <a:r>
-              <a:rPr lang="en-US" sz="1200" b="1" i="1" u="none" strike="noStrike" kern="1200" dirty="0" err="1" smtClean="0">
+              <a:rPr lang="en-US" sz="1200" b="1" i="1" u="none" strike="noStrike" kern="1200" dirty="0" err="1">
                 <a:solidFill>
                   <a:schemeClr val="tx1"/>
                 </a:solidFill>
@@ -1082,7 +1081,7 @@
               <a:t>as_completed</a:t>
             </a:r>
             <a:r>
-              <a:rPr lang="en-US" sz="1200" b="0" i="1" kern="1200" dirty="0" smtClean="0">
+              <a:rPr lang="en-US" sz="1200" b="0" i="1" kern="1200" dirty="0">
                 <a:solidFill>
                   <a:schemeClr val="tx1"/>
                 </a:solidFill>
@@ -1094,7 +1093,7 @@
               <a:t> </a:t>
             </a:r>
             <a:r>
-              <a:rPr lang="en-US" sz="1200" b="0" i="0" kern="1200" dirty="0" smtClean="0">
+              <a:rPr lang="en-US" sz="1200" b="0" i="0" kern="1200" dirty="0">
                 <a:solidFill>
                   <a:schemeClr val="tx1"/>
                 </a:solidFill>
@@ -1106,7 +1105,7 @@
               <a:t>function returns an iterator that will yield a completed future as they come in. Now don’t tell me that’s not cool. By the way, </a:t>
             </a:r>
             <a:r>
-              <a:rPr lang="en-US" sz="1200" b="1" i="1" kern="1200" dirty="0" err="1" smtClean="0">
+              <a:rPr lang="en-US" sz="1200" b="1" i="1" kern="1200" dirty="0" err="1">
                 <a:solidFill>
                   <a:schemeClr val="tx1"/>
                 </a:solidFill>
@@ -1118,7 +1117,7 @@
               <a:t>as_completed</a:t>
             </a:r>
             <a:r>
-              <a:rPr lang="en-US" sz="1200" b="0" i="0" kern="1200" dirty="0" err="1" smtClean="0">
+              <a:rPr lang="en-US" sz="1200" b="0" i="0" kern="1200" dirty="0" err="1">
                 <a:solidFill>
                   <a:schemeClr val="tx1"/>
                 </a:solidFill>
@@ -1130,7 +1129,7 @@
               <a:t>is</a:t>
             </a:r>
             <a:r>
-              <a:rPr lang="en-US" sz="1200" b="0" i="0" kern="1200" dirty="0" smtClean="0">
+              <a:rPr lang="en-US" sz="1200" b="0" i="0" kern="1200" dirty="0">
                 <a:solidFill>
                   <a:schemeClr val="tx1"/>
                 </a:solidFill>
@@ -1142,7 +1141,7 @@
               <a:t> originally from the </a:t>
             </a:r>
             <a:r>
-              <a:rPr lang="en-US" sz="1200" b="1" i="1" u="none" strike="noStrike" kern="1200" dirty="0" err="1" smtClean="0">
+              <a:rPr lang="en-US" sz="1200" b="1" i="1" u="none" strike="noStrike" kern="1200" dirty="0" err="1">
                 <a:solidFill>
                   <a:schemeClr val="tx1"/>
                 </a:solidFill>
@@ -1155,7 +1154,7 @@
               <a:t>concurrent.futures</a:t>
             </a:r>
             <a:r>
-              <a:rPr lang="en-US" sz="1200" b="1" i="1" kern="1200" smtClean="0">
+              <a:rPr lang="en-US" sz="1200" b="1" i="1" kern="1200">
                 <a:solidFill>
                   <a:schemeClr val="tx1"/>
                 </a:solidFill>
@@ -1167,7 +1166,7 @@
               <a:t> </a:t>
             </a:r>
             <a:r>
-              <a:rPr lang="en-US" sz="1200" b="0" i="0" kern="1200" smtClean="0">
+              <a:rPr lang="en-US" sz="1200" b="0" i="0" kern="1200">
                 <a:solidFill>
                   <a:schemeClr val="tx1"/>
                 </a:solidFill>
@@ -1201,7 +1200,7 @@
           <a:p>
             <a:fld id="{F620B9DD-4E80-470F-B438-047D7BDD8590}" type="slidenum">
               <a:rPr lang="en-US" smtClean="0"/>
-              <a:t>15</a:t>
+              <a:t>14</a:t>
             </a:fld>
             <a:endParaRPr lang="en-US"/>
           </a:p>
@@ -1285,7 +1284,7 @@
           <a:p>
             <a:fld id="{F620B9DD-4E80-470F-B438-047D7BDD8590}" type="slidenum">
               <a:rPr lang="en-US" smtClean="0"/>
-              <a:t>4</a:t>
+              <a:t>3</a:t>
             </a:fld>
             <a:endParaRPr lang="en-US"/>
           </a:p>
@@ -1349,7 +1348,7 @@
           <a:lstStyle/>
           <a:p>
             <a:r>
-              <a:rPr lang="en-US" sz="1200" b="0" i="0" kern="1200" dirty="0" smtClean="0">
+              <a:rPr lang="en-US" sz="1200" b="0" i="0" kern="1200" dirty="0">
                 <a:solidFill>
                   <a:schemeClr val="tx1"/>
                 </a:solidFill>
@@ -1361,7 +1360,7 @@
               <a:t>Breaking down tasks into concurrent subtasks only </a:t>
             </a:r>
             <a:r>
-              <a:rPr lang="en-US" sz="1200" b="0" i="1" kern="1200" dirty="0" smtClean="0">
+              <a:rPr lang="en-US" sz="1200" b="0" i="1" kern="1200" dirty="0">
                 <a:solidFill>
                   <a:schemeClr val="tx1"/>
                 </a:solidFill>
@@ -1373,7 +1372,7 @@
               <a:t>allows</a:t>
             </a:r>
             <a:r>
-              <a:rPr lang="en-US" sz="1200" b="0" i="0" kern="1200" dirty="0" smtClean="0">
+              <a:rPr lang="en-US" sz="1200" b="0" i="0" kern="1200" dirty="0">
                 <a:solidFill>
                   <a:schemeClr val="tx1"/>
                 </a:solidFill>
@@ -1405,7 +1404,7 @@
           <a:p>
             <a:fld id="{F620B9DD-4E80-470F-B438-047D7BDD8590}" type="slidenum">
               <a:rPr lang="en-US" smtClean="0"/>
-              <a:t>5</a:t>
+              <a:t>4</a:t>
             </a:fld>
             <a:endParaRPr lang="en-US"/>
           </a:p>
@@ -1469,7 +1468,7 @@
           <a:lstStyle/>
           <a:p>
             <a:r>
-              <a:rPr lang="en-US" sz="1200" b="0" i="0" kern="1200" dirty="0" smtClean="0">
+              <a:rPr lang="en-US" sz="1200" b="0" i="0" kern="1200" dirty="0">
                 <a:solidFill>
                   <a:schemeClr val="tx1"/>
                 </a:solidFill>
@@ -1481,7 +1480,7 @@
               <a:t>Breaking down tasks into concurrent subtasks only </a:t>
             </a:r>
             <a:r>
-              <a:rPr lang="en-US" sz="1200" b="0" i="1" kern="1200" dirty="0" smtClean="0">
+              <a:rPr lang="en-US" sz="1200" b="0" i="1" kern="1200" dirty="0">
                 <a:solidFill>
                   <a:schemeClr val="tx1"/>
                 </a:solidFill>
@@ -1493,7 +1492,7 @@
               <a:t>allows</a:t>
             </a:r>
             <a:r>
-              <a:rPr lang="en-US" sz="1200" b="0" i="0" kern="1200" dirty="0" smtClean="0">
+              <a:rPr lang="en-US" sz="1200" b="0" i="0" kern="1200" dirty="0">
                 <a:solidFill>
                   <a:schemeClr val="tx1"/>
                 </a:solidFill>
@@ -1525,7 +1524,7 @@
           <a:p>
             <a:fld id="{F620B9DD-4E80-470F-B438-047D7BDD8590}" type="slidenum">
               <a:rPr lang="en-US" smtClean="0"/>
-              <a:t>6</a:t>
+              <a:t>5</a:t>
             </a:fld>
             <a:endParaRPr lang="en-US"/>
           </a:p>
@@ -1609,7 +1608,7 @@
           <a:p>
             <a:fld id="{F620B9DD-4E80-470F-B438-047D7BDD8590}" type="slidenum">
               <a:rPr lang="en-US" smtClean="0"/>
-              <a:t>7</a:t>
+              <a:t>6</a:t>
             </a:fld>
             <a:endParaRPr lang="en-US"/>
           </a:p>
@@ -1673,7 +1672,7 @@
           <a:lstStyle/>
           <a:p>
             <a:r>
-              <a:rPr lang="en-US" sz="1200" b="0" i="0" kern="1200" dirty="0" smtClean="0">
+              <a:rPr lang="en-US" sz="1200" b="0" i="0" kern="1200" dirty="0">
                 <a:solidFill>
                   <a:schemeClr val="tx1"/>
                 </a:solidFill>
@@ -1685,7 +1684,7 @@
               <a:t>First we declare a couple of simple </a:t>
             </a:r>
             <a:r>
-              <a:rPr lang="en-US" sz="1200" b="0" i="0" kern="1200" dirty="0" err="1" smtClean="0">
+              <a:rPr lang="en-US" sz="1200" b="0" i="0" kern="1200" dirty="0" err="1">
                 <a:solidFill>
                   <a:schemeClr val="tx1"/>
                 </a:solidFill>
@@ -1697,7 +1696,7 @@
               <a:t>coroutines</a:t>
             </a:r>
             <a:r>
-              <a:rPr lang="en-US" sz="1200" b="0" i="0" kern="1200" dirty="0" smtClean="0">
+              <a:rPr lang="en-US" sz="1200" b="0" i="0" kern="1200" dirty="0">
                 <a:solidFill>
                   <a:schemeClr val="tx1"/>
                 </a:solidFill>
@@ -1709,7 +1708,7 @@
               <a:t> that pretend to do non-blocking work using the </a:t>
             </a:r>
             <a:r>
-              <a:rPr lang="en-US" sz="1200" b="1" i="1" kern="1200" dirty="0" smtClean="0">
+              <a:rPr lang="en-US" sz="1200" b="1" i="1" kern="1200" dirty="0">
                 <a:solidFill>
                   <a:schemeClr val="tx1"/>
                 </a:solidFill>
@@ -1721,7 +1720,7 @@
               <a:t>sleep</a:t>
             </a:r>
             <a:r>
-              <a:rPr lang="en-US" sz="1200" b="0" i="0" kern="1200" dirty="0" smtClean="0">
+              <a:rPr lang="en-US" sz="1200" b="0" i="0" kern="1200" dirty="0">
                 <a:solidFill>
                   <a:schemeClr val="tx1"/>
                 </a:solidFill>
@@ -1733,7 +1732,7 @@
               <a:t> function in </a:t>
             </a:r>
             <a:r>
-              <a:rPr lang="en-US" sz="1200" b="0" i="1" kern="1200" dirty="0" err="1" smtClean="0">
+              <a:rPr lang="en-US" sz="1200" b="0" i="1" kern="1200" dirty="0" err="1">
                 <a:solidFill>
                   <a:schemeClr val="tx1"/>
                 </a:solidFill>
@@ -1745,7 +1744,7 @@
               <a:t>asyncio</a:t>
             </a:r>
             <a:r>
-              <a:rPr lang="en-US" sz="1200" b="0" i="1" kern="1200" dirty="0" smtClean="0">
+              <a:rPr lang="en-US" sz="1200" b="0" i="1" kern="1200" dirty="0">
                 <a:solidFill>
                   <a:schemeClr val="tx1"/>
                 </a:solidFill>
@@ -1756,7 +1755,7 @@
               </a:rPr>
               <a:t>.</a:t>
             </a:r>
-            <a:endParaRPr lang="en-US" sz="1200" b="0" i="0" kern="1200" dirty="0" smtClean="0">
+            <a:endParaRPr lang="en-US" sz="1200" b="0" i="0" kern="1200" dirty="0">
               <a:solidFill>
                 <a:schemeClr val="tx1"/>
               </a:solidFill>
@@ -1768,7 +1767,7 @@
           </a:p>
           <a:p>
             <a:r>
-              <a:rPr lang="en-US" sz="1200" b="0" i="0" kern="1200" dirty="0" smtClean="0">
+              <a:rPr lang="en-US" sz="1200" b="0" i="0" kern="1200" dirty="0">
                 <a:solidFill>
                   <a:schemeClr val="tx1"/>
                 </a:solidFill>
@@ -1780,7 +1779,7 @@
               <a:t>Then we create an entry point </a:t>
             </a:r>
             <a:r>
-              <a:rPr lang="en-US" sz="1200" b="0" i="0" kern="1200" dirty="0" err="1" smtClean="0">
+              <a:rPr lang="en-US" sz="1200" b="0" i="0" kern="1200" dirty="0" err="1">
                 <a:solidFill>
                   <a:schemeClr val="tx1"/>
                 </a:solidFill>
@@ -1792,7 +1791,7 @@
               <a:t>coroutine</a:t>
             </a:r>
             <a:r>
-              <a:rPr lang="en-US" sz="1200" b="0" i="0" kern="1200" dirty="0" smtClean="0">
+              <a:rPr lang="en-US" sz="1200" b="0" i="0" kern="1200" dirty="0">
                 <a:solidFill>
                   <a:schemeClr val="tx1"/>
                 </a:solidFill>
@@ -1804,7 +1803,7 @@
               <a:t> from which we combine the previous </a:t>
             </a:r>
             <a:r>
-              <a:rPr lang="en-US" sz="1200" b="0" i="0" kern="1200" dirty="0" err="1" smtClean="0">
+              <a:rPr lang="en-US" sz="1200" b="0" i="0" kern="1200" dirty="0" err="1">
                 <a:solidFill>
                   <a:schemeClr val="tx1"/>
                 </a:solidFill>
@@ -1816,7 +1815,7 @@
               <a:t>coroutines</a:t>
             </a:r>
             <a:r>
-              <a:rPr lang="en-US" sz="1200" b="0" i="0" kern="1200" dirty="0" smtClean="0">
+              <a:rPr lang="en-US" sz="1200" b="0" i="0" kern="1200" dirty="0">
                 <a:solidFill>
                   <a:schemeClr val="tx1"/>
                 </a:solidFill>
@@ -1828,7 +1827,7 @@
               <a:t> using </a:t>
             </a:r>
             <a:r>
-              <a:rPr lang="en-US" sz="1200" b="1" i="1" u="none" strike="noStrike" kern="1200" dirty="0" smtClean="0">
+              <a:rPr lang="en-US" sz="1200" b="1" i="1" u="none" strike="noStrike" kern="1200" dirty="0">
                 <a:solidFill>
                   <a:schemeClr val="tx1"/>
                 </a:solidFill>
@@ -1841,7 +1840,7 @@
               <a:t>gather</a:t>
             </a:r>
             <a:r>
-              <a:rPr lang="en-US" sz="1200" b="1" i="1" kern="1200" dirty="0" smtClean="0">
+              <a:rPr lang="en-US" sz="1200" b="1" i="1" kern="1200" dirty="0">
                 <a:solidFill>
                   <a:schemeClr val="tx1"/>
                 </a:solidFill>
@@ -1853,7 +1852,7 @@
               <a:t> </a:t>
             </a:r>
             <a:r>
-              <a:rPr lang="en-US" sz="1200" b="0" i="0" kern="1200" dirty="0" smtClean="0">
+              <a:rPr lang="en-US" sz="1200" b="0" i="0" kern="1200" dirty="0">
                 <a:solidFill>
                   <a:schemeClr val="tx1"/>
                 </a:solidFill>
@@ -1865,7 +1864,7 @@
               <a:t>to wait for both of them to complete</a:t>
             </a:r>
             <a:r>
-              <a:rPr lang="en-US" sz="1200" b="0" i="1" kern="1200" dirty="0" smtClean="0">
+              <a:rPr lang="en-US" sz="1200" b="0" i="1" kern="1200" dirty="0">
                 <a:solidFill>
                   <a:schemeClr val="tx1"/>
                 </a:solidFill>
@@ -1877,7 +1876,7 @@
               <a:t>. </a:t>
             </a:r>
             <a:r>
-              <a:rPr lang="en-US" sz="1200" b="0" i="0" kern="1200" dirty="0" smtClean="0">
+              <a:rPr lang="en-US" sz="1200" b="0" i="0" kern="1200" dirty="0">
                 <a:solidFill>
                   <a:schemeClr val="tx1"/>
                 </a:solidFill>
@@ -1889,7 +1888,7 @@
               <a:t>There’s a bit more to </a:t>
             </a:r>
             <a:r>
-              <a:rPr lang="en-US" sz="1200" b="1" i="1" kern="1200" dirty="0" smtClean="0">
+              <a:rPr lang="en-US" sz="1200" b="1" i="1" kern="1200" dirty="0">
                 <a:solidFill>
                   <a:schemeClr val="tx1"/>
                 </a:solidFill>
@@ -1901,7 +1900,7 @@
               <a:t>gather</a:t>
             </a:r>
             <a:r>
-              <a:rPr lang="en-US" sz="1200" b="0" i="0" kern="1200" dirty="0" smtClean="0">
+              <a:rPr lang="en-US" sz="1200" b="0" i="0" kern="1200" dirty="0">
                 <a:solidFill>
                   <a:schemeClr val="tx1"/>
                 </a:solidFill>
@@ -1915,7 +1914,7 @@
           </a:p>
           <a:p>
             <a:r>
-              <a:rPr lang="en-US" sz="1200" b="0" i="0" kern="1200" dirty="0" smtClean="0">
+              <a:rPr lang="en-US" sz="1200" b="0" i="0" kern="1200" dirty="0">
                 <a:solidFill>
                   <a:schemeClr val="tx1"/>
                 </a:solidFill>
@@ -1927,7 +1926,7 @@
               <a:t>And finally we schedule our entry point </a:t>
             </a:r>
             <a:r>
-              <a:rPr lang="en-US" sz="1200" b="0" i="0" kern="1200" dirty="0" err="1" smtClean="0">
+              <a:rPr lang="en-US" sz="1200" b="0" i="0" kern="1200" dirty="0" err="1">
                 <a:solidFill>
                   <a:schemeClr val="tx1"/>
                 </a:solidFill>
@@ -1939,7 +1938,7 @@
               <a:t>coroutine</a:t>
             </a:r>
             <a:r>
-              <a:rPr lang="en-US" sz="1200" b="0" i="0" kern="1200" dirty="0" smtClean="0">
+              <a:rPr lang="en-US" sz="1200" b="0" i="0" kern="1200" dirty="0">
                 <a:solidFill>
                   <a:schemeClr val="tx1"/>
                 </a:solidFill>
@@ -1951,7 +1950,7 @@
               <a:t> using </a:t>
             </a:r>
             <a:r>
-              <a:rPr lang="en-US" sz="1200" b="1" i="1" u="none" strike="noStrike" kern="1200" dirty="0" err="1" smtClean="0">
+              <a:rPr lang="en-US" sz="1200" b="1" i="1" u="none" strike="noStrike" kern="1200" dirty="0" err="1">
                 <a:solidFill>
                   <a:schemeClr val="tx1"/>
                 </a:solidFill>
@@ -1964,7 +1963,7 @@
               <a:t>asyncio.run</a:t>
             </a:r>
             <a:r>
-              <a:rPr lang="en-US" sz="1200" b="0" i="0" kern="1200" dirty="0" smtClean="0">
+              <a:rPr lang="en-US" sz="1200" b="0" i="0" kern="1200" dirty="0">
                 <a:solidFill>
                   <a:schemeClr val="tx1"/>
                 </a:solidFill>
@@ -1976,7 +1975,7 @@
               <a:t>, which will take care of creating an event loop and scheduling our entry point </a:t>
             </a:r>
             <a:r>
-              <a:rPr lang="en-US" sz="1200" b="0" i="0" kern="1200" dirty="0" err="1" smtClean="0">
+              <a:rPr lang="en-US" sz="1200" b="0" i="0" kern="1200" dirty="0" err="1">
                 <a:solidFill>
                   <a:schemeClr val="tx1"/>
                 </a:solidFill>
@@ -1988,7 +1987,7 @@
               <a:t>coroutine</a:t>
             </a:r>
             <a:r>
-              <a:rPr lang="en-US" sz="1200" b="0" i="0" kern="1200" dirty="0" smtClean="0">
+              <a:rPr lang="en-US" sz="1200" b="0" i="0" kern="1200" dirty="0">
                 <a:solidFill>
                   <a:schemeClr val="tx1"/>
                 </a:solidFill>
@@ -2022,7 +2021,7 @@
           <a:p>
             <a:fld id="{F620B9DD-4E80-470F-B438-047D7BDD8590}" type="slidenum">
               <a:rPr lang="en-US" smtClean="0"/>
-              <a:t>8</a:t>
+              <a:t>7</a:t>
             </a:fld>
             <a:endParaRPr lang="en-US"/>
           </a:p>
@@ -2086,7 +2085,7 @@
           <a:lstStyle/>
           <a:p>
             <a:r>
-              <a:rPr lang="en-US" sz="1200" b="0" i="1" kern="1200" dirty="0" smtClean="0">
+              <a:rPr lang="en-US" sz="1200" b="0" i="1" kern="1200" dirty="0">
                 <a:solidFill>
                   <a:schemeClr val="tx1"/>
                 </a:solidFill>
@@ -2098,7 +2097,7 @@
               <a:t>Note that versions of Python prior to 3.7 </a:t>
             </a:r>
             <a:r>
-              <a:rPr lang="en-US" sz="1200" b="0" i="1" kern="1200" dirty="0" err="1" smtClean="0">
+              <a:rPr lang="en-US" sz="1200" b="0" i="1" kern="1200" dirty="0" err="1">
                 <a:solidFill>
                   <a:schemeClr val="tx1"/>
                 </a:solidFill>
@@ -2110,7 +2109,7 @@
               <a:t>coroutines</a:t>
             </a:r>
             <a:r>
-              <a:rPr lang="en-US" sz="1200" b="0" i="1" kern="1200" dirty="0" smtClean="0">
+              <a:rPr lang="en-US" sz="1200" b="0" i="1" kern="1200" dirty="0">
                 <a:solidFill>
                   <a:schemeClr val="tx1"/>
                 </a:solidFill>
@@ -2122,20 +2121,20 @@
               <a:t> had to be manually wrapped in Tasks to be scheduled using the current event loop’s </a:t>
             </a:r>
             <a:r>
-              <a:rPr lang="en-US" i="1" u="sng" dirty="0" err="1" smtClean="0">
+              <a:rPr lang="en-US" i="1" u="sng" dirty="0" err="1">
                 <a:effectLst/>
                 <a:hlinkClick r:id="rId3"/>
               </a:rPr>
               <a:t>create_task</a:t>
             </a:r>
             <a:r>
-              <a:rPr lang="en-US" i="1" u="sng" dirty="0" smtClean="0">
+              <a:rPr lang="en-US" i="1" u="sng" dirty="0">
                 <a:effectLst/>
               </a:rPr>
               <a:t> </a:t>
             </a:r>
             <a:r>
-              <a:rPr lang="en-US" sz="1200" b="0" i="1" kern="1200" dirty="0" smtClean="0">
+              <a:rPr lang="en-US" sz="1200" b="0" i="1" kern="1200" dirty="0">
                 <a:solidFill>
                   <a:schemeClr val="tx1"/>
                 </a:solidFill>
@@ -2167,7 +2166,7 @@
           <a:p>
             <a:fld id="{F620B9DD-4E80-470F-B438-047D7BDD8590}" type="slidenum">
               <a:rPr lang="en-US" smtClean="0"/>
-              <a:t>9</a:t>
+              <a:t>8</a:t>
             </a:fld>
             <a:endParaRPr lang="en-US"/>
           </a:p>
@@ -2231,7 +2230,7 @@
           <a:lstStyle/>
           <a:p>
             <a:r>
-              <a:rPr lang="en-US" sz="1200" b="0" i="1" kern="1200" dirty="0" smtClean="0">
+              <a:rPr lang="en-US" sz="1200" b="0" i="1" kern="1200" dirty="0">
                 <a:solidFill>
                   <a:schemeClr val="tx1"/>
                 </a:solidFill>
@@ -2243,7 +2242,7 @@
               <a:t>Note that versions of Python prior to 3.7 </a:t>
             </a:r>
             <a:r>
-              <a:rPr lang="en-US" sz="1200" b="0" i="1" kern="1200" dirty="0" err="1" smtClean="0">
+              <a:rPr lang="en-US" sz="1200" b="0" i="1" kern="1200" dirty="0" err="1">
                 <a:solidFill>
                   <a:schemeClr val="tx1"/>
                 </a:solidFill>
@@ -2255,7 +2254,7 @@
               <a:t>coroutines</a:t>
             </a:r>
             <a:r>
-              <a:rPr lang="en-US" sz="1200" b="0" i="1" kern="1200" dirty="0" smtClean="0">
+              <a:rPr lang="en-US" sz="1200" b="0" i="1" kern="1200" dirty="0">
                 <a:solidFill>
                   <a:schemeClr val="tx1"/>
                 </a:solidFill>
@@ -2267,20 +2266,20 @@
               <a:t> had to be manually wrapped in Tasks to be scheduled using the current event loop’s </a:t>
             </a:r>
             <a:r>
-              <a:rPr lang="en-US" i="1" u="sng" dirty="0" err="1" smtClean="0">
+              <a:rPr lang="en-US" i="1" u="sng" dirty="0" err="1">
                 <a:effectLst/>
                 <a:hlinkClick r:id="rId3"/>
               </a:rPr>
               <a:t>create_task</a:t>
             </a:r>
             <a:r>
-              <a:rPr lang="en-US" i="1" u="sng" dirty="0" smtClean="0">
+              <a:rPr lang="en-US" i="1" u="sng" dirty="0">
                 <a:effectLst/>
               </a:rPr>
               <a:t> </a:t>
             </a:r>
             <a:r>
-              <a:rPr lang="en-US" sz="1200" b="0" i="1" kern="1200" dirty="0" smtClean="0">
+              <a:rPr lang="en-US" sz="1200" b="0" i="1" kern="1200" dirty="0">
                 <a:solidFill>
                   <a:schemeClr val="tx1"/>
                 </a:solidFill>
@@ -2312,7 +2311,7 @@
           <a:p>
             <a:fld id="{F620B9DD-4E80-470F-B438-047D7BDD8590}" type="slidenum">
               <a:rPr lang="en-US" smtClean="0"/>
-              <a:t>10</a:t>
+              <a:t>9</a:t>
             </a:fld>
             <a:endParaRPr lang="en-US"/>
           </a:p>
@@ -2396,7 +2395,7 @@
           <a:p>
             <a:fld id="{F620B9DD-4E80-470F-B438-047D7BDD8590}" type="slidenum">
               <a:rPr lang="en-US" smtClean="0"/>
-              <a:t>11</a:t>
+              <a:t>10</a:t>
             </a:fld>
             <a:endParaRPr lang="en-US"/>
           </a:p>
@@ -4915,11 +4914,7 @@
           <a:p>
             <a:r>
               <a:rPr lang="en-US" dirty="0"/>
-              <a:t>Asynchronous </a:t>
-            </a:r>
-            <a:r>
-              <a:rPr lang="en-US" dirty="0" smtClean="0"/>
-              <a:t>programming. Asyncio</a:t>
+              <a:t>Asynchronous programming. Asyncio</a:t>
             </a:r>
             <a:endParaRPr lang="ru-RU" dirty="0"/>
           </a:p>
@@ -5006,7 +5001,7 @@
         <p:spPr>
           <a:xfrm>
             <a:off x="520053" y="1465594"/>
-            <a:ext cx="11236518" cy="3903504"/>
+            <a:ext cx="11236518" cy="5262979"/>
           </a:xfrm>
           <a:prstGeom prst="rect">
             <a:avLst/>
@@ -5018,49 +5013,44 @@
           </a:bodyPr>
           <a:lstStyle/>
           <a:p>
-            <a:pPr marL="457200" indent="-457200">
+            <a:pPr>
               <a:lnSpc>
                 <a:spcPct val="150000"/>
               </a:lnSpc>
-              <a:buFont typeface="Arial" panose="020B0604020202020204" pitchFamily="34" charset="0"/>
-              <a:buChar char="•"/>
             </a:pPr>
             <a:r>
               <a:rPr lang="en-US" sz="2800" dirty="0"/>
-              <a:t>By using await on another </a:t>
-            </a:r>
-            <a:r>
-              <a:rPr lang="en-US" sz="2800" dirty="0" err="1"/>
-              <a:t>coroutine</a:t>
-            </a:r>
+              <a:t>Let’s now simulate two blocking tasks, gr1 and gr2, say they’re two requests to external services. While those are executing a third task can be doing work asynchronously, like in the following example:.</a:t>
+            </a:r>
+          </a:p>
+          <a:p>
+            <a:pPr>
+              <a:lnSpc>
+                <a:spcPct val="150000"/>
+              </a:lnSpc>
+            </a:pPr>
             <a:r>
               <a:rPr lang="en-US" sz="2800" dirty="0"/>
-              <a:t> we declare that the </a:t>
-            </a:r>
-            <a:r>
-              <a:rPr lang="en-US" sz="2800" dirty="0" err="1"/>
-              <a:t>coroutine</a:t>
-            </a:r>
+              <a:t> 1b-cooperatively-scheduled-asyncio.py</a:t>
+            </a:r>
+          </a:p>
+          <a:p>
+            <a:pPr>
+              <a:lnSpc>
+                <a:spcPct val="150000"/>
+              </a:lnSpc>
+            </a:pPr>
             <a:r>
               <a:rPr lang="en-US" sz="2800" dirty="0"/>
-              <a:t> may give the control back to the event loop, in this case sleep. The </a:t>
-            </a:r>
-            <a:r>
-              <a:rPr lang="en-US" sz="2800" dirty="0" err="1"/>
-              <a:t>coroutine</a:t>
-            </a:r>
-            <a:r>
-              <a:rPr lang="en-US" sz="2800" dirty="0"/>
-              <a:t> will yield and the event loop will switch contexts to the next task scheduled for execution: bar. Similarly the bar </a:t>
-            </a:r>
-            <a:r>
-              <a:rPr lang="en-US" sz="2800" dirty="0" err="1"/>
-              <a:t>coroutine</a:t>
-            </a:r>
-            <a:r>
-              <a:rPr lang="en-US" sz="2800" dirty="0"/>
-              <a:t> uses await sleep which allows the event loop to pass control back to foo at the point where it yielded before, just as normal Python generators.</a:t>
-            </a:r>
+              <a:t>Notice how the event loop manages and schedules the execution allowing our single threaded code to operate concurrently. While the two blocking tasks are blocked a third one can take control of the flow.</a:t>
+            </a:r>
+          </a:p>
+          <a:p>
+            <a:pPr>
+              <a:lnSpc>
+                <a:spcPct val="150000"/>
+              </a:lnSpc>
+            </a:pPr>
             <a:endParaRPr lang="en-US" sz="2800" dirty="0"/>
           </a:p>
         </p:txBody>
@@ -5068,7 +5058,7 @@
     </p:spTree>
     <p:extLst>
       <p:ext uri="{BB962C8B-B14F-4D97-AF65-F5344CB8AC3E}">
-        <p14:creationId xmlns:p14="http://schemas.microsoft.com/office/powerpoint/2010/main" val="3613110455"/>
+        <p14:creationId xmlns:p14="http://schemas.microsoft.com/office/powerpoint/2010/main" val="918008922"/>
       </p:ext>
     </p:extLst>
   </p:cSld>
@@ -5104,7 +5094,7 @@
         <p:spPr>
           <a:xfrm>
             <a:off x="278296" y="163203"/>
-            <a:ext cx="7295202" cy="646331"/>
+            <a:ext cx="3653372" cy="646331"/>
           </a:xfrm>
           <a:prstGeom prst="rect">
             <a:avLst/>
@@ -5120,19 +5110,7 @@
               <a:rPr lang="en-US" sz="3600" dirty="0">
                 <a:latin typeface="+mj-lt"/>
               </a:rPr>
-              <a:t>Threads, loops, </a:t>
-            </a:r>
-            <a:r>
-              <a:rPr lang="en-US" sz="3600" dirty="0" err="1">
-                <a:latin typeface="+mj-lt"/>
-              </a:rPr>
-              <a:t>coroutines</a:t>
-            </a:r>
-            <a:r>
-              <a:rPr lang="en-US" sz="3600" dirty="0">
-                <a:latin typeface="+mj-lt"/>
-              </a:rPr>
-              <a:t> and futures</a:t>
+              <a:t>Order of execution</a:t>
             </a:r>
           </a:p>
         </p:txBody>
@@ -5146,7 +5124,7 @@
         <p:spPr>
           <a:xfrm>
             <a:off x="520053" y="1465594"/>
-            <a:ext cx="11236518" cy="5262979"/>
+            <a:ext cx="11236518" cy="3970318"/>
           </a:xfrm>
           <a:prstGeom prst="rect">
             <a:avLst/>
@@ -5165,11 +5143,7 @@
             </a:pPr>
             <a:r>
               <a:rPr lang="en-US" sz="2800" dirty="0"/>
-              <a:t>Let’s now simulate two blocking tasks, gr1 and gr2, say they’re two requests to external services. While those are executing a third task can be doing work asynchronously, like in the following example</a:t>
-            </a:r>
-            <a:r>
-              <a:rPr lang="en-US" sz="2800" dirty="0" smtClean="0"/>
-              <a:t>:.</a:t>
+              <a:t>In the synchronous world we’re used to thinking linearly. If we were to have a series of tasks that take different amounts of time they will be executed in the order that they were called upon.</a:t>
             </a:r>
           </a:p>
           <a:p>
@@ -5179,8 +5153,8 @@
               </a:lnSpc>
             </a:pPr>
             <a:r>
-              <a:rPr lang="en-US" sz="2800" dirty="0" smtClean="0"/>
-              <a:t> 1b-cooperatively-scheduled-asyncio.py</a:t>
+              <a:rPr lang="en-US" sz="2800" dirty="0"/>
+              <a:t>However, when using concurrency we need to be aware that the tasks finish in different order than they were scheduled.</a:t>
             </a:r>
           </a:p>
           <a:p>
@@ -5191,24 +5165,15 @@
             </a:pPr>
             <a:r>
               <a:rPr lang="en-US" sz="2800" dirty="0"/>
-              <a:t>Notice how the event loop manages and schedules the execution allowing our single threaded code to operate concurrently. While the two blocking tasks are blocked a third one can take control of the flow.</a:t>
-            </a:r>
-            <a:endParaRPr lang="en-US" sz="2800" dirty="0" smtClean="0"/>
-          </a:p>
-          <a:p>
-            <a:pPr>
-              <a:lnSpc>
-                <a:spcPct val="150000"/>
-              </a:lnSpc>
-            </a:pPr>
-            <a:endParaRPr lang="en-US" sz="2800" dirty="0"/>
+              <a:t>Ex. 1c-determinism-sync-async-asyncio.py</a:t>
+            </a:r>
           </a:p>
         </p:txBody>
       </p:sp>
     </p:spTree>
     <p:extLst>
       <p:ext uri="{BB962C8B-B14F-4D97-AF65-F5344CB8AC3E}">
-        <p14:creationId xmlns:p14="http://schemas.microsoft.com/office/powerpoint/2010/main" val="918008922"/>
+        <p14:creationId xmlns:p14="http://schemas.microsoft.com/office/powerpoint/2010/main" val="3349848287"/>
       </p:ext>
     </p:extLst>
   </p:cSld>
@@ -5262,9 +5227,6 @@
               </a:rPr>
               <a:t>Order of execution</a:t>
             </a:r>
-            <a:endParaRPr lang="en-US" sz="3600" dirty="0">
-              <a:latin typeface="+mj-lt"/>
-            </a:endParaRPr>
           </a:p>
         </p:txBody>
       </p:sp>
@@ -5277,7 +5239,7 @@
         <p:spPr>
           <a:xfrm>
             <a:off x="520053" y="1465594"/>
-            <a:ext cx="11236518" cy="3970318"/>
+            <a:ext cx="11236518" cy="3257174"/>
           </a:xfrm>
           <a:prstGeom prst="rect">
             <a:avLst/>
@@ -5296,46 +5258,47 @@
             </a:pPr>
             <a:r>
               <a:rPr lang="en-US" sz="2800" dirty="0"/>
-              <a:t>In the synchronous world we’re used to thinking linearly. If we were to have a series of tasks that take different amounts of time they will be executed in the order that they were called upon.</a:t>
-            </a:r>
-          </a:p>
-          <a:p>
-            <a:pPr>
-              <a:lnSpc>
-                <a:spcPct val="150000"/>
-              </a:lnSpc>
-            </a:pPr>
+              <a:t>It’s important to understand that </a:t>
+            </a:r>
+            <a:r>
+              <a:rPr lang="en-US" sz="2800" dirty="0" err="1"/>
+              <a:t>asyncio</a:t>
+            </a:r>
             <a:r>
               <a:rPr lang="en-US" sz="2800" dirty="0"/>
-              <a:t>However, when using concurrency we need to be aware that the tasks finish in different order than they were scheduled</a:t>
-            </a:r>
-            <a:r>
-              <a:rPr lang="en-US" sz="2800" dirty="0" smtClean="0"/>
-              <a:t>.</a:t>
-            </a:r>
-          </a:p>
-          <a:p>
-            <a:pPr>
-              <a:lnSpc>
-                <a:spcPct val="150000"/>
-              </a:lnSpc>
-            </a:pPr>
-            <a:r>
-              <a:rPr lang="en-US" sz="2800" dirty="0" smtClean="0"/>
-              <a:t>Ex</a:t>
+              <a:t> does not magically make things non-blocking. At the time of writing </a:t>
+            </a:r>
+            <a:r>
+              <a:rPr lang="en-US" sz="2800" dirty="0" err="1"/>
+              <a:t>asyncio</a:t>
             </a:r>
             <a:r>
               <a:rPr lang="en-US" sz="2800" dirty="0"/>
-              <a:t>. 1c-determinism-sync-async-asyncio.py</a:t>
-            </a:r>
-            <a:endParaRPr lang="en-US" sz="2800" dirty="0"/>
+              <a:t> stands alone in the standard library, the rest of modules provide only blocking functionality. You can use the </a:t>
+            </a:r>
+            <a:r>
+              <a:rPr lang="en-US" sz="2800" dirty="0" err="1"/>
+              <a:t>concurrent.futures</a:t>
+            </a:r>
+            <a:r>
+              <a:rPr lang="en-US" sz="2800" dirty="0"/>
+              <a:t> module to wrap a blocking task in a thread or a process and return a Future </a:t>
+            </a:r>
+            <a:r>
+              <a:rPr lang="en-US" sz="2800" dirty="0" err="1"/>
+              <a:t>asyncio</a:t>
+            </a:r>
+            <a:r>
+              <a:rPr lang="en-US" sz="2800" dirty="0"/>
+              <a:t> can use.</a:t>
+            </a:r>
           </a:p>
         </p:txBody>
       </p:sp>
     </p:spTree>
     <p:extLst>
       <p:ext uri="{BB962C8B-B14F-4D97-AF65-F5344CB8AC3E}">
-        <p14:creationId xmlns:p14="http://schemas.microsoft.com/office/powerpoint/2010/main" val="3349848287"/>
+        <p14:creationId xmlns:p14="http://schemas.microsoft.com/office/powerpoint/2010/main" val="877925243"/>
       </p:ext>
     </p:extLst>
   </p:cSld>
@@ -5371,7 +5334,7 @@
         <p:spPr>
           <a:xfrm>
             <a:off x="278296" y="163203"/>
-            <a:ext cx="3653372" cy="646331"/>
+            <a:ext cx="1829668" cy="646331"/>
           </a:xfrm>
           <a:prstGeom prst="rect">
             <a:avLst/>
@@ -5387,11 +5350,8 @@
               <a:rPr lang="en-US" sz="3600" dirty="0">
                 <a:latin typeface="+mj-lt"/>
               </a:rPr>
-              <a:t>Order of execution</a:t>
-            </a:r>
-            <a:endParaRPr lang="en-US" sz="3600" dirty="0">
-              <a:latin typeface="+mj-lt"/>
-            </a:endParaRPr>
+              <a:t>AIOHTTP</a:t>
+            </a:r>
           </a:p>
         </p:txBody>
       </p:sp>
@@ -5404,7 +5364,7 @@
         <p:spPr>
           <a:xfrm>
             <a:off x="520053" y="1465594"/>
-            <a:ext cx="11236518" cy="3257174"/>
+            <a:ext cx="11236518" cy="5262979"/>
           </a:xfrm>
           <a:prstGeom prst="rect">
             <a:avLst/>
@@ -5416,55 +5376,92 @@
           </a:bodyPr>
           <a:lstStyle/>
           <a:p>
-            <a:pPr>
+            <a:pPr algn="just">
               <a:lnSpc>
                 <a:spcPct val="150000"/>
               </a:lnSpc>
             </a:pPr>
             <a:r>
               <a:rPr lang="en-US" sz="2800" dirty="0"/>
-              <a:t>It’s important to understand that </a:t>
+              <a:t>A very common blocking task is, of course, fetching data from an HTTP service. I’m using the excellent </a:t>
             </a:r>
             <a:r>
               <a:rPr lang="en-US" sz="2800" dirty="0" err="1"/>
-              <a:t>asyncio</a:t>
+              <a:t>aiohttp</a:t>
             </a:r>
             <a:r>
               <a:rPr lang="en-US" sz="2800" dirty="0"/>
-              <a:t> does not magically make things non-blocking. At the time of writing </a:t>
+              <a:t> library for non-blocking HTTP requests retrieving data from </a:t>
             </a:r>
             <a:r>
               <a:rPr lang="en-US" sz="2800" dirty="0" err="1"/>
-              <a:t>asyncio</a:t>
+              <a:t>Github’s</a:t>
             </a:r>
             <a:r>
               <a:rPr lang="en-US" sz="2800" dirty="0"/>
-              <a:t> stands alone in the standard library, the rest of modules provide only blocking functionality. You can use the </a:t>
+              <a:t> public event API and simply take the Date response header.</a:t>
+            </a:r>
+          </a:p>
+          <a:p>
+            <a:pPr algn="just">
+              <a:lnSpc>
+                <a:spcPct val="150000"/>
+              </a:lnSpc>
+            </a:pPr>
+            <a:r>
+              <a:rPr lang="en-US" sz="2800" dirty="0"/>
+              <a:t>The </a:t>
             </a:r>
             <a:r>
               <a:rPr lang="en-US" sz="2800" dirty="0" err="1"/>
-              <a:t>concurrent.futures</a:t>
+              <a:t>aiohttp_get</a:t>
             </a:r>
             <a:r>
               <a:rPr lang="en-US" sz="2800" dirty="0"/>
-              <a:t> module to wrap a blocking task in a thread or a process and return a Future </a:t>
+              <a:t> </a:t>
             </a:r>
             <a:r>
               <a:rPr lang="en-US" sz="2800" dirty="0" err="1"/>
-              <a:t>asyncio</a:t>
+              <a:t>coroutines</a:t>
             </a:r>
             <a:r>
               <a:rPr lang="en-US" sz="2800" dirty="0"/>
-              <a:t> can use.</a:t>
-            </a:r>
-            <a:endParaRPr lang="en-US" sz="2800" dirty="0"/>
+              <a:t> below use asynchronous context manager syntax which is outside the scope of this </a:t>
+            </a:r>
+            <a:r>
+              <a:rPr lang="en-US" sz="2800" dirty="0" err="1"/>
+              <a:t>cource</a:t>
+            </a:r>
+            <a:r>
+              <a:rPr lang="en-US" sz="2800" dirty="0"/>
+              <a:t> but is necessary boilerplate to perform an asynchronous HTTP request using </a:t>
+            </a:r>
+            <a:r>
+              <a:rPr lang="en-US" sz="2800" dirty="0" err="1"/>
+              <a:t>aiohttp</a:t>
+            </a:r>
+            <a:r>
+              <a:rPr lang="en-US" sz="2800" dirty="0"/>
+              <a:t>. </a:t>
+            </a:r>
+          </a:p>
+          <a:p>
+            <a:pPr algn="just">
+              <a:lnSpc>
+                <a:spcPct val="150000"/>
+              </a:lnSpc>
+            </a:pPr>
+            <a:r>
+              <a:rPr lang="en-US" sz="2800" dirty="0"/>
+              <a:t>Ex. 1d-async-fetch-from-server.py</a:t>
+            </a:r>
           </a:p>
         </p:txBody>
       </p:sp>
     </p:spTree>
     <p:extLst>
       <p:ext uri="{BB962C8B-B14F-4D97-AF65-F5344CB8AC3E}">
-        <p14:creationId xmlns:p14="http://schemas.microsoft.com/office/powerpoint/2010/main" val="877925243"/>
+        <p14:creationId xmlns:p14="http://schemas.microsoft.com/office/powerpoint/2010/main" val="4212436879"/>
       </p:ext>
     </p:extLst>
   </p:cSld>
@@ -5500,190 +5497,6 @@
         <p:spPr>
           <a:xfrm>
             <a:off x="278296" y="163203"/>
-            <a:ext cx="1829668" cy="646331"/>
-          </a:xfrm>
-          <a:prstGeom prst="rect">
-            <a:avLst/>
-          </a:prstGeom>
-        </p:spPr>
-        <p:txBody>
-          <a:bodyPr wrap="none">
-            <a:spAutoFit/>
-          </a:bodyPr>
-          <a:lstStyle/>
-          <a:p>
-            <a:r>
-              <a:rPr lang="en-US" sz="3600" dirty="0" smtClean="0">
-                <a:latin typeface="+mj-lt"/>
-              </a:rPr>
-              <a:t>AIOHTTP</a:t>
-            </a:r>
-            <a:endParaRPr lang="en-US" sz="3600" dirty="0">
-              <a:latin typeface="+mj-lt"/>
-            </a:endParaRPr>
-          </a:p>
-        </p:txBody>
-      </p:sp>
-      <p:sp>
-        <p:nvSpPr>
-          <p:cNvPr id="4" name="Rectangle 3"/>
-          <p:cNvSpPr/>
-          <p:nvPr/>
-        </p:nvSpPr>
-        <p:spPr>
-          <a:xfrm>
-            <a:off x="520053" y="1465594"/>
-            <a:ext cx="11236518" cy="5262979"/>
-          </a:xfrm>
-          <a:prstGeom prst="rect">
-            <a:avLst/>
-          </a:prstGeom>
-        </p:spPr>
-        <p:txBody>
-          <a:bodyPr wrap="square">
-            <a:spAutoFit/>
-          </a:bodyPr>
-          <a:lstStyle/>
-          <a:p>
-            <a:pPr algn="just">
-              <a:lnSpc>
-                <a:spcPct val="150000"/>
-              </a:lnSpc>
-            </a:pPr>
-            <a:r>
-              <a:rPr lang="en-US" sz="2800" dirty="0"/>
-              <a:t>A very common blocking task is, of course, fetching data from an HTTP service. I’m using the excellent </a:t>
-            </a:r>
-            <a:r>
-              <a:rPr lang="en-US" sz="2800" dirty="0" err="1"/>
-              <a:t>aiohttp</a:t>
-            </a:r>
-            <a:r>
-              <a:rPr lang="en-US" sz="2800" dirty="0"/>
-              <a:t> library for non-blocking HTTP requests retrieving data from </a:t>
-            </a:r>
-            <a:r>
-              <a:rPr lang="en-US" sz="2800" dirty="0" err="1"/>
-              <a:t>Github’s</a:t>
-            </a:r>
-            <a:r>
-              <a:rPr lang="en-US" sz="2800" dirty="0"/>
-              <a:t> public event API and simply take the Date response header.</a:t>
-            </a:r>
-          </a:p>
-          <a:p>
-            <a:pPr algn="just">
-              <a:lnSpc>
-                <a:spcPct val="150000"/>
-              </a:lnSpc>
-            </a:pPr>
-            <a:r>
-              <a:rPr lang="en-US" sz="2800" dirty="0"/>
-              <a:t>T</a:t>
-            </a:r>
-            <a:r>
-              <a:rPr lang="en-US" sz="2800" dirty="0" smtClean="0"/>
-              <a:t>he </a:t>
-            </a:r>
-            <a:r>
-              <a:rPr lang="en-US" sz="2800" dirty="0" err="1"/>
-              <a:t>aiohttp_get</a:t>
-            </a:r>
-            <a:r>
-              <a:rPr lang="en-US" sz="2800" dirty="0"/>
-              <a:t> </a:t>
-            </a:r>
-            <a:r>
-              <a:rPr lang="en-US" sz="2800" dirty="0" err="1"/>
-              <a:t>coroutines</a:t>
-            </a:r>
-            <a:r>
-              <a:rPr lang="en-US" sz="2800" dirty="0"/>
-              <a:t> </a:t>
-            </a:r>
-            <a:r>
-              <a:rPr lang="en-US" sz="2800" dirty="0" smtClean="0"/>
-              <a:t>below use </a:t>
-            </a:r>
-            <a:r>
-              <a:rPr lang="en-US" sz="2800" dirty="0"/>
-              <a:t>asynchronous context manager syntax which is outside the scope of this </a:t>
-            </a:r>
-            <a:r>
-              <a:rPr lang="en-US" sz="2800" dirty="0" err="1" smtClean="0"/>
-              <a:t>cource</a:t>
-            </a:r>
-            <a:r>
-              <a:rPr lang="en-US" sz="2800" dirty="0" smtClean="0"/>
-              <a:t> </a:t>
-            </a:r>
-            <a:r>
-              <a:rPr lang="en-US" sz="2800" dirty="0"/>
-              <a:t>but is necessary boilerplate to perform an asynchronous HTTP request using </a:t>
-            </a:r>
-            <a:r>
-              <a:rPr lang="en-US" sz="2800" dirty="0" err="1"/>
-              <a:t>aiohttp</a:t>
-            </a:r>
-            <a:r>
-              <a:rPr lang="en-US" sz="2800" dirty="0"/>
-              <a:t>. </a:t>
-            </a:r>
-            <a:endParaRPr lang="en-US" sz="2800" dirty="0" smtClean="0"/>
-          </a:p>
-          <a:p>
-            <a:pPr algn="just">
-              <a:lnSpc>
-                <a:spcPct val="150000"/>
-              </a:lnSpc>
-            </a:pPr>
-            <a:r>
-              <a:rPr lang="en-US" sz="2800" dirty="0"/>
-              <a:t>Ex. 1d-async-fetch-from-server.py</a:t>
-            </a:r>
-            <a:endParaRPr lang="en-US" sz="2800" dirty="0"/>
-          </a:p>
-        </p:txBody>
-      </p:sp>
-    </p:spTree>
-    <p:extLst>
-      <p:ext uri="{BB962C8B-B14F-4D97-AF65-F5344CB8AC3E}">
-        <p14:creationId xmlns:p14="http://schemas.microsoft.com/office/powerpoint/2010/main" val="4212436879"/>
-      </p:ext>
-    </p:extLst>
-  </p:cSld>
-  <p:clrMapOvr>
-    <a:masterClrMapping/>
-  </p:clrMapOvr>
-</p:sld>
-</file>
-
-<file path=ppt/slides/slide15.xml><?xml version="1.0" encoding="utf-8"?>
-<p:sld xmlns:a="http://schemas.openxmlformats.org/drawingml/2006/main" xmlns:r="http://schemas.openxmlformats.org/officeDocument/2006/relationships" xmlns:p="http://schemas.openxmlformats.org/presentationml/2006/main">
-  <p:cSld>
-    <p:spTree>
-      <p:nvGrpSpPr>
-        <p:cNvPr id="1" name=""/>
-        <p:cNvGrpSpPr/>
-        <p:nvPr/>
-      </p:nvGrpSpPr>
-      <p:grpSpPr>
-        <a:xfrm>
-          <a:off x="0" y="0"/>
-          <a:ext cx="0" cy="0"/>
-          <a:chOff x="0" y="0"/>
-          <a:chExt cx="0" cy="0"/>
-        </a:xfrm>
-      </p:grpSpPr>
-      <p:sp>
-        <p:nvSpPr>
-          <p:cNvPr id="3" name="Rectangle 2"/>
-          <p:cNvSpPr/>
-          <p:nvPr/>
-        </p:nvSpPr>
-        <p:spPr>
-          <a:xfrm>
-            <a:off x="278296" y="163203"/>
             <a:ext cx="4126451" cy="646331"/>
           </a:xfrm>
           <a:prstGeom prst="rect">
@@ -5760,17 +5573,8 @@
             </a:r>
             <a:r>
               <a:rPr lang="en-US" sz="2800" dirty="0"/>
-              <a:t> can be scheduled to run or retrieve their results in different ways. Imagine a scenario where we need to process the results of the HTTP GET requests as soon as they arrive, the process is actually quite similar than in our previous </a:t>
-            </a:r>
-            <a:r>
-              <a:rPr lang="en-US" sz="2800" dirty="0" smtClean="0"/>
-              <a:t>example</a:t>
-            </a:r>
-            <a:r>
-              <a:rPr lang="en-US" sz="2800" dirty="0"/>
-              <a:t> - 2a-async-fetch-from-server-as-completed.py</a:t>
-            </a:r>
-            <a:endParaRPr lang="en-US" sz="2800" dirty="0"/>
+              <a:t> can be scheduled to run or retrieve their results in different ways. Imagine a scenario where we need to process the results of the HTTP GET requests as soon as they arrive, the process is actually quite similar than in our previous example - 2a-async-fetch-from-server-as-completed.py</a:t>
+            </a:r>
           </a:p>
         </p:txBody>
       </p:sp>
@@ -5813,7 +5617,7 @@
         <p:spPr>
           <a:xfrm>
             <a:off x="278296" y="163203"/>
-            <a:ext cx="4290277" cy="646331"/>
+            <a:ext cx="3373937" cy="646331"/>
           </a:xfrm>
           <a:prstGeom prst="rect">
             <a:avLst/>
@@ -5829,7 +5633,19 @@
               <a:rPr lang="en-US" sz="3600" dirty="0">
                 <a:latin typeface="+mj-lt"/>
               </a:rPr>
-              <a:t>What is concurrency? </a:t>
+              <a:t>What is </a:t>
+            </a:r>
+            <a:r>
+              <a:rPr lang="en-US" sz="3600" dirty="0" err="1">
+                <a:latin typeface="+mj-lt"/>
+              </a:rPr>
+              <a:t>asyncio</a:t>
+            </a:r>
+            <a:r>
+              <a:rPr lang="en-US" sz="3600" dirty="0">
+                <a:latin typeface="+mj-lt"/>
+              </a:rPr>
+              <a:t>? </a:t>
             </a:r>
           </a:p>
         </p:txBody>
@@ -5842,8 +5658,8 @@
         </p:nvSpPr>
         <p:spPr>
           <a:xfrm>
-            <a:off x="1199322" y="1674600"/>
-            <a:ext cx="9912626" cy="671851"/>
+            <a:off x="520053" y="1465594"/>
+            <a:ext cx="11236518" cy="2677656"/>
           </a:xfrm>
           <a:prstGeom prst="rect">
             <a:avLst/>
@@ -5855,25 +5671,30 @@
           </a:bodyPr>
           <a:lstStyle/>
           <a:p>
-            <a:pPr marL="514350" indent="-514350">
+            <a:pPr>
               <a:lnSpc>
                 <a:spcPct val="150000"/>
               </a:lnSpc>
-              <a:buFont typeface="+mj-lt"/>
-              <a:buAutoNum type="arabicPeriod"/>
             </a:pPr>
             <a:r>
               <a:rPr lang="en-US" sz="2800" dirty="0"/>
-              <a:t> </a:t>
-            </a:r>
-            <a:endParaRPr lang="en-US" sz="2800" dirty="0" smtClean="0"/>
+              <a:t>Asyncio is the new concurrency module introduced in Python 3.4. It’s designed to use </a:t>
+            </a:r>
+            <a:r>
+              <a:rPr lang="en-US" sz="2800" dirty="0" err="1"/>
+              <a:t>coroutines</a:t>
+            </a:r>
+            <a:r>
+              <a:rPr lang="en-US" sz="2800" dirty="0"/>
+              <a:t> and futures to simplify asynchronous code and make it almost as readable as synchronous code simply because there are no callbacks.</a:t>
+            </a:r>
           </a:p>
         </p:txBody>
       </p:sp>
     </p:spTree>
     <p:extLst>
       <p:ext uri="{BB962C8B-B14F-4D97-AF65-F5344CB8AC3E}">
-        <p14:creationId xmlns:p14="http://schemas.microsoft.com/office/powerpoint/2010/main" val="2024562499"/>
+        <p14:creationId xmlns:p14="http://schemas.microsoft.com/office/powerpoint/2010/main" val="2398360457"/>
       </p:ext>
     </p:extLst>
   </p:cSld>
@@ -5909,7 +5730,7 @@
         <p:spPr>
           <a:xfrm>
             <a:off x="278296" y="163203"/>
-            <a:ext cx="3373937" cy="646331"/>
+            <a:ext cx="7295202" cy="646331"/>
           </a:xfrm>
           <a:prstGeom prst="rect">
             <a:avLst/>
@@ -5925,23 +5746,20 @@
               <a:rPr lang="en-US" sz="3600" dirty="0">
                 <a:latin typeface="+mj-lt"/>
               </a:rPr>
-              <a:t>What is </a:t>
-            </a:r>
-            <a:r>
-              <a:rPr lang="en-US" sz="3600" dirty="0" err="1" smtClean="0">
+              <a:t>Threads, loops, </a:t>
+            </a:r>
+            <a:r>
+              <a:rPr lang="en-US" sz="3600" dirty="0" err="1">
                 <a:latin typeface="+mj-lt"/>
               </a:rPr>
-              <a:t>asyncio</a:t>
-            </a:r>
-            <a:r>
-              <a:rPr lang="en-US" sz="3600" dirty="0" smtClean="0">
+              <a:t>coroutines</a:t>
+            </a:r>
+            <a:r>
+              <a:rPr lang="en-US" sz="3600" dirty="0">
                 <a:latin typeface="+mj-lt"/>
               </a:rPr>
-              <a:t>? </a:t>
-            </a:r>
-            <a:endParaRPr lang="en-US" sz="3600" dirty="0">
-              <a:latin typeface="+mj-lt"/>
-            </a:endParaRPr>
+              <a:t> and futures</a:t>
+            </a:r>
           </a:p>
         </p:txBody>
       </p:sp>
@@ -5954,7 +5772,7 @@
         <p:spPr>
           <a:xfrm>
             <a:off x="520053" y="1465594"/>
-            <a:ext cx="11236518" cy="2677656"/>
+            <a:ext cx="11236518" cy="4616648"/>
           </a:xfrm>
           <a:prstGeom prst="rect">
             <a:avLst/>
@@ -5972,12 +5790,16 @@
               </a:lnSpc>
             </a:pPr>
             <a:r>
-              <a:rPr lang="en-US" sz="2800" dirty="0" smtClean="0"/>
-              <a:t>Asyncio </a:t>
-            </a:r>
-            <a:r>
               <a:rPr lang="en-US" sz="2800" dirty="0"/>
-              <a:t>is the new concurrency module introduced in Python 3.4. It’s designed to use </a:t>
+              <a:t>Threads are a common tool and most developers have heard of and used before. However </a:t>
+            </a:r>
+            <a:r>
+              <a:rPr lang="en-US" sz="2800" dirty="0" err="1"/>
+              <a:t>asyncio</a:t>
+            </a:r>
+            <a:r>
+              <a:rPr lang="en-US" sz="2800" dirty="0"/>
+              <a:t> uses quite different constructs: event loops, </a:t>
             </a:r>
             <a:r>
               <a:rPr lang="en-US" sz="2800" dirty="0" err="1"/>
@@ -5985,7 +5807,28 @@
             </a:r>
             <a:r>
               <a:rPr lang="en-US" sz="2800" dirty="0"/>
-              <a:t> and futures to simplify asynchronous code and make it almost as readable as synchronous code simply because there are no callbacks.</a:t>
+              <a:t> and futures.</a:t>
+            </a:r>
+          </a:p>
+          <a:p>
+            <a:pPr>
+              <a:lnSpc>
+                <a:spcPct val="150000"/>
+              </a:lnSpc>
+            </a:pPr>
+            <a:endParaRPr lang="en-US" sz="2800" dirty="0"/>
+          </a:p>
+          <a:p>
+            <a:pPr marL="457200" indent="-457200">
+              <a:lnSpc>
+                <a:spcPct val="150000"/>
+              </a:lnSpc>
+              <a:buFont typeface="Arial" panose="020B0604020202020204" pitchFamily="34" charset="0"/>
+              <a:buChar char="•"/>
+            </a:pPr>
+            <a:r>
+              <a:rPr lang="en-US" sz="2800" dirty="0"/>
+              <a:t>An event loop essentially manages and distributes the execution of different tasks. It registers them and handles distributing the flow of control between them.</a:t>
             </a:r>
           </a:p>
         </p:txBody>
@@ -5993,7 +5836,7 @@
     </p:spTree>
     <p:extLst>
       <p:ext uri="{BB962C8B-B14F-4D97-AF65-F5344CB8AC3E}">
-        <p14:creationId xmlns:p14="http://schemas.microsoft.com/office/powerpoint/2010/main" val="2398360457"/>
+        <p14:creationId xmlns:p14="http://schemas.microsoft.com/office/powerpoint/2010/main" val="1057902858"/>
       </p:ext>
     </p:extLst>
   </p:cSld>
@@ -6071,7 +5914,7 @@
         <p:spPr>
           <a:xfrm>
             <a:off x="520053" y="1465594"/>
-            <a:ext cx="11236518" cy="4616648"/>
+            <a:ext cx="11236518" cy="3903504"/>
           </a:xfrm>
           <a:prstGeom prst="rect">
             <a:avLst/>
@@ -6083,45 +5926,6 @@
           </a:bodyPr>
           <a:lstStyle/>
           <a:p>
-            <a:pPr>
-              <a:lnSpc>
-                <a:spcPct val="150000"/>
-              </a:lnSpc>
-            </a:pPr>
-            <a:r>
-              <a:rPr lang="en-US" sz="2800" dirty="0"/>
-              <a:t>Threads are a common tool and most developers have heard of and used before. However </a:t>
-            </a:r>
-            <a:r>
-              <a:rPr lang="en-US" sz="2800" dirty="0" err="1"/>
-              <a:t>asyncio</a:t>
-            </a:r>
-            <a:r>
-              <a:rPr lang="en-US" sz="2800" dirty="0"/>
-              <a:t> uses quite different constructs: event loops, </a:t>
-            </a:r>
-            <a:r>
-              <a:rPr lang="en-US" sz="2800" dirty="0" err="1"/>
-              <a:t>coroutines</a:t>
-            </a:r>
-            <a:r>
-              <a:rPr lang="en-US" sz="2800" dirty="0"/>
-              <a:t> and futures</a:t>
-            </a:r>
-            <a:r>
-              <a:rPr lang="en-US" sz="2800" dirty="0" smtClean="0"/>
-              <a:t>.</a:t>
-            </a:r>
-          </a:p>
-          <a:p>
-            <a:pPr>
-              <a:lnSpc>
-                <a:spcPct val="150000"/>
-              </a:lnSpc>
-            </a:pPr>
-            <a:endParaRPr lang="en-US" sz="2800" dirty="0"/>
-          </a:p>
-          <a:p>
             <a:pPr marL="457200" indent="-457200">
               <a:lnSpc>
                 <a:spcPct val="150000"/>
@@ -6130,21 +5934,49 @@
               <a:buChar char="•"/>
             </a:pPr>
             <a:r>
+              <a:rPr lang="en-US" sz="2800" dirty="0" err="1"/>
+              <a:t>Coroutines</a:t>
+            </a:r>
+            <a:r>
               <a:rPr lang="en-US" sz="2800" dirty="0"/>
-              <a:t>An event loop essentially manages and distributes the execution of different tasks. It registers them and handles distributing the flow of control between them</a:t>
-            </a:r>
-            <a:r>
-              <a:rPr lang="en-US" sz="2800" dirty="0" smtClean="0"/>
-              <a:t>.</a:t>
-            </a:r>
-            <a:endParaRPr lang="en-US" sz="2800" dirty="0"/>
+              <a:t> are special functions that work similarly to Python generators, on await they release the flow of control back to the event loop. A </a:t>
+            </a:r>
+            <a:r>
+              <a:rPr lang="en-US" sz="2800" dirty="0" err="1"/>
+              <a:t>coroutine</a:t>
+            </a:r>
+            <a:r>
+              <a:rPr lang="en-US" sz="2800" dirty="0"/>
+              <a:t> needs to be scheduled to run on the event loop, once scheduled </a:t>
+            </a:r>
+            <a:r>
+              <a:rPr lang="en-US" sz="2800" dirty="0" err="1"/>
+              <a:t>coroutines</a:t>
+            </a:r>
+            <a:r>
+              <a:rPr lang="en-US" sz="2800" dirty="0"/>
+              <a:t> are wrapped in Tasks which is a type of Future.</a:t>
+            </a:r>
+          </a:p>
+          <a:p>
+            <a:pPr marL="457200" indent="-457200">
+              <a:lnSpc>
+                <a:spcPct val="150000"/>
+              </a:lnSpc>
+              <a:buFont typeface="Arial" panose="020B0604020202020204" pitchFamily="34" charset="0"/>
+              <a:buChar char="•"/>
+            </a:pPr>
+            <a:r>
+              <a:rPr lang="en-US" sz="2800" dirty="0"/>
+              <a:t>Futures are objects that represent the result of a task that may or may not have been executed. This result may be an exception.</a:t>
+            </a:r>
           </a:p>
         </p:txBody>
       </p:sp>
     </p:spTree>
     <p:extLst>
       <p:ext uri="{BB962C8B-B14F-4D97-AF65-F5344CB8AC3E}">
-        <p14:creationId xmlns:p14="http://schemas.microsoft.com/office/powerpoint/2010/main" val="1057902858"/>
+        <p14:creationId xmlns:p14="http://schemas.microsoft.com/office/powerpoint/2010/main" val="3356722391"/>
       </p:ext>
     </p:extLst>
   </p:cSld>
@@ -6222,7 +6054,7 @@
         <p:spPr>
           <a:xfrm>
             <a:off x="520053" y="1465594"/>
-            <a:ext cx="11236518" cy="3903504"/>
+            <a:ext cx="11236518" cy="3257174"/>
           </a:xfrm>
           <a:prstGeom prst="rect">
             <a:avLst/>
@@ -6234,49 +6066,30 @@
           </a:bodyPr>
           <a:lstStyle/>
           <a:p>
-            <a:pPr marL="457200" indent="-457200">
+            <a:pPr>
               <a:lnSpc>
                 <a:spcPct val="150000"/>
               </a:lnSpc>
-              <a:buFont typeface="Arial" panose="020B0604020202020204" pitchFamily="34" charset="0"/>
-              <a:buChar char="•"/>
             </a:pPr>
+            <a:r>
+              <a:rPr lang="en-US" sz="2800" dirty="0"/>
+              <a:t>You can structure your code so subtasks are defined as </a:t>
+            </a:r>
+            <a:r>
+              <a:rPr lang="en-US" sz="2800" dirty="0" err="1"/>
+              <a:t>coroutines</a:t>
+            </a:r>
+            <a:r>
+              <a:rPr lang="en-US" sz="2800" dirty="0"/>
+              <a:t> and allows you to schedule them as you please, including simultaneously. </a:t>
+            </a:r>
             <a:r>
               <a:rPr lang="en-US" sz="2800" dirty="0" err="1"/>
               <a:t>Coroutines</a:t>
             </a:r>
             <a:r>
               <a:rPr lang="en-US" sz="2800" dirty="0"/>
-              <a:t> are special functions that work similarly to Python generators, on await they release the flow of control back to the event loop. A </a:t>
-            </a:r>
-            <a:r>
-              <a:rPr lang="en-US" sz="2800" dirty="0" err="1"/>
-              <a:t>coroutine</a:t>
-            </a:r>
-            <a:r>
-              <a:rPr lang="en-US" sz="2800" dirty="0"/>
-              <a:t> needs to be scheduled to run on the event loop, once scheduled </a:t>
-            </a:r>
-            <a:r>
-              <a:rPr lang="en-US" sz="2800" dirty="0" err="1"/>
-              <a:t>coroutines</a:t>
-            </a:r>
-            <a:r>
-              <a:rPr lang="en-US" sz="2800" dirty="0"/>
-              <a:t> are wrapped in Tasks which is a type of Future.</a:t>
-            </a:r>
-          </a:p>
-          <a:p>
-            <a:pPr marL="457200" indent="-457200">
-              <a:lnSpc>
-                <a:spcPct val="150000"/>
-              </a:lnSpc>
-              <a:buFont typeface="Arial" panose="020B0604020202020204" pitchFamily="34" charset="0"/>
-              <a:buChar char="•"/>
-            </a:pPr>
-            <a:r>
-              <a:rPr lang="en-US" sz="2800" dirty="0"/>
-              <a:t>Futures are objects that represent the result of a task that may or may not have been executed. This result may be an exception.</a:t>
+              <a:t> contain yield points where we define possible points where a context switch can happen if other tasks are pending, but will not if no other task is pending.</a:t>
             </a:r>
           </a:p>
         </p:txBody>
@@ -6284,7 +6097,7 @@
     </p:spTree>
     <p:extLst>
       <p:ext uri="{BB962C8B-B14F-4D97-AF65-F5344CB8AC3E}">
-        <p14:creationId xmlns:p14="http://schemas.microsoft.com/office/powerpoint/2010/main" val="3356722391"/>
+        <p14:creationId xmlns:p14="http://schemas.microsoft.com/office/powerpoint/2010/main" val="2438721359"/>
       </p:ext>
     </p:extLst>
   </p:cSld>
@@ -6361,8 +6174,8 @@
         </p:nvSpPr>
         <p:spPr>
           <a:xfrm>
-            <a:off x="520053" y="1465594"/>
-            <a:ext cx="11236518" cy="3257174"/>
+            <a:off x="572305" y="2275491"/>
+            <a:ext cx="11236518" cy="1964512"/>
           </a:xfrm>
           <a:prstGeom prst="rect">
             <a:avLst/>
@@ -6380,37 +6193,32 @@
               </a:lnSpc>
             </a:pPr>
             <a:r>
-              <a:rPr lang="en-US" sz="2800" dirty="0" smtClean="0"/>
-              <a:t>You </a:t>
-            </a:r>
-            <a:r>
               <a:rPr lang="en-US" sz="2800" dirty="0"/>
-              <a:t>can structure your code so subtasks are defined as </a:t>
+              <a:t>A context switch in </a:t>
             </a:r>
             <a:r>
               <a:rPr lang="en-US" sz="2800" dirty="0" err="1"/>
-              <a:t>coroutines</a:t>
+              <a:t>asyncio</a:t>
             </a:r>
             <a:r>
               <a:rPr lang="en-US" sz="2800" dirty="0"/>
-              <a:t> and allows you to schedule them as you please, including simultaneously. </a:t>
+              <a:t> represents the event loop yielding the flow of control from one </a:t>
             </a:r>
             <a:r>
               <a:rPr lang="en-US" sz="2800" dirty="0" err="1"/>
-              <a:t>Coroutines</a:t>
+              <a:t>coroutine</a:t>
             </a:r>
             <a:r>
               <a:rPr lang="en-US" sz="2800" dirty="0"/>
-              <a:t> contain yield points where we define possible points where a context switch can happen if other tasks are pending, but will not if no other task is pending.</a:t>
-            </a:r>
-            <a:endParaRPr lang="en-US" sz="2800" dirty="0"/>
+              <a:t> to the next. Let’s have a look at a very basic example from 1-sync-async-execution-asyncio.py</a:t>
+            </a:r>
           </a:p>
         </p:txBody>
       </p:sp>
     </p:spTree>
     <p:extLst>
       <p:ext uri="{BB962C8B-B14F-4D97-AF65-F5344CB8AC3E}">
-        <p14:creationId xmlns:p14="http://schemas.microsoft.com/office/powerpoint/2010/main" val="2438721359"/>
+        <p14:creationId xmlns:p14="http://schemas.microsoft.com/office/powerpoint/2010/main" val="3067029963"/>
       </p:ext>
     </p:extLst>
   </p:cSld>
@@ -6481,66 +6289,1168 @@
       </p:sp>
       <p:sp>
         <p:nvSpPr>
-          <p:cNvPr id="4" name="Rectangle 3"/>
-          <p:cNvSpPr/>
+          <p:cNvPr id="5" name="Rectangle 2"/>
+          <p:cNvSpPr>
+            <a:spLocks noChangeArrowheads="1"/>
+          </p:cNvSpPr>
           <p:nvPr/>
         </p:nvSpPr>
-        <p:spPr>
+        <p:spPr bwMode="auto">
           <a:xfrm>
-            <a:off x="572305" y="2275491"/>
-            <a:ext cx="11236518" cy="1964512"/>
+            <a:off x="278296" y="1040821"/>
+            <a:ext cx="9884607" cy="5847755"/>
           </a:xfrm>
           <a:prstGeom prst="rect">
             <a:avLst/>
           </a:prstGeom>
+          <a:solidFill>
+            <a:srgbClr val="FFFFFF"/>
+          </a:solidFill>
+          <a:ln>
+            <a:noFill/>
+          </a:ln>
+          <a:effectLst/>
+          <a:extLst>
+            <a:ext uri="{91240B29-F687-4F45-9708-019B960494DF}">
+              <a14:hiddenLine xmlns:a14="http://schemas.microsoft.com/office/drawing/2010/main" w="9525">
+                <a:solidFill>
+                  <a:schemeClr val="tx1"/>
+                </a:solidFill>
+                <a:miter lim="800000"/>
+                <a:headEnd/>
+                <a:tailEnd/>
+              </a14:hiddenLine>
+            </a:ext>
+            <a:ext uri="{AF507438-7753-43E0-B8FC-AC1667EBCBE1}">
+              <a14:hiddenEffects xmlns:a14="http://schemas.microsoft.com/office/drawing/2010/main">
+                <a:effectLst>
+                  <a:outerShdw dist="35921" dir="2700000" algn="ctr" rotWithShape="0">
+                    <a:schemeClr val="bg2"/>
+                  </a:outerShdw>
+                </a:effectLst>
+              </a14:hiddenEffects>
+            </a:ext>
+          </a:extLst>
         </p:spPr>
         <p:txBody>
-          <a:bodyPr wrap="square">
+          <a:bodyPr vert="horz" wrap="square" lIns="91440" tIns="45720" rIns="91440" bIns="45720" numCol="1" anchor="ctr" anchorCtr="0" compatLnSpc="1">
+            <a:prstTxWarp prst="textNoShape">
+              <a:avLst/>
+            </a:prstTxWarp>
             <a:spAutoFit/>
           </a:bodyPr>
           <a:lstStyle/>
           <a:p>
-            <a:pPr>
+            <a:pPr marL="0" marR="0" lvl="0" indent="0" algn="l" defTabSz="914400" rtl="0" eaLnBrk="0" fontAlgn="base" latinLnBrk="0" hangingPunct="0">
               <a:lnSpc>
-                <a:spcPct val="150000"/>
+                <a:spcPct val="100000"/>
               </a:lnSpc>
+              <a:spcBef>
+                <a:spcPct val="0"/>
+              </a:spcBef>
+              <a:spcAft>
+                <a:spcPct val="0"/>
+              </a:spcAft>
+              <a:buClrTx/>
+              <a:buSzTx/>
+              <a:buFontTx/>
+              <a:buNone/>
+              <a:tabLst/>
             </a:pPr>
             <a:r>
-              <a:rPr lang="en-US" sz="2800" dirty="0"/>
-              <a:t>A context switch in </a:t>
-            </a:r>
-            <a:r>
-              <a:rPr lang="en-US" sz="2800" dirty="0" err="1"/>
+              <a:rPr kumimoji="0" lang="en-US" altLang="en-US" sz="2200" b="1" i="0" u="none" strike="noStrike" cap="none" normalizeH="0" baseline="0" dirty="0">
+                <a:ln>
+                  <a:noFill/>
+                </a:ln>
+                <a:solidFill>
+                  <a:srgbClr val="000080"/>
+                </a:solidFill>
+                <a:effectLst/>
+                <a:latin typeface="Courier New" panose="02070309020205020404" pitchFamily="49" charset="0"/>
+                <a:cs typeface="Courier New" panose="02070309020205020404" pitchFamily="49" charset="0"/>
+              </a:rPr>
+              <a:t>import </a:t>
+            </a:r>
+            <a:r>
+              <a:rPr kumimoji="0" lang="en-US" altLang="en-US" sz="2200" b="0" i="0" u="none" strike="noStrike" cap="none" normalizeH="0" baseline="0" dirty="0" err="1">
+                <a:ln>
+                  <a:noFill/>
+                </a:ln>
+                <a:solidFill>
+                  <a:srgbClr val="000000"/>
+                </a:solidFill>
+                <a:effectLst/>
+                <a:latin typeface="Courier New" panose="02070309020205020404" pitchFamily="49" charset="0"/>
+                <a:cs typeface="Courier New" panose="02070309020205020404" pitchFamily="49" charset="0"/>
+              </a:rPr>
               <a:t>asyncio</a:t>
             </a:r>
-            <a:r>
-              <a:rPr lang="en-US" sz="2800" dirty="0"/>
-              <a:t> represents the event loop yielding the flow of control from one </a:t>
-            </a:r>
-            <a:r>
-              <a:rPr lang="en-US" sz="2800" dirty="0" err="1"/>
-              <a:t>coroutine</a:t>
-            </a:r>
-            <a:r>
-              <a:rPr lang="en-US" sz="2800" dirty="0"/>
-              <a:t> to the next. Let’s have a look at a very basic </a:t>
-            </a:r>
-            <a:r>
-              <a:rPr lang="en-US" sz="2800" dirty="0" smtClean="0"/>
-              <a:t>example </a:t>
-            </a:r>
-            <a:r>
-              <a:rPr lang="en-US" sz="2800" dirty="0"/>
-              <a:t>from 1-sync-async-execution-asyncio.py</a:t>
-            </a:r>
-            <a:endParaRPr lang="en-US" sz="2800" dirty="0"/>
+            <a:br>
+              <a:rPr kumimoji="0" lang="en-US" altLang="en-US" sz="2200" b="0" i="0" u="none" strike="noStrike" cap="none" normalizeH="0" baseline="0" dirty="0">
+                <a:ln>
+                  <a:noFill/>
+                </a:ln>
+                <a:solidFill>
+                  <a:srgbClr val="000000"/>
+                </a:solidFill>
+                <a:effectLst/>
+                <a:latin typeface="Courier New" panose="02070309020205020404" pitchFamily="49" charset="0"/>
+                <a:cs typeface="Courier New" panose="02070309020205020404" pitchFamily="49" charset="0"/>
+              </a:rPr>
+            </a:br>
+            <a:r>
+              <a:rPr kumimoji="0" lang="en-US" altLang="en-US" sz="2200" b="1" i="0" u="none" strike="noStrike" cap="none" normalizeH="0" baseline="0" dirty="0" err="1">
+                <a:ln>
+                  <a:noFill/>
+                </a:ln>
+                <a:solidFill>
+                  <a:srgbClr val="000080"/>
+                </a:solidFill>
+                <a:effectLst/>
+                <a:latin typeface="Courier New" panose="02070309020205020404" pitchFamily="49" charset="0"/>
+                <a:cs typeface="Courier New" panose="02070309020205020404" pitchFamily="49" charset="0"/>
+              </a:rPr>
+              <a:t>async</a:t>
+            </a:r>
+            <a:r>
+              <a:rPr kumimoji="0" lang="en-US" altLang="en-US" sz="2200" b="1" i="0" u="none" strike="noStrike" cap="none" normalizeH="0" baseline="0" dirty="0">
+                <a:ln>
+                  <a:noFill/>
+                </a:ln>
+                <a:solidFill>
+                  <a:srgbClr val="000080"/>
+                </a:solidFill>
+                <a:effectLst/>
+                <a:latin typeface="Courier New" panose="02070309020205020404" pitchFamily="49" charset="0"/>
+                <a:cs typeface="Courier New" panose="02070309020205020404" pitchFamily="49" charset="0"/>
+              </a:rPr>
+              <a:t> </a:t>
+            </a:r>
+            <a:r>
+              <a:rPr kumimoji="0" lang="en-US" altLang="en-US" sz="2200" b="1" i="0" u="none" strike="noStrike" cap="none" normalizeH="0" baseline="0" dirty="0" err="1">
+                <a:ln>
+                  <a:noFill/>
+                </a:ln>
+                <a:solidFill>
+                  <a:srgbClr val="000080"/>
+                </a:solidFill>
+                <a:effectLst/>
+                <a:latin typeface="Courier New" panose="02070309020205020404" pitchFamily="49" charset="0"/>
+                <a:cs typeface="Courier New" panose="02070309020205020404" pitchFamily="49" charset="0"/>
+              </a:rPr>
+              <a:t>def</a:t>
+            </a:r>
+            <a:r>
+              <a:rPr kumimoji="0" lang="en-US" altLang="en-US" sz="2200" b="1" i="0" u="none" strike="noStrike" cap="none" normalizeH="0" baseline="0" dirty="0">
+                <a:ln>
+                  <a:noFill/>
+                </a:ln>
+                <a:solidFill>
+                  <a:srgbClr val="000080"/>
+                </a:solidFill>
+                <a:effectLst/>
+                <a:latin typeface="Courier New" panose="02070309020205020404" pitchFamily="49" charset="0"/>
+                <a:cs typeface="Courier New" panose="02070309020205020404" pitchFamily="49" charset="0"/>
+              </a:rPr>
+              <a:t> </a:t>
+            </a:r>
+            <a:r>
+              <a:rPr kumimoji="0" lang="en-US" altLang="en-US" sz="2200" b="0" i="0" u="none" strike="noStrike" cap="none" normalizeH="0" baseline="0" dirty="0">
+                <a:ln>
+                  <a:noFill/>
+                </a:ln>
+                <a:solidFill>
+                  <a:srgbClr val="000000"/>
+                </a:solidFill>
+                <a:effectLst/>
+                <a:latin typeface="Courier New" panose="02070309020205020404" pitchFamily="49" charset="0"/>
+                <a:cs typeface="Courier New" panose="02070309020205020404" pitchFamily="49" charset="0"/>
+              </a:rPr>
+              <a:t>foo():</a:t>
+            </a:r>
+            <a:br>
+              <a:rPr kumimoji="0" lang="en-US" altLang="en-US" sz="2200" b="0" i="0" u="none" strike="noStrike" cap="none" normalizeH="0" baseline="0" dirty="0">
+                <a:ln>
+                  <a:noFill/>
+                </a:ln>
+                <a:solidFill>
+                  <a:srgbClr val="000000"/>
+                </a:solidFill>
+                <a:effectLst/>
+                <a:latin typeface="Courier New" panose="02070309020205020404" pitchFamily="49" charset="0"/>
+                <a:cs typeface="Courier New" panose="02070309020205020404" pitchFamily="49" charset="0"/>
+              </a:rPr>
+            </a:br>
+            <a:r>
+              <a:rPr kumimoji="0" lang="en-US" altLang="en-US" sz="2200" b="0" i="0" u="none" strike="noStrike" cap="none" normalizeH="0" baseline="0" dirty="0">
+                <a:ln>
+                  <a:noFill/>
+                </a:ln>
+                <a:solidFill>
+                  <a:srgbClr val="000000"/>
+                </a:solidFill>
+                <a:effectLst/>
+                <a:latin typeface="Courier New" panose="02070309020205020404" pitchFamily="49" charset="0"/>
+                <a:cs typeface="Courier New" panose="02070309020205020404" pitchFamily="49" charset="0"/>
+              </a:rPr>
+              <a:t>    </a:t>
+            </a:r>
+            <a:r>
+              <a:rPr kumimoji="0" lang="en-US" altLang="en-US" sz="2200" b="0" i="0" u="none" strike="noStrike" cap="none" normalizeH="0" baseline="0" dirty="0">
+                <a:ln>
+                  <a:noFill/>
+                </a:ln>
+                <a:solidFill>
+                  <a:srgbClr val="000080"/>
+                </a:solidFill>
+                <a:effectLst/>
+                <a:latin typeface="Courier New" panose="02070309020205020404" pitchFamily="49" charset="0"/>
+                <a:cs typeface="Courier New" panose="02070309020205020404" pitchFamily="49" charset="0"/>
+              </a:rPr>
+              <a:t>print</a:t>
+            </a:r>
+            <a:r>
+              <a:rPr kumimoji="0" lang="en-US" altLang="en-US" sz="2200" b="0" i="0" u="none" strike="noStrike" cap="none" normalizeH="0" baseline="0" dirty="0">
+                <a:ln>
+                  <a:noFill/>
+                </a:ln>
+                <a:solidFill>
+                  <a:srgbClr val="000000"/>
+                </a:solidFill>
+                <a:effectLst/>
+                <a:latin typeface="Courier New" panose="02070309020205020404" pitchFamily="49" charset="0"/>
+                <a:cs typeface="Courier New" panose="02070309020205020404" pitchFamily="49" charset="0"/>
+              </a:rPr>
+              <a:t>(</a:t>
+            </a:r>
+            <a:r>
+              <a:rPr kumimoji="0" lang="en-US" altLang="en-US" sz="2200" b="1" i="0" u="none" strike="noStrike" cap="none" normalizeH="0" baseline="0" dirty="0">
+                <a:ln>
+                  <a:noFill/>
+                </a:ln>
+                <a:solidFill>
+                  <a:srgbClr val="008080"/>
+                </a:solidFill>
+                <a:effectLst/>
+                <a:latin typeface="Courier New" panose="02070309020205020404" pitchFamily="49" charset="0"/>
+                <a:cs typeface="Courier New" panose="02070309020205020404" pitchFamily="49" charset="0"/>
+              </a:rPr>
+              <a:t>'Running in foo'</a:t>
+            </a:r>
+            <a:r>
+              <a:rPr kumimoji="0" lang="en-US" altLang="en-US" sz="2200" b="0" i="0" u="none" strike="noStrike" cap="none" normalizeH="0" baseline="0" dirty="0">
+                <a:ln>
+                  <a:noFill/>
+                </a:ln>
+                <a:solidFill>
+                  <a:srgbClr val="000000"/>
+                </a:solidFill>
+                <a:effectLst/>
+                <a:latin typeface="Courier New" panose="02070309020205020404" pitchFamily="49" charset="0"/>
+                <a:cs typeface="Courier New" panose="02070309020205020404" pitchFamily="49" charset="0"/>
+              </a:rPr>
+              <a:t>)</a:t>
+            </a:r>
+            <a:br>
+              <a:rPr kumimoji="0" lang="en-US" altLang="en-US" sz="2200" b="0" i="0" u="none" strike="noStrike" cap="none" normalizeH="0" baseline="0" dirty="0">
+                <a:ln>
+                  <a:noFill/>
+                </a:ln>
+                <a:solidFill>
+                  <a:srgbClr val="000000"/>
+                </a:solidFill>
+                <a:effectLst/>
+                <a:latin typeface="Courier New" panose="02070309020205020404" pitchFamily="49" charset="0"/>
+                <a:cs typeface="Courier New" panose="02070309020205020404" pitchFamily="49" charset="0"/>
+              </a:rPr>
+            </a:br>
+            <a:r>
+              <a:rPr kumimoji="0" lang="en-US" altLang="en-US" sz="2200" b="0" i="0" u="none" strike="noStrike" cap="none" normalizeH="0" baseline="0" dirty="0">
+                <a:ln>
+                  <a:noFill/>
+                </a:ln>
+                <a:solidFill>
+                  <a:srgbClr val="000000"/>
+                </a:solidFill>
+                <a:effectLst/>
+                <a:latin typeface="Courier New" panose="02070309020205020404" pitchFamily="49" charset="0"/>
+                <a:cs typeface="Courier New" panose="02070309020205020404" pitchFamily="49" charset="0"/>
+              </a:rPr>
+              <a:t>    </a:t>
+            </a:r>
+            <a:r>
+              <a:rPr kumimoji="0" lang="en-US" altLang="en-US" sz="2200" b="1" i="0" u="none" strike="noStrike" cap="none" normalizeH="0" baseline="0" dirty="0">
+                <a:ln>
+                  <a:noFill/>
+                </a:ln>
+                <a:solidFill>
+                  <a:srgbClr val="000080"/>
+                </a:solidFill>
+                <a:effectLst/>
+                <a:latin typeface="Courier New" panose="02070309020205020404" pitchFamily="49" charset="0"/>
+                <a:cs typeface="Courier New" panose="02070309020205020404" pitchFamily="49" charset="0"/>
+              </a:rPr>
+              <a:t>await </a:t>
+            </a:r>
+            <a:r>
+              <a:rPr kumimoji="0" lang="en-US" altLang="en-US" sz="2200" b="0" i="0" u="none" strike="noStrike" cap="none" normalizeH="0" baseline="0" dirty="0" err="1">
+                <a:ln>
+                  <a:noFill/>
+                </a:ln>
+                <a:solidFill>
+                  <a:srgbClr val="000000"/>
+                </a:solidFill>
+                <a:effectLst/>
+                <a:latin typeface="Courier New" panose="02070309020205020404" pitchFamily="49" charset="0"/>
+                <a:cs typeface="Courier New" panose="02070309020205020404" pitchFamily="49" charset="0"/>
+              </a:rPr>
+              <a:t>asyncio.sleep</a:t>
+            </a:r>
+            <a:r>
+              <a:rPr kumimoji="0" lang="en-US" altLang="en-US" sz="2200" b="0" i="0" u="none" strike="noStrike" cap="none" normalizeH="0" baseline="0" dirty="0">
+                <a:ln>
+                  <a:noFill/>
+                </a:ln>
+                <a:solidFill>
+                  <a:srgbClr val="000000"/>
+                </a:solidFill>
+                <a:effectLst/>
+                <a:latin typeface="Courier New" panose="02070309020205020404" pitchFamily="49" charset="0"/>
+                <a:cs typeface="Courier New" panose="02070309020205020404" pitchFamily="49" charset="0"/>
+              </a:rPr>
+              <a:t>(</a:t>
+            </a:r>
+            <a:r>
+              <a:rPr kumimoji="0" lang="en-US" altLang="en-US" sz="2200" b="0" i="0" u="none" strike="noStrike" cap="none" normalizeH="0" baseline="0" dirty="0">
+                <a:ln>
+                  <a:noFill/>
+                </a:ln>
+                <a:solidFill>
+                  <a:srgbClr val="0000FF"/>
+                </a:solidFill>
+                <a:effectLst/>
+                <a:latin typeface="Courier New" panose="02070309020205020404" pitchFamily="49" charset="0"/>
+                <a:cs typeface="Courier New" panose="02070309020205020404" pitchFamily="49" charset="0"/>
+              </a:rPr>
+              <a:t>0</a:t>
+            </a:r>
+            <a:r>
+              <a:rPr kumimoji="0" lang="en-US" altLang="en-US" sz="2200" b="0" i="0" u="none" strike="noStrike" cap="none" normalizeH="0" baseline="0" dirty="0">
+                <a:ln>
+                  <a:noFill/>
+                </a:ln>
+                <a:solidFill>
+                  <a:srgbClr val="000000"/>
+                </a:solidFill>
+                <a:effectLst/>
+                <a:latin typeface="Courier New" panose="02070309020205020404" pitchFamily="49" charset="0"/>
+                <a:cs typeface="Courier New" panose="02070309020205020404" pitchFamily="49" charset="0"/>
+              </a:rPr>
+              <a:t>)</a:t>
+            </a:r>
+            <a:br>
+              <a:rPr kumimoji="0" lang="en-US" altLang="en-US" sz="2200" b="0" i="0" u="none" strike="noStrike" cap="none" normalizeH="0" baseline="0" dirty="0">
+                <a:ln>
+                  <a:noFill/>
+                </a:ln>
+                <a:solidFill>
+                  <a:srgbClr val="000000"/>
+                </a:solidFill>
+                <a:effectLst/>
+                <a:latin typeface="Courier New" panose="02070309020205020404" pitchFamily="49" charset="0"/>
+                <a:cs typeface="Courier New" panose="02070309020205020404" pitchFamily="49" charset="0"/>
+              </a:rPr>
+            </a:br>
+            <a:r>
+              <a:rPr kumimoji="0" lang="en-US" altLang="en-US" sz="2200" b="0" i="0" u="none" strike="noStrike" cap="none" normalizeH="0" baseline="0" dirty="0">
+                <a:ln>
+                  <a:noFill/>
+                </a:ln>
+                <a:solidFill>
+                  <a:srgbClr val="000000"/>
+                </a:solidFill>
+                <a:effectLst/>
+                <a:latin typeface="Courier New" panose="02070309020205020404" pitchFamily="49" charset="0"/>
+                <a:cs typeface="Courier New" panose="02070309020205020404" pitchFamily="49" charset="0"/>
+              </a:rPr>
+              <a:t>    </a:t>
+            </a:r>
+            <a:r>
+              <a:rPr kumimoji="0" lang="en-US" altLang="en-US" sz="2200" b="0" i="0" u="none" strike="noStrike" cap="none" normalizeH="0" baseline="0" dirty="0">
+                <a:ln>
+                  <a:noFill/>
+                </a:ln>
+                <a:solidFill>
+                  <a:srgbClr val="000080"/>
+                </a:solidFill>
+                <a:effectLst/>
+                <a:latin typeface="Courier New" panose="02070309020205020404" pitchFamily="49" charset="0"/>
+                <a:cs typeface="Courier New" panose="02070309020205020404" pitchFamily="49" charset="0"/>
+              </a:rPr>
+              <a:t>print</a:t>
+            </a:r>
+            <a:r>
+              <a:rPr kumimoji="0" lang="en-US" altLang="en-US" sz="2200" b="0" i="0" u="none" strike="noStrike" cap="none" normalizeH="0" baseline="0" dirty="0">
+                <a:ln>
+                  <a:noFill/>
+                </a:ln>
+                <a:solidFill>
+                  <a:srgbClr val="000000"/>
+                </a:solidFill>
+                <a:effectLst/>
+                <a:latin typeface="Courier New" panose="02070309020205020404" pitchFamily="49" charset="0"/>
+                <a:cs typeface="Courier New" panose="02070309020205020404" pitchFamily="49" charset="0"/>
+              </a:rPr>
+              <a:t>(</a:t>
+            </a:r>
+            <a:r>
+              <a:rPr kumimoji="0" lang="en-US" altLang="en-US" sz="2200" b="1" i="0" u="none" strike="noStrike" cap="none" normalizeH="0" baseline="0" dirty="0">
+                <a:ln>
+                  <a:noFill/>
+                </a:ln>
+                <a:solidFill>
+                  <a:srgbClr val="008080"/>
+                </a:solidFill>
+                <a:effectLst/>
+                <a:latin typeface="Courier New" panose="02070309020205020404" pitchFamily="49" charset="0"/>
+                <a:cs typeface="Courier New" panose="02070309020205020404" pitchFamily="49" charset="0"/>
+              </a:rPr>
+              <a:t>'Explicit context switch to foo again'</a:t>
+            </a:r>
+            <a:r>
+              <a:rPr kumimoji="0" lang="en-US" altLang="en-US" sz="2200" b="0" i="0" u="none" strike="noStrike" cap="none" normalizeH="0" baseline="0" dirty="0">
+                <a:ln>
+                  <a:noFill/>
+                </a:ln>
+                <a:solidFill>
+                  <a:srgbClr val="000000"/>
+                </a:solidFill>
+                <a:effectLst/>
+                <a:latin typeface="Courier New" panose="02070309020205020404" pitchFamily="49" charset="0"/>
+                <a:cs typeface="Courier New" panose="02070309020205020404" pitchFamily="49" charset="0"/>
+              </a:rPr>
+              <a:t>)</a:t>
+            </a:r>
+            <a:br>
+              <a:rPr kumimoji="0" lang="en-US" altLang="en-US" sz="2200" b="0" i="0" u="none" strike="noStrike" cap="none" normalizeH="0" baseline="0" dirty="0">
+                <a:ln>
+                  <a:noFill/>
+                </a:ln>
+                <a:solidFill>
+                  <a:srgbClr val="000000"/>
+                </a:solidFill>
+                <a:effectLst/>
+                <a:latin typeface="Courier New" panose="02070309020205020404" pitchFamily="49" charset="0"/>
+                <a:cs typeface="Courier New" panose="02070309020205020404" pitchFamily="49" charset="0"/>
+              </a:rPr>
+            </a:br>
+            <a:br>
+              <a:rPr kumimoji="0" lang="en-US" altLang="en-US" sz="2200" b="0" i="0" u="none" strike="noStrike" cap="none" normalizeH="0" baseline="0" dirty="0">
+                <a:ln>
+                  <a:noFill/>
+                </a:ln>
+                <a:solidFill>
+                  <a:srgbClr val="000000"/>
+                </a:solidFill>
+                <a:effectLst/>
+                <a:latin typeface="Courier New" panose="02070309020205020404" pitchFamily="49" charset="0"/>
+                <a:cs typeface="Courier New" panose="02070309020205020404" pitchFamily="49" charset="0"/>
+              </a:rPr>
+            </a:br>
+            <a:r>
+              <a:rPr kumimoji="0" lang="en-US" altLang="en-US" sz="2200" b="1" i="0" u="none" strike="noStrike" cap="none" normalizeH="0" baseline="0" dirty="0" err="1">
+                <a:ln>
+                  <a:noFill/>
+                </a:ln>
+                <a:solidFill>
+                  <a:srgbClr val="000080"/>
+                </a:solidFill>
+                <a:effectLst/>
+                <a:latin typeface="Courier New" panose="02070309020205020404" pitchFamily="49" charset="0"/>
+                <a:cs typeface="Courier New" panose="02070309020205020404" pitchFamily="49" charset="0"/>
+              </a:rPr>
+              <a:t>async</a:t>
+            </a:r>
+            <a:r>
+              <a:rPr kumimoji="0" lang="en-US" altLang="en-US" sz="2200" b="1" i="0" u="none" strike="noStrike" cap="none" normalizeH="0" baseline="0" dirty="0">
+                <a:ln>
+                  <a:noFill/>
+                </a:ln>
+                <a:solidFill>
+                  <a:srgbClr val="000080"/>
+                </a:solidFill>
+                <a:effectLst/>
+                <a:latin typeface="Courier New" panose="02070309020205020404" pitchFamily="49" charset="0"/>
+                <a:cs typeface="Courier New" panose="02070309020205020404" pitchFamily="49" charset="0"/>
+              </a:rPr>
+              <a:t> </a:t>
+            </a:r>
+            <a:r>
+              <a:rPr kumimoji="0" lang="en-US" altLang="en-US" sz="2200" b="1" i="0" u="none" strike="noStrike" cap="none" normalizeH="0" baseline="0" dirty="0" err="1">
+                <a:ln>
+                  <a:noFill/>
+                </a:ln>
+                <a:solidFill>
+                  <a:srgbClr val="000080"/>
+                </a:solidFill>
+                <a:effectLst/>
+                <a:latin typeface="Courier New" panose="02070309020205020404" pitchFamily="49" charset="0"/>
+                <a:cs typeface="Courier New" panose="02070309020205020404" pitchFamily="49" charset="0"/>
+              </a:rPr>
+              <a:t>def</a:t>
+            </a:r>
+            <a:r>
+              <a:rPr kumimoji="0" lang="en-US" altLang="en-US" sz="2200" b="1" i="0" u="none" strike="noStrike" cap="none" normalizeH="0" baseline="0" dirty="0">
+                <a:ln>
+                  <a:noFill/>
+                </a:ln>
+                <a:solidFill>
+                  <a:srgbClr val="000080"/>
+                </a:solidFill>
+                <a:effectLst/>
+                <a:latin typeface="Courier New" panose="02070309020205020404" pitchFamily="49" charset="0"/>
+                <a:cs typeface="Courier New" panose="02070309020205020404" pitchFamily="49" charset="0"/>
+              </a:rPr>
+              <a:t> </a:t>
+            </a:r>
+            <a:r>
+              <a:rPr kumimoji="0" lang="en-US" altLang="en-US" sz="2200" b="0" i="0" u="none" strike="noStrike" cap="none" normalizeH="0" baseline="0" dirty="0">
+                <a:ln>
+                  <a:noFill/>
+                </a:ln>
+                <a:solidFill>
+                  <a:srgbClr val="000000"/>
+                </a:solidFill>
+                <a:effectLst/>
+                <a:latin typeface="Courier New" panose="02070309020205020404" pitchFamily="49" charset="0"/>
+                <a:cs typeface="Courier New" panose="02070309020205020404" pitchFamily="49" charset="0"/>
+              </a:rPr>
+              <a:t>bar():</a:t>
+            </a:r>
+            <a:br>
+              <a:rPr kumimoji="0" lang="en-US" altLang="en-US" sz="2200" b="0" i="0" u="none" strike="noStrike" cap="none" normalizeH="0" baseline="0" dirty="0">
+                <a:ln>
+                  <a:noFill/>
+                </a:ln>
+                <a:solidFill>
+                  <a:srgbClr val="000000"/>
+                </a:solidFill>
+                <a:effectLst/>
+                <a:latin typeface="Courier New" panose="02070309020205020404" pitchFamily="49" charset="0"/>
+                <a:cs typeface="Courier New" panose="02070309020205020404" pitchFamily="49" charset="0"/>
+              </a:rPr>
+            </a:br>
+            <a:r>
+              <a:rPr kumimoji="0" lang="en-US" altLang="en-US" sz="2200" b="0" i="0" u="none" strike="noStrike" cap="none" normalizeH="0" baseline="0" dirty="0">
+                <a:ln>
+                  <a:noFill/>
+                </a:ln>
+                <a:solidFill>
+                  <a:srgbClr val="000000"/>
+                </a:solidFill>
+                <a:effectLst/>
+                <a:latin typeface="Courier New" panose="02070309020205020404" pitchFamily="49" charset="0"/>
+                <a:cs typeface="Courier New" panose="02070309020205020404" pitchFamily="49" charset="0"/>
+              </a:rPr>
+              <a:t>    </a:t>
+            </a:r>
+            <a:r>
+              <a:rPr kumimoji="0" lang="en-US" altLang="en-US" sz="2200" b="0" i="0" u="none" strike="noStrike" cap="none" normalizeH="0" baseline="0" dirty="0">
+                <a:ln>
+                  <a:noFill/>
+                </a:ln>
+                <a:solidFill>
+                  <a:srgbClr val="000080"/>
+                </a:solidFill>
+                <a:effectLst/>
+                <a:latin typeface="Courier New" panose="02070309020205020404" pitchFamily="49" charset="0"/>
+                <a:cs typeface="Courier New" panose="02070309020205020404" pitchFamily="49" charset="0"/>
+              </a:rPr>
+              <a:t>print</a:t>
+            </a:r>
+            <a:r>
+              <a:rPr kumimoji="0" lang="en-US" altLang="en-US" sz="2200" b="0" i="0" u="none" strike="noStrike" cap="none" normalizeH="0" baseline="0" dirty="0">
+                <a:ln>
+                  <a:noFill/>
+                </a:ln>
+                <a:solidFill>
+                  <a:srgbClr val="000000"/>
+                </a:solidFill>
+                <a:effectLst/>
+                <a:latin typeface="Courier New" panose="02070309020205020404" pitchFamily="49" charset="0"/>
+                <a:cs typeface="Courier New" panose="02070309020205020404" pitchFamily="49" charset="0"/>
+              </a:rPr>
+              <a:t>(</a:t>
+            </a:r>
+            <a:r>
+              <a:rPr kumimoji="0" lang="en-US" altLang="en-US" sz="2200" b="1" i="0" u="none" strike="noStrike" cap="none" normalizeH="0" baseline="0" dirty="0">
+                <a:ln>
+                  <a:noFill/>
+                </a:ln>
+                <a:solidFill>
+                  <a:srgbClr val="008080"/>
+                </a:solidFill>
+                <a:effectLst/>
+                <a:latin typeface="Courier New" panose="02070309020205020404" pitchFamily="49" charset="0"/>
+                <a:cs typeface="Courier New" panose="02070309020205020404" pitchFamily="49" charset="0"/>
+              </a:rPr>
+              <a:t>'Explicit context to bar'</a:t>
+            </a:r>
+            <a:r>
+              <a:rPr kumimoji="0" lang="en-US" altLang="en-US" sz="2200" b="0" i="0" u="none" strike="noStrike" cap="none" normalizeH="0" baseline="0" dirty="0">
+                <a:ln>
+                  <a:noFill/>
+                </a:ln>
+                <a:solidFill>
+                  <a:srgbClr val="000000"/>
+                </a:solidFill>
+                <a:effectLst/>
+                <a:latin typeface="Courier New" panose="02070309020205020404" pitchFamily="49" charset="0"/>
+                <a:cs typeface="Courier New" panose="02070309020205020404" pitchFamily="49" charset="0"/>
+              </a:rPr>
+              <a:t>)</a:t>
+            </a:r>
+            <a:br>
+              <a:rPr kumimoji="0" lang="en-US" altLang="en-US" sz="2200" b="0" i="0" u="none" strike="noStrike" cap="none" normalizeH="0" baseline="0" dirty="0">
+                <a:ln>
+                  <a:noFill/>
+                </a:ln>
+                <a:solidFill>
+                  <a:srgbClr val="000000"/>
+                </a:solidFill>
+                <a:effectLst/>
+                <a:latin typeface="Courier New" panose="02070309020205020404" pitchFamily="49" charset="0"/>
+                <a:cs typeface="Courier New" panose="02070309020205020404" pitchFamily="49" charset="0"/>
+              </a:rPr>
+            </a:br>
+            <a:r>
+              <a:rPr kumimoji="0" lang="en-US" altLang="en-US" sz="2200" b="0" i="0" u="none" strike="noStrike" cap="none" normalizeH="0" baseline="0" dirty="0">
+                <a:ln>
+                  <a:noFill/>
+                </a:ln>
+                <a:solidFill>
+                  <a:srgbClr val="000000"/>
+                </a:solidFill>
+                <a:effectLst/>
+                <a:latin typeface="Courier New" panose="02070309020205020404" pitchFamily="49" charset="0"/>
+                <a:cs typeface="Courier New" panose="02070309020205020404" pitchFamily="49" charset="0"/>
+              </a:rPr>
+              <a:t>    </a:t>
+            </a:r>
+            <a:r>
+              <a:rPr kumimoji="0" lang="en-US" altLang="en-US" sz="2200" b="1" i="0" u="none" strike="noStrike" cap="none" normalizeH="0" baseline="0" dirty="0">
+                <a:ln>
+                  <a:noFill/>
+                </a:ln>
+                <a:solidFill>
+                  <a:srgbClr val="000080"/>
+                </a:solidFill>
+                <a:effectLst/>
+                <a:latin typeface="Courier New" panose="02070309020205020404" pitchFamily="49" charset="0"/>
+                <a:cs typeface="Courier New" panose="02070309020205020404" pitchFamily="49" charset="0"/>
+              </a:rPr>
+              <a:t>await </a:t>
+            </a:r>
+            <a:r>
+              <a:rPr kumimoji="0" lang="en-US" altLang="en-US" sz="2200" b="0" i="0" u="none" strike="noStrike" cap="none" normalizeH="0" baseline="0" dirty="0" err="1">
+                <a:ln>
+                  <a:noFill/>
+                </a:ln>
+                <a:solidFill>
+                  <a:srgbClr val="000000"/>
+                </a:solidFill>
+                <a:effectLst/>
+                <a:latin typeface="Courier New" panose="02070309020205020404" pitchFamily="49" charset="0"/>
+                <a:cs typeface="Courier New" panose="02070309020205020404" pitchFamily="49" charset="0"/>
+              </a:rPr>
+              <a:t>asyncio.sleep</a:t>
+            </a:r>
+            <a:r>
+              <a:rPr kumimoji="0" lang="en-US" altLang="en-US" sz="2200" b="0" i="0" u="none" strike="noStrike" cap="none" normalizeH="0" baseline="0" dirty="0">
+                <a:ln>
+                  <a:noFill/>
+                </a:ln>
+                <a:solidFill>
+                  <a:srgbClr val="000000"/>
+                </a:solidFill>
+                <a:effectLst/>
+                <a:latin typeface="Courier New" panose="02070309020205020404" pitchFamily="49" charset="0"/>
+                <a:cs typeface="Courier New" panose="02070309020205020404" pitchFamily="49" charset="0"/>
+              </a:rPr>
+              <a:t>(</a:t>
+            </a:r>
+            <a:r>
+              <a:rPr kumimoji="0" lang="en-US" altLang="en-US" sz="2200" b="0" i="0" u="none" strike="noStrike" cap="none" normalizeH="0" baseline="0" dirty="0">
+                <a:ln>
+                  <a:noFill/>
+                </a:ln>
+                <a:solidFill>
+                  <a:srgbClr val="0000FF"/>
+                </a:solidFill>
+                <a:effectLst/>
+                <a:latin typeface="Courier New" panose="02070309020205020404" pitchFamily="49" charset="0"/>
+                <a:cs typeface="Courier New" panose="02070309020205020404" pitchFamily="49" charset="0"/>
+              </a:rPr>
+              <a:t>0</a:t>
+            </a:r>
+            <a:r>
+              <a:rPr kumimoji="0" lang="en-US" altLang="en-US" sz="2200" b="0" i="0" u="none" strike="noStrike" cap="none" normalizeH="0" baseline="0" dirty="0">
+                <a:ln>
+                  <a:noFill/>
+                </a:ln>
+                <a:solidFill>
+                  <a:srgbClr val="000000"/>
+                </a:solidFill>
+                <a:effectLst/>
+                <a:latin typeface="Courier New" panose="02070309020205020404" pitchFamily="49" charset="0"/>
+                <a:cs typeface="Courier New" panose="02070309020205020404" pitchFamily="49" charset="0"/>
+              </a:rPr>
+              <a:t>)</a:t>
+            </a:r>
+            <a:br>
+              <a:rPr kumimoji="0" lang="en-US" altLang="en-US" sz="2200" b="0" i="0" u="none" strike="noStrike" cap="none" normalizeH="0" baseline="0" dirty="0">
+                <a:ln>
+                  <a:noFill/>
+                </a:ln>
+                <a:solidFill>
+                  <a:srgbClr val="000000"/>
+                </a:solidFill>
+                <a:effectLst/>
+                <a:latin typeface="Courier New" panose="02070309020205020404" pitchFamily="49" charset="0"/>
+                <a:cs typeface="Courier New" panose="02070309020205020404" pitchFamily="49" charset="0"/>
+              </a:rPr>
+            </a:br>
+            <a:r>
+              <a:rPr kumimoji="0" lang="en-US" altLang="en-US" sz="2200" b="0" i="0" u="none" strike="noStrike" cap="none" normalizeH="0" baseline="0" dirty="0">
+                <a:ln>
+                  <a:noFill/>
+                </a:ln>
+                <a:solidFill>
+                  <a:srgbClr val="000000"/>
+                </a:solidFill>
+                <a:effectLst/>
+                <a:latin typeface="Courier New" panose="02070309020205020404" pitchFamily="49" charset="0"/>
+                <a:cs typeface="Courier New" panose="02070309020205020404" pitchFamily="49" charset="0"/>
+              </a:rPr>
+              <a:t>    </a:t>
+            </a:r>
+            <a:r>
+              <a:rPr kumimoji="0" lang="en-US" altLang="en-US" sz="2200" b="0" i="0" u="none" strike="noStrike" cap="none" normalizeH="0" baseline="0" dirty="0">
+                <a:ln>
+                  <a:noFill/>
+                </a:ln>
+                <a:solidFill>
+                  <a:srgbClr val="000080"/>
+                </a:solidFill>
+                <a:effectLst/>
+                <a:latin typeface="Courier New" panose="02070309020205020404" pitchFamily="49" charset="0"/>
+                <a:cs typeface="Courier New" panose="02070309020205020404" pitchFamily="49" charset="0"/>
+              </a:rPr>
+              <a:t>print</a:t>
+            </a:r>
+            <a:r>
+              <a:rPr kumimoji="0" lang="en-US" altLang="en-US" sz="2200" b="0" i="0" u="none" strike="noStrike" cap="none" normalizeH="0" baseline="0" dirty="0">
+                <a:ln>
+                  <a:noFill/>
+                </a:ln>
+                <a:solidFill>
+                  <a:srgbClr val="000000"/>
+                </a:solidFill>
+                <a:effectLst/>
+                <a:latin typeface="Courier New" panose="02070309020205020404" pitchFamily="49" charset="0"/>
+                <a:cs typeface="Courier New" panose="02070309020205020404" pitchFamily="49" charset="0"/>
+              </a:rPr>
+              <a:t>(</a:t>
+            </a:r>
+            <a:r>
+              <a:rPr kumimoji="0" lang="en-US" altLang="en-US" sz="2200" b="1" i="0" u="none" strike="noStrike" cap="none" normalizeH="0" baseline="0" dirty="0">
+                <a:ln>
+                  <a:noFill/>
+                </a:ln>
+                <a:solidFill>
+                  <a:srgbClr val="008080"/>
+                </a:solidFill>
+                <a:effectLst/>
+                <a:latin typeface="Courier New" panose="02070309020205020404" pitchFamily="49" charset="0"/>
+                <a:cs typeface="Courier New" panose="02070309020205020404" pitchFamily="49" charset="0"/>
+              </a:rPr>
+              <a:t>'Implicit context switch back to bar'</a:t>
+            </a:r>
+            <a:r>
+              <a:rPr kumimoji="0" lang="en-US" altLang="en-US" sz="2200" b="0" i="0" u="none" strike="noStrike" cap="none" normalizeH="0" baseline="0" dirty="0">
+                <a:ln>
+                  <a:noFill/>
+                </a:ln>
+                <a:solidFill>
+                  <a:srgbClr val="000000"/>
+                </a:solidFill>
+                <a:effectLst/>
+                <a:latin typeface="Courier New" panose="02070309020205020404" pitchFamily="49" charset="0"/>
+                <a:cs typeface="Courier New" panose="02070309020205020404" pitchFamily="49" charset="0"/>
+              </a:rPr>
+              <a:t>)</a:t>
+            </a:r>
+            <a:br>
+              <a:rPr kumimoji="0" lang="en-US" altLang="en-US" sz="2200" b="0" i="0" u="none" strike="noStrike" cap="none" normalizeH="0" baseline="0" dirty="0">
+                <a:ln>
+                  <a:noFill/>
+                </a:ln>
+                <a:solidFill>
+                  <a:srgbClr val="000000"/>
+                </a:solidFill>
+                <a:effectLst/>
+                <a:latin typeface="Courier New" panose="02070309020205020404" pitchFamily="49" charset="0"/>
+                <a:cs typeface="Courier New" panose="02070309020205020404" pitchFamily="49" charset="0"/>
+              </a:rPr>
+            </a:br>
+            <a:br>
+              <a:rPr kumimoji="0" lang="en-US" altLang="en-US" sz="2200" b="0" i="0" u="none" strike="noStrike" cap="none" normalizeH="0" baseline="0" dirty="0">
+                <a:ln>
+                  <a:noFill/>
+                </a:ln>
+                <a:solidFill>
+                  <a:srgbClr val="000000"/>
+                </a:solidFill>
+                <a:effectLst/>
+                <a:latin typeface="Courier New" panose="02070309020205020404" pitchFamily="49" charset="0"/>
+                <a:cs typeface="Courier New" panose="02070309020205020404" pitchFamily="49" charset="0"/>
+              </a:rPr>
+            </a:br>
+            <a:r>
+              <a:rPr kumimoji="0" lang="en-US" altLang="en-US" sz="2200" b="0" i="0" u="none" strike="noStrike" cap="none" normalizeH="0" baseline="0" dirty="0" err="1">
+                <a:ln>
+                  <a:noFill/>
+                </a:ln>
+                <a:solidFill>
+                  <a:srgbClr val="000000"/>
+                </a:solidFill>
+                <a:effectLst/>
+                <a:latin typeface="Courier New" panose="02070309020205020404" pitchFamily="49" charset="0"/>
+                <a:cs typeface="Courier New" panose="02070309020205020404" pitchFamily="49" charset="0"/>
+              </a:rPr>
+              <a:t>ioloop</a:t>
+            </a:r>
+            <a:r>
+              <a:rPr kumimoji="0" lang="en-US" altLang="en-US" sz="2200" b="0" i="0" u="none" strike="noStrike" cap="none" normalizeH="0" baseline="0" dirty="0">
+                <a:ln>
+                  <a:noFill/>
+                </a:ln>
+                <a:solidFill>
+                  <a:srgbClr val="000000"/>
+                </a:solidFill>
+                <a:effectLst/>
+                <a:latin typeface="Courier New" panose="02070309020205020404" pitchFamily="49" charset="0"/>
+                <a:cs typeface="Courier New" panose="02070309020205020404" pitchFamily="49" charset="0"/>
+              </a:rPr>
+              <a:t> = </a:t>
+            </a:r>
+            <a:r>
+              <a:rPr kumimoji="0" lang="en-US" altLang="en-US" sz="2200" b="0" i="0" u="none" strike="noStrike" cap="none" normalizeH="0" baseline="0" dirty="0" err="1">
+                <a:ln>
+                  <a:noFill/>
+                </a:ln>
+                <a:solidFill>
+                  <a:srgbClr val="000000"/>
+                </a:solidFill>
+                <a:effectLst/>
+                <a:latin typeface="Courier New" panose="02070309020205020404" pitchFamily="49" charset="0"/>
+                <a:cs typeface="Courier New" panose="02070309020205020404" pitchFamily="49" charset="0"/>
+              </a:rPr>
+              <a:t>asyncio.get_event_loop</a:t>
+            </a:r>
+            <a:r>
+              <a:rPr kumimoji="0" lang="en-US" altLang="en-US" sz="2200" b="0" i="0" u="none" strike="noStrike" cap="none" normalizeH="0" baseline="0" dirty="0">
+                <a:ln>
+                  <a:noFill/>
+                </a:ln>
+                <a:solidFill>
+                  <a:srgbClr val="000000"/>
+                </a:solidFill>
+                <a:effectLst/>
+                <a:latin typeface="Courier New" panose="02070309020205020404" pitchFamily="49" charset="0"/>
+                <a:cs typeface="Courier New" panose="02070309020205020404" pitchFamily="49" charset="0"/>
+              </a:rPr>
+              <a:t>()</a:t>
+            </a:r>
+            <a:br>
+              <a:rPr kumimoji="0" lang="en-US" altLang="en-US" sz="2200" b="0" i="0" u="none" strike="noStrike" cap="none" normalizeH="0" baseline="0" dirty="0">
+                <a:ln>
+                  <a:noFill/>
+                </a:ln>
+                <a:solidFill>
+                  <a:srgbClr val="000000"/>
+                </a:solidFill>
+                <a:effectLst/>
+                <a:latin typeface="Courier New" panose="02070309020205020404" pitchFamily="49" charset="0"/>
+                <a:cs typeface="Courier New" panose="02070309020205020404" pitchFamily="49" charset="0"/>
+              </a:rPr>
+            </a:br>
+            <a:r>
+              <a:rPr kumimoji="0" lang="en-US" altLang="en-US" sz="2200" b="0" i="0" u="none" strike="noStrike" cap="none" normalizeH="0" baseline="0" dirty="0">
+                <a:ln>
+                  <a:noFill/>
+                </a:ln>
+                <a:solidFill>
+                  <a:srgbClr val="000000"/>
+                </a:solidFill>
+                <a:effectLst/>
+                <a:latin typeface="Courier New" panose="02070309020205020404" pitchFamily="49" charset="0"/>
+                <a:cs typeface="Courier New" panose="02070309020205020404" pitchFamily="49" charset="0"/>
+              </a:rPr>
+              <a:t>tasks = [</a:t>
+            </a:r>
+            <a:r>
+              <a:rPr kumimoji="0" lang="en-US" altLang="en-US" sz="2200" b="0" i="0" u="none" strike="noStrike" cap="none" normalizeH="0" baseline="0" dirty="0" err="1">
+                <a:ln>
+                  <a:noFill/>
+                </a:ln>
+                <a:solidFill>
+                  <a:srgbClr val="000000"/>
+                </a:solidFill>
+                <a:effectLst/>
+                <a:latin typeface="Courier New" panose="02070309020205020404" pitchFamily="49" charset="0"/>
+                <a:cs typeface="Courier New" panose="02070309020205020404" pitchFamily="49" charset="0"/>
+              </a:rPr>
+              <a:t>ioloop.create_task</a:t>
+            </a:r>
+            <a:r>
+              <a:rPr kumimoji="0" lang="en-US" altLang="en-US" sz="2200" b="0" i="0" u="none" strike="noStrike" cap="none" normalizeH="0" baseline="0" dirty="0">
+                <a:ln>
+                  <a:noFill/>
+                </a:ln>
+                <a:solidFill>
+                  <a:srgbClr val="000000"/>
+                </a:solidFill>
+                <a:effectLst/>
+                <a:latin typeface="Courier New" panose="02070309020205020404" pitchFamily="49" charset="0"/>
+                <a:cs typeface="Courier New" panose="02070309020205020404" pitchFamily="49" charset="0"/>
+              </a:rPr>
+              <a:t>(foo()), </a:t>
+            </a:r>
+            <a:r>
+              <a:rPr kumimoji="0" lang="en-US" altLang="en-US" sz="2200" b="0" i="0" u="none" strike="noStrike" cap="none" normalizeH="0" baseline="0" dirty="0" err="1">
+                <a:ln>
+                  <a:noFill/>
+                </a:ln>
+                <a:solidFill>
+                  <a:srgbClr val="000000"/>
+                </a:solidFill>
+                <a:effectLst/>
+                <a:latin typeface="Courier New" panose="02070309020205020404" pitchFamily="49" charset="0"/>
+                <a:cs typeface="Courier New" panose="02070309020205020404" pitchFamily="49" charset="0"/>
+              </a:rPr>
+              <a:t>ioloop.create_task</a:t>
+            </a:r>
+            <a:r>
+              <a:rPr kumimoji="0" lang="en-US" altLang="en-US" sz="2200" b="0" i="0" u="none" strike="noStrike" cap="none" normalizeH="0" baseline="0" dirty="0">
+                <a:ln>
+                  <a:noFill/>
+                </a:ln>
+                <a:solidFill>
+                  <a:srgbClr val="000000"/>
+                </a:solidFill>
+                <a:effectLst/>
+                <a:latin typeface="Courier New" panose="02070309020205020404" pitchFamily="49" charset="0"/>
+                <a:cs typeface="Courier New" panose="02070309020205020404" pitchFamily="49" charset="0"/>
+              </a:rPr>
+              <a:t>(bar())]</a:t>
+            </a:r>
+            <a:br>
+              <a:rPr kumimoji="0" lang="en-US" altLang="en-US" sz="2200" b="0" i="0" u="none" strike="noStrike" cap="none" normalizeH="0" baseline="0" dirty="0">
+                <a:ln>
+                  <a:noFill/>
+                </a:ln>
+                <a:solidFill>
+                  <a:srgbClr val="000000"/>
+                </a:solidFill>
+                <a:effectLst/>
+                <a:latin typeface="Courier New" panose="02070309020205020404" pitchFamily="49" charset="0"/>
+                <a:cs typeface="Courier New" panose="02070309020205020404" pitchFamily="49" charset="0"/>
+              </a:rPr>
+            </a:br>
+            <a:r>
+              <a:rPr kumimoji="0" lang="en-US" altLang="en-US" sz="2200" b="0" i="0" u="none" strike="noStrike" cap="none" normalizeH="0" baseline="0" dirty="0" err="1">
+                <a:ln>
+                  <a:noFill/>
+                </a:ln>
+                <a:solidFill>
+                  <a:srgbClr val="000000"/>
+                </a:solidFill>
+                <a:effectLst/>
+                <a:latin typeface="Courier New" panose="02070309020205020404" pitchFamily="49" charset="0"/>
+                <a:cs typeface="Courier New" panose="02070309020205020404" pitchFamily="49" charset="0"/>
+              </a:rPr>
+              <a:t>wait_tasks</a:t>
+            </a:r>
+            <a:r>
+              <a:rPr kumimoji="0" lang="en-US" altLang="en-US" sz="2200" b="0" i="0" u="none" strike="noStrike" cap="none" normalizeH="0" baseline="0" dirty="0">
+                <a:ln>
+                  <a:noFill/>
+                </a:ln>
+                <a:solidFill>
+                  <a:srgbClr val="000000"/>
+                </a:solidFill>
+                <a:effectLst/>
+                <a:latin typeface="Courier New" panose="02070309020205020404" pitchFamily="49" charset="0"/>
+                <a:cs typeface="Courier New" panose="02070309020205020404" pitchFamily="49" charset="0"/>
+              </a:rPr>
+              <a:t> = </a:t>
+            </a:r>
+            <a:r>
+              <a:rPr kumimoji="0" lang="en-US" altLang="en-US" sz="2200" b="0" i="0" u="none" strike="noStrike" cap="none" normalizeH="0" baseline="0" dirty="0" err="1">
+                <a:ln>
+                  <a:noFill/>
+                </a:ln>
+                <a:solidFill>
+                  <a:srgbClr val="000000"/>
+                </a:solidFill>
+                <a:effectLst/>
+                <a:latin typeface="Courier New" panose="02070309020205020404" pitchFamily="49" charset="0"/>
+                <a:cs typeface="Courier New" panose="02070309020205020404" pitchFamily="49" charset="0"/>
+              </a:rPr>
+              <a:t>asyncio.wait</a:t>
+            </a:r>
+            <a:r>
+              <a:rPr kumimoji="0" lang="en-US" altLang="en-US" sz="2200" b="0" i="0" u="none" strike="noStrike" cap="none" normalizeH="0" baseline="0" dirty="0">
+                <a:ln>
+                  <a:noFill/>
+                </a:ln>
+                <a:solidFill>
+                  <a:srgbClr val="000000"/>
+                </a:solidFill>
+                <a:effectLst/>
+                <a:latin typeface="Courier New" panose="02070309020205020404" pitchFamily="49" charset="0"/>
+                <a:cs typeface="Courier New" panose="02070309020205020404" pitchFamily="49" charset="0"/>
+              </a:rPr>
+              <a:t>(tasks)</a:t>
+            </a:r>
+            <a:br>
+              <a:rPr kumimoji="0" lang="en-US" altLang="en-US" sz="2200" b="0" i="0" u="none" strike="noStrike" cap="none" normalizeH="0" baseline="0" dirty="0">
+                <a:ln>
+                  <a:noFill/>
+                </a:ln>
+                <a:solidFill>
+                  <a:srgbClr val="000000"/>
+                </a:solidFill>
+                <a:effectLst/>
+                <a:latin typeface="Courier New" panose="02070309020205020404" pitchFamily="49" charset="0"/>
+                <a:cs typeface="Courier New" panose="02070309020205020404" pitchFamily="49" charset="0"/>
+              </a:rPr>
+            </a:br>
+            <a:r>
+              <a:rPr kumimoji="0" lang="en-US" altLang="en-US" sz="2200" b="0" i="0" u="none" strike="noStrike" cap="none" normalizeH="0" baseline="0" dirty="0" err="1">
+                <a:ln>
+                  <a:noFill/>
+                </a:ln>
+                <a:solidFill>
+                  <a:srgbClr val="000000"/>
+                </a:solidFill>
+                <a:effectLst/>
+                <a:latin typeface="Courier New" panose="02070309020205020404" pitchFamily="49" charset="0"/>
+                <a:cs typeface="Courier New" panose="02070309020205020404" pitchFamily="49" charset="0"/>
+              </a:rPr>
+              <a:t>ioloop.run_until_complete</a:t>
+            </a:r>
+            <a:r>
+              <a:rPr kumimoji="0" lang="en-US" altLang="en-US" sz="2200" b="0" i="0" u="none" strike="noStrike" cap="none" normalizeH="0" baseline="0" dirty="0">
+                <a:ln>
+                  <a:noFill/>
+                </a:ln>
+                <a:solidFill>
+                  <a:srgbClr val="000000"/>
+                </a:solidFill>
+                <a:effectLst/>
+                <a:latin typeface="Courier New" panose="02070309020205020404" pitchFamily="49" charset="0"/>
+                <a:cs typeface="Courier New" panose="02070309020205020404" pitchFamily="49" charset="0"/>
+              </a:rPr>
+              <a:t>(</a:t>
+            </a:r>
+            <a:r>
+              <a:rPr kumimoji="0" lang="en-US" altLang="en-US" sz="2200" b="0" i="0" u="none" strike="noStrike" cap="none" normalizeH="0" baseline="0" dirty="0" err="1">
+                <a:ln>
+                  <a:noFill/>
+                </a:ln>
+                <a:solidFill>
+                  <a:srgbClr val="000000"/>
+                </a:solidFill>
+                <a:effectLst/>
+                <a:latin typeface="Courier New" panose="02070309020205020404" pitchFamily="49" charset="0"/>
+                <a:cs typeface="Courier New" panose="02070309020205020404" pitchFamily="49" charset="0"/>
+              </a:rPr>
+              <a:t>wait_tasks</a:t>
+            </a:r>
+            <a:r>
+              <a:rPr kumimoji="0" lang="en-US" altLang="en-US" sz="2200" b="0" i="0" u="none" strike="noStrike" cap="none" normalizeH="0" baseline="0" dirty="0">
+                <a:ln>
+                  <a:noFill/>
+                </a:ln>
+                <a:solidFill>
+                  <a:srgbClr val="000000"/>
+                </a:solidFill>
+                <a:effectLst/>
+                <a:latin typeface="Courier New" panose="02070309020205020404" pitchFamily="49" charset="0"/>
+                <a:cs typeface="Courier New" panose="02070309020205020404" pitchFamily="49" charset="0"/>
+              </a:rPr>
+              <a:t>)</a:t>
+            </a:r>
+            <a:br>
+              <a:rPr kumimoji="0" lang="en-US" altLang="en-US" sz="2200" b="0" i="0" u="none" strike="noStrike" cap="none" normalizeH="0" baseline="0" dirty="0">
+                <a:ln>
+                  <a:noFill/>
+                </a:ln>
+                <a:solidFill>
+                  <a:srgbClr val="000000"/>
+                </a:solidFill>
+                <a:effectLst/>
+                <a:latin typeface="Courier New" panose="02070309020205020404" pitchFamily="49" charset="0"/>
+                <a:cs typeface="Courier New" panose="02070309020205020404" pitchFamily="49" charset="0"/>
+              </a:rPr>
+            </a:br>
+            <a:r>
+              <a:rPr kumimoji="0" lang="en-US" altLang="en-US" sz="2200" b="0" i="0" u="none" strike="noStrike" cap="none" normalizeH="0" baseline="0" dirty="0" err="1">
+                <a:ln>
+                  <a:noFill/>
+                </a:ln>
+                <a:solidFill>
+                  <a:srgbClr val="000000"/>
+                </a:solidFill>
+                <a:effectLst/>
+                <a:latin typeface="Courier New" panose="02070309020205020404" pitchFamily="49" charset="0"/>
+                <a:cs typeface="Courier New" panose="02070309020205020404" pitchFamily="49" charset="0"/>
+              </a:rPr>
+              <a:t>ioloop.close</a:t>
+            </a:r>
+            <a:r>
+              <a:rPr kumimoji="0" lang="en-US" altLang="en-US" sz="2200" b="0" i="0" u="none" strike="noStrike" cap="none" normalizeH="0" baseline="0" dirty="0">
+                <a:ln>
+                  <a:noFill/>
+                </a:ln>
+                <a:solidFill>
+                  <a:srgbClr val="000000"/>
+                </a:solidFill>
+                <a:effectLst/>
+                <a:latin typeface="Courier New" panose="02070309020205020404" pitchFamily="49" charset="0"/>
+                <a:cs typeface="Courier New" panose="02070309020205020404" pitchFamily="49" charset="0"/>
+              </a:rPr>
+              <a:t>()</a:t>
+            </a:r>
+            <a:endParaRPr kumimoji="0" lang="en-US" altLang="en-US" sz="2200" b="0" i="0" u="none" strike="noStrike" cap="none" normalizeH="0" baseline="0" dirty="0">
+              <a:ln>
+                <a:noFill/>
+              </a:ln>
+              <a:solidFill>
+                <a:schemeClr val="tx1"/>
+              </a:solidFill>
+              <a:effectLst/>
+              <a:latin typeface="Arial" panose="020B0604020202020204" pitchFamily="34" charset="0"/>
+            </a:endParaRPr>
           </a:p>
         </p:txBody>
       </p:sp>
     </p:spTree>
     <p:extLst>
       <p:ext uri="{BB962C8B-B14F-4D97-AF65-F5344CB8AC3E}">
-        <p14:creationId xmlns:p14="http://schemas.microsoft.com/office/powerpoint/2010/main" val="3067029963"/>
+        <p14:creationId xmlns:p14="http://schemas.microsoft.com/office/powerpoint/2010/main" val="2016140997"/>
       </p:ext>
     </p:extLst>
   </p:cSld>
@@ -6611,1210 +7521,76 @@
       </p:sp>
       <p:sp>
         <p:nvSpPr>
-          <p:cNvPr id="5" name="Rectangle 2"/>
-          <p:cNvSpPr>
-            <a:spLocks noChangeArrowheads="1"/>
-          </p:cNvSpPr>
+          <p:cNvPr id="4" name="Rectangle 3"/>
+          <p:cNvSpPr/>
           <p:nvPr/>
         </p:nvSpPr>
-        <p:spPr bwMode="auto">
+        <p:spPr>
           <a:xfrm>
-            <a:off x="278296" y="1040821"/>
-            <a:ext cx="9884607" cy="5847755"/>
+            <a:off x="520053" y="1465594"/>
+            <a:ext cx="11236518" cy="3903504"/>
           </a:xfrm>
           <a:prstGeom prst="rect">
             <a:avLst/>
           </a:prstGeom>
-          <a:solidFill>
-            <a:srgbClr val="FFFFFF"/>
-          </a:solidFill>
-          <a:ln>
-            <a:noFill/>
-          </a:ln>
-          <a:effectLst/>
-          <a:extLst>
-            <a:ext uri="{91240B29-F687-4F45-9708-019B960494DF}">
-              <a14:hiddenLine xmlns:a14="http://schemas.microsoft.com/office/drawing/2010/main" w="9525">
-                <a:solidFill>
-                  <a:schemeClr val="tx1"/>
-                </a:solidFill>
-                <a:miter lim="800000"/>
-                <a:headEnd/>
-                <a:tailEnd/>
-              </a14:hiddenLine>
-            </a:ext>
-            <a:ext uri="{AF507438-7753-43E0-B8FC-AC1667EBCBE1}">
-              <a14:hiddenEffects xmlns:a14="http://schemas.microsoft.com/office/drawing/2010/main">
-                <a:effectLst>
-                  <a:outerShdw dist="35921" dir="2700000" algn="ctr" rotWithShape="0">
-                    <a:schemeClr val="bg2"/>
-                  </a:outerShdw>
-                </a:effectLst>
-              </a14:hiddenEffects>
-            </a:ext>
-          </a:extLst>
         </p:spPr>
         <p:txBody>
-          <a:bodyPr vert="horz" wrap="square" lIns="91440" tIns="45720" rIns="91440" bIns="45720" numCol="1" anchor="ctr" anchorCtr="0" compatLnSpc="1">
-            <a:prstTxWarp prst="textNoShape">
-              <a:avLst/>
-            </a:prstTxWarp>
+          <a:bodyPr wrap="square">
             <a:spAutoFit/>
           </a:bodyPr>
           <a:lstStyle/>
           <a:p>
-            <a:pPr marL="0" marR="0" lvl="0" indent="0" algn="l" defTabSz="914400" rtl="0" eaLnBrk="0" fontAlgn="base" latinLnBrk="0" hangingPunct="0">
+            <a:pPr marL="457200" indent="-457200">
               <a:lnSpc>
-                <a:spcPct val="100000"/>
+                <a:spcPct val="150000"/>
               </a:lnSpc>
-              <a:spcBef>
-                <a:spcPct val="0"/>
-              </a:spcBef>
-              <a:spcAft>
-                <a:spcPct val="0"/>
-              </a:spcAft>
-              <a:buClrTx/>
-              <a:buSzTx/>
-              <a:buFontTx/>
-              <a:buNone/>
-              <a:tabLst/>
+              <a:buFont typeface="Arial" panose="020B0604020202020204" pitchFamily="34" charset="0"/>
+              <a:buChar char="•"/>
             </a:pPr>
             <a:r>
-              <a:rPr kumimoji="0" lang="en-US" altLang="en-US" sz="2200" b="1" i="0" u="none" strike="noStrike" cap="none" normalizeH="0" baseline="0" dirty="0" smtClean="0">
-                <a:ln>
-                  <a:noFill/>
-                </a:ln>
-                <a:solidFill>
-                  <a:srgbClr val="000080"/>
-                </a:solidFill>
-                <a:effectLst/>
-                <a:latin typeface="Courier New" panose="02070309020205020404" pitchFamily="49" charset="0"/>
-                <a:cs typeface="Courier New" panose="02070309020205020404" pitchFamily="49" charset="0"/>
-              </a:rPr>
-              <a:t>import </a:t>
-            </a:r>
-            <a:r>
-              <a:rPr kumimoji="0" lang="en-US" altLang="en-US" sz="2200" b="0" i="0" u="none" strike="noStrike" cap="none" normalizeH="0" baseline="0" dirty="0" err="1" smtClean="0">
-                <a:ln>
-                  <a:noFill/>
-                </a:ln>
-                <a:solidFill>
-                  <a:srgbClr val="000000"/>
-                </a:solidFill>
-                <a:effectLst/>
-                <a:latin typeface="Courier New" panose="02070309020205020404" pitchFamily="49" charset="0"/>
-                <a:cs typeface="Courier New" panose="02070309020205020404" pitchFamily="49" charset="0"/>
-              </a:rPr>
-              <a:t>asyncio</a:t>
-            </a:r>
-            <a:r>
-              <a:rPr kumimoji="0" lang="en-US" altLang="en-US" sz="2200" b="0" i="0" u="none" strike="noStrike" cap="none" normalizeH="0" baseline="0" dirty="0" smtClean="0">
-                <a:ln>
-                  <a:noFill/>
-                </a:ln>
-                <a:solidFill>
-                  <a:srgbClr val="000000"/>
-                </a:solidFill>
-                <a:effectLst/>
-                <a:latin typeface="Courier New" panose="02070309020205020404" pitchFamily="49" charset="0"/>
-                <a:cs typeface="Courier New" panose="02070309020205020404" pitchFamily="49" charset="0"/>
-              </a:rPr>
-              <a:t/>
-            </a:r>
-            <a:br>
-              <a:rPr kumimoji="0" lang="en-US" altLang="en-US" sz="2200" b="0" i="0" u="none" strike="noStrike" cap="none" normalizeH="0" baseline="0" dirty="0" smtClean="0">
-                <a:ln>
-                  <a:noFill/>
-                </a:ln>
-                <a:solidFill>
-                  <a:srgbClr val="000000"/>
-                </a:solidFill>
-                <a:effectLst/>
-                <a:latin typeface="Courier New" panose="02070309020205020404" pitchFamily="49" charset="0"/>
-                <a:cs typeface="Courier New" panose="02070309020205020404" pitchFamily="49" charset="0"/>
-              </a:rPr>
-            </a:br>
-            <a:r>
-              <a:rPr kumimoji="0" lang="en-US" altLang="en-US" sz="2200" b="1" i="0" u="none" strike="noStrike" cap="none" normalizeH="0" baseline="0" dirty="0" err="1" smtClean="0">
-                <a:ln>
-                  <a:noFill/>
-                </a:ln>
-                <a:solidFill>
-                  <a:srgbClr val="000080"/>
-                </a:solidFill>
-                <a:effectLst/>
-                <a:latin typeface="Courier New" panose="02070309020205020404" pitchFamily="49" charset="0"/>
-                <a:cs typeface="Courier New" panose="02070309020205020404" pitchFamily="49" charset="0"/>
-              </a:rPr>
-              <a:t>async</a:t>
-            </a:r>
-            <a:r>
-              <a:rPr kumimoji="0" lang="en-US" altLang="en-US" sz="2200" b="1" i="0" u="none" strike="noStrike" cap="none" normalizeH="0" baseline="0" dirty="0" smtClean="0">
-                <a:ln>
-                  <a:noFill/>
-                </a:ln>
-                <a:solidFill>
-                  <a:srgbClr val="000080"/>
-                </a:solidFill>
-                <a:effectLst/>
-                <a:latin typeface="Courier New" panose="02070309020205020404" pitchFamily="49" charset="0"/>
-                <a:cs typeface="Courier New" panose="02070309020205020404" pitchFamily="49" charset="0"/>
-              </a:rPr>
-              <a:t> </a:t>
-            </a:r>
-            <a:r>
-              <a:rPr kumimoji="0" lang="en-US" altLang="en-US" sz="2200" b="1" i="0" u="none" strike="noStrike" cap="none" normalizeH="0" baseline="0" dirty="0" err="1" smtClean="0">
-                <a:ln>
-                  <a:noFill/>
-                </a:ln>
-                <a:solidFill>
-                  <a:srgbClr val="000080"/>
-                </a:solidFill>
-                <a:effectLst/>
-                <a:latin typeface="Courier New" panose="02070309020205020404" pitchFamily="49" charset="0"/>
-                <a:cs typeface="Courier New" panose="02070309020205020404" pitchFamily="49" charset="0"/>
-              </a:rPr>
-              <a:t>def</a:t>
-            </a:r>
-            <a:r>
-              <a:rPr kumimoji="0" lang="en-US" altLang="en-US" sz="2200" b="1" i="0" u="none" strike="noStrike" cap="none" normalizeH="0" baseline="0" dirty="0" smtClean="0">
-                <a:ln>
-                  <a:noFill/>
-                </a:ln>
-                <a:solidFill>
-                  <a:srgbClr val="000080"/>
-                </a:solidFill>
-                <a:effectLst/>
-                <a:latin typeface="Courier New" panose="02070309020205020404" pitchFamily="49" charset="0"/>
-                <a:cs typeface="Courier New" panose="02070309020205020404" pitchFamily="49" charset="0"/>
-              </a:rPr>
-              <a:t> </a:t>
-            </a:r>
-            <a:r>
-              <a:rPr kumimoji="0" lang="en-US" altLang="en-US" sz="2200" b="0" i="0" u="none" strike="noStrike" cap="none" normalizeH="0" baseline="0" dirty="0" smtClean="0">
-                <a:ln>
-                  <a:noFill/>
-                </a:ln>
-                <a:solidFill>
-                  <a:srgbClr val="000000"/>
-                </a:solidFill>
-                <a:effectLst/>
-                <a:latin typeface="Courier New" panose="02070309020205020404" pitchFamily="49" charset="0"/>
-                <a:cs typeface="Courier New" panose="02070309020205020404" pitchFamily="49" charset="0"/>
-              </a:rPr>
-              <a:t>foo():</a:t>
-            </a:r>
-            <a:br>
-              <a:rPr kumimoji="0" lang="en-US" altLang="en-US" sz="2200" b="0" i="0" u="none" strike="noStrike" cap="none" normalizeH="0" baseline="0" dirty="0" smtClean="0">
-                <a:ln>
-                  <a:noFill/>
-                </a:ln>
-                <a:solidFill>
-                  <a:srgbClr val="000000"/>
-                </a:solidFill>
-                <a:effectLst/>
-                <a:latin typeface="Courier New" panose="02070309020205020404" pitchFamily="49" charset="0"/>
-                <a:cs typeface="Courier New" panose="02070309020205020404" pitchFamily="49" charset="0"/>
-              </a:rPr>
-            </a:br>
-            <a:r>
-              <a:rPr kumimoji="0" lang="en-US" altLang="en-US" sz="2200" b="0" i="0" u="none" strike="noStrike" cap="none" normalizeH="0" baseline="0" dirty="0" smtClean="0">
-                <a:ln>
-                  <a:noFill/>
-                </a:ln>
-                <a:solidFill>
-                  <a:srgbClr val="000000"/>
-                </a:solidFill>
-                <a:effectLst/>
-                <a:latin typeface="Courier New" panose="02070309020205020404" pitchFamily="49" charset="0"/>
-                <a:cs typeface="Courier New" panose="02070309020205020404" pitchFamily="49" charset="0"/>
-              </a:rPr>
-              <a:t>    </a:t>
-            </a:r>
-            <a:r>
-              <a:rPr kumimoji="0" lang="en-US" altLang="en-US" sz="2200" b="0" i="0" u="none" strike="noStrike" cap="none" normalizeH="0" baseline="0" dirty="0" smtClean="0">
-                <a:ln>
-                  <a:noFill/>
-                </a:ln>
-                <a:solidFill>
-                  <a:srgbClr val="000080"/>
-                </a:solidFill>
-                <a:effectLst/>
-                <a:latin typeface="Courier New" panose="02070309020205020404" pitchFamily="49" charset="0"/>
-                <a:cs typeface="Courier New" panose="02070309020205020404" pitchFamily="49" charset="0"/>
-              </a:rPr>
-              <a:t>print</a:t>
-            </a:r>
-            <a:r>
-              <a:rPr kumimoji="0" lang="en-US" altLang="en-US" sz="2200" b="0" i="0" u="none" strike="noStrike" cap="none" normalizeH="0" baseline="0" dirty="0" smtClean="0">
-                <a:ln>
-                  <a:noFill/>
-                </a:ln>
-                <a:solidFill>
-                  <a:srgbClr val="000000"/>
-                </a:solidFill>
-                <a:effectLst/>
-                <a:latin typeface="Courier New" panose="02070309020205020404" pitchFamily="49" charset="0"/>
-                <a:cs typeface="Courier New" panose="02070309020205020404" pitchFamily="49" charset="0"/>
-              </a:rPr>
-              <a:t>(</a:t>
-            </a:r>
-            <a:r>
-              <a:rPr kumimoji="0" lang="en-US" altLang="en-US" sz="2200" b="1" i="0" u="none" strike="noStrike" cap="none" normalizeH="0" baseline="0" dirty="0" smtClean="0">
-                <a:ln>
-                  <a:noFill/>
-                </a:ln>
-                <a:solidFill>
-                  <a:srgbClr val="008080"/>
-                </a:solidFill>
-                <a:effectLst/>
-                <a:latin typeface="Courier New" panose="02070309020205020404" pitchFamily="49" charset="0"/>
-                <a:cs typeface="Courier New" panose="02070309020205020404" pitchFamily="49" charset="0"/>
-              </a:rPr>
-              <a:t>'Running in foo'</a:t>
-            </a:r>
-            <a:r>
-              <a:rPr kumimoji="0" lang="en-US" altLang="en-US" sz="2200" b="0" i="0" u="none" strike="noStrike" cap="none" normalizeH="0" baseline="0" dirty="0" smtClean="0">
-                <a:ln>
-                  <a:noFill/>
-                </a:ln>
-                <a:solidFill>
-                  <a:srgbClr val="000000"/>
-                </a:solidFill>
-                <a:effectLst/>
-                <a:latin typeface="Courier New" panose="02070309020205020404" pitchFamily="49" charset="0"/>
-                <a:cs typeface="Courier New" panose="02070309020205020404" pitchFamily="49" charset="0"/>
-              </a:rPr>
-              <a:t>)</a:t>
-            </a:r>
-            <a:br>
-              <a:rPr kumimoji="0" lang="en-US" altLang="en-US" sz="2200" b="0" i="0" u="none" strike="noStrike" cap="none" normalizeH="0" baseline="0" dirty="0" smtClean="0">
-                <a:ln>
-                  <a:noFill/>
-                </a:ln>
-                <a:solidFill>
-                  <a:srgbClr val="000000"/>
-                </a:solidFill>
-                <a:effectLst/>
-                <a:latin typeface="Courier New" panose="02070309020205020404" pitchFamily="49" charset="0"/>
-                <a:cs typeface="Courier New" panose="02070309020205020404" pitchFamily="49" charset="0"/>
-              </a:rPr>
-            </a:br>
-            <a:r>
-              <a:rPr kumimoji="0" lang="en-US" altLang="en-US" sz="2200" b="0" i="0" u="none" strike="noStrike" cap="none" normalizeH="0" baseline="0" dirty="0" smtClean="0">
-                <a:ln>
-                  <a:noFill/>
-                </a:ln>
-                <a:solidFill>
-                  <a:srgbClr val="000000"/>
-                </a:solidFill>
-                <a:effectLst/>
-                <a:latin typeface="Courier New" panose="02070309020205020404" pitchFamily="49" charset="0"/>
-                <a:cs typeface="Courier New" panose="02070309020205020404" pitchFamily="49" charset="0"/>
-              </a:rPr>
-              <a:t>    </a:t>
-            </a:r>
-            <a:r>
-              <a:rPr kumimoji="0" lang="en-US" altLang="en-US" sz="2200" b="1" i="0" u="none" strike="noStrike" cap="none" normalizeH="0" baseline="0" dirty="0" smtClean="0">
-                <a:ln>
-                  <a:noFill/>
-                </a:ln>
-                <a:solidFill>
-                  <a:srgbClr val="000080"/>
-                </a:solidFill>
-                <a:effectLst/>
-                <a:latin typeface="Courier New" panose="02070309020205020404" pitchFamily="49" charset="0"/>
-                <a:cs typeface="Courier New" panose="02070309020205020404" pitchFamily="49" charset="0"/>
-              </a:rPr>
-              <a:t>await </a:t>
-            </a:r>
-            <a:r>
-              <a:rPr kumimoji="0" lang="en-US" altLang="en-US" sz="2200" b="0" i="0" u="none" strike="noStrike" cap="none" normalizeH="0" baseline="0" dirty="0" err="1" smtClean="0">
-                <a:ln>
-                  <a:noFill/>
-                </a:ln>
-                <a:solidFill>
-                  <a:srgbClr val="000000"/>
-                </a:solidFill>
-                <a:effectLst/>
-                <a:latin typeface="Courier New" panose="02070309020205020404" pitchFamily="49" charset="0"/>
-                <a:cs typeface="Courier New" panose="02070309020205020404" pitchFamily="49" charset="0"/>
-              </a:rPr>
-              <a:t>asyncio.sleep</a:t>
-            </a:r>
-            <a:r>
-              <a:rPr kumimoji="0" lang="en-US" altLang="en-US" sz="2200" b="0" i="0" u="none" strike="noStrike" cap="none" normalizeH="0" baseline="0" dirty="0" smtClean="0">
-                <a:ln>
-                  <a:noFill/>
-                </a:ln>
-                <a:solidFill>
-                  <a:srgbClr val="000000"/>
-                </a:solidFill>
-                <a:effectLst/>
-                <a:latin typeface="Courier New" panose="02070309020205020404" pitchFamily="49" charset="0"/>
-                <a:cs typeface="Courier New" panose="02070309020205020404" pitchFamily="49" charset="0"/>
-              </a:rPr>
-              <a:t>(</a:t>
-            </a:r>
-            <a:r>
-              <a:rPr kumimoji="0" lang="en-US" altLang="en-US" sz="2200" b="0" i="0" u="none" strike="noStrike" cap="none" normalizeH="0" baseline="0" dirty="0" smtClean="0">
-                <a:ln>
-                  <a:noFill/>
-                </a:ln>
-                <a:solidFill>
-                  <a:srgbClr val="0000FF"/>
-                </a:solidFill>
-                <a:effectLst/>
-                <a:latin typeface="Courier New" panose="02070309020205020404" pitchFamily="49" charset="0"/>
-                <a:cs typeface="Courier New" panose="02070309020205020404" pitchFamily="49" charset="0"/>
-              </a:rPr>
-              <a:t>0</a:t>
-            </a:r>
-            <a:r>
-              <a:rPr kumimoji="0" lang="en-US" altLang="en-US" sz="2200" b="0" i="0" u="none" strike="noStrike" cap="none" normalizeH="0" baseline="0" dirty="0" smtClean="0">
-                <a:ln>
-                  <a:noFill/>
-                </a:ln>
-                <a:solidFill>
-                  <a:srgbClr val="000000"/>
-                </a:solidFill>
-                <a:effectLst/>
-                <a:latin typeface="Courier New" panose="02070309020205020404" pitchFamily="49" charset="0"/>
-                <a:cs typeface="Courier New" panose="02070309020205020404" pitchFamily="49" charset="0"/>
-              </a:rPr>
-              <a:t>)</a:t>
-            </a:r>
-            <a:br>
-              <a:rPr kumimoji="0" lang="en-US" altLang="en-US" sz="2200" b="0" i="0" u="none" strike="noStrike" cap="none" normalizeH="0" baseline="0" dirty="0" smtClean="0">
-                <a:ln>
-                  <a:noFill/>
-                </a:ln>
-                <a:solidFill>
-                  <a:srgbClr val="000000"/>
-                </a:solidFill>
-                <a:effectLst/>
-                <a:latin typeface="Courier New" panose="02070309020205020404" pitchFamily="49" charset="0"/>
-                <a:cs typeface="Courier New" panose="02070309020205020404" pitchFamily="49" charset="0"/>
-              </a:rPr>
-            </a:br>
-            <a:r>
-              <a:rPr kumimoji="0" lang="en-US" altLang="en-US" sz="2200" b="0" i="0" u="none" strike="noStrike" cap="none" normalizeH="0" baseline="0" dirty="0" smtClean="0">
-                <a:ln>
-                  <a:noFill/>
-                </a:ln>
-                <a:solidFill>
-                  <a:srgbClr val="000000"/>
-                </a:solidFill>
-                <a:effectLst/>
-                <a:latin typeface="Courier New" panose="02070309020205020404" pitchFamily="49" charset="0"/>
-                <a:cs typeface="Courier New" panose="02070309020205020404" pitchFamily="49" charset="0"/>
-              </a:rPr>
-              <a:t>    </a:t>
-            </a:r>
-            <a:r>
-              <a:rPr kumimoji="0" lang="en-US" altLang="en-US" sz="2200" b="0" i="0" u="none" strike="noStrike" cap="none" normalizeH="0" baseline="0" dirty="0" smtClean="0">
-                <a:ln>
-                  <a:noFill/>
-                </a:ln>
-                <a:solidFill>
-                  <a:srgbClr val="000080"/>
-                </a:solidFill>
-                <a:effectLst/>
-                <a:latin typeface="Courier New" panose="02070309020205020404" pitchFamily="49" charset="0"/>
-                <a:cs typeface="Courier New" panose="02070309020205020404" pitchFamily="49" charset="0"/>
-              </a:rPr>
-              <a:t>print</a:t>
-            </a:r>
-            <a:r>
-              <a:rPr kumimoji="0" lang="en-US" altLang="en-US" sz="2200" b="0" i="0" u="none" strike="noStrike" cap="none" normalizeH="0" baseline="0" dirty="0" smtClean="0">
-                <a:ln>
-                  <a:noFill/>
-                </a:ln>
-                <a:solidFill>
-                  <a:srgbClr val="000000"/>
-                </a:solidFill>
-                <a:effectLst/>
-                <a:latin typeface="Courier New" panose="02070309020205020404" pitchFamily="49" charset="0"/>
-                <a:cs typeface="Courier New" panose="02070309020205020404" pitchFamily="49" charset="0"/>
-              </a:rPr>
-              <a:t>(</a:t>
-            </a:r>
-            <a:r>
-              <a:rPr kumimoji="0" lang="en-US" altLang="en-US" sz="2200" b="1" i="0" u="none" strike="noStrike" cap="none" normalizeH="0" baseline="0" dirty="0" smtClean="0">
-                <a:ln>
-                  <a:noFill/>
-                </a:ln>
-                <a:solidFill>
-                  <a:srgbClr val="008080"/>
-                </a:solidFill>
-                <a:effectLst/>
-                <a:latin typeface="Courier New" panose="02070309020205020404" pitchFamily="49" charset="0"/>
-                <a:cs typeface="Courier New" panose="02070309020205020404" pitchFamily="49" charset="0"/>
-              </a:rPr>
-              <a:t>'Explicit context switch to foo again'</a:t>
-            </a:r>
-            <a:r>
-              <a:rPr kumimoji="0" lang="en-US" altLang="en-US" sz="2200" b="0" i="0" u="none" strike="noStrike" cap="none" normalizeH="0" baseline="0" dirty="0" smtClean="0">
-                <a:ln>
-                  <a:noFill/>
-                </a:ln>
-                <a:solidFill>
-                  <a:srgbClr val="000000"/>
-                </a:solidFill>
-                <a:effectLst/>
-                <a:latin typeface="Courier New" panose="02070309020205020404" pitchFamily="49" charset="0"/>
-                <a:cs typeface="Courier New" panose="02070309020205020404" pitchFamily="49" charset="0"/>
-              </a:rPr>
-              <a:t>)</a:t>
-            </a:r>
-            <a:br>
-              <a:rPr kumimoji="0" lang="en-US" altLang="en-US" sz="2200" b="0" i="0" u="none" strike="noStrike" cap="none" normalizeH="0" baseline="0" dirty="0" smtClean="0">
-                <a:ln>
-                  <a:noFill/>
-                </a:ln>
-                <a:solidFill>
-                  <a:srgbClr val="000000"/>
-                </a:solidFill>
-                <a:effectLst/>
-                <a:latin typeface="Courier New" panose="02070309020205020404" pitchFamily="49" charset="0"/>
-                <a:cs typeface="Courier New" panose="02070309020205020404" pitchFamily="49" charset="0"/>
-              </a:rPr>
-            </a:br>
-            <a:r>
-              <a:rPr kumimoji="0" lang="en-US" altLang="en-US" sz="2200" b="0" i="0" u="none" strike="noStrike" cap="none" normalizeH="0" baseline="0" dirty="0" smtClean="0">
-                <a:ln>
-                  <a:noFill/>
-                </a:ln>
-                <a:solidFill>
-                  <a:srgbClr val="000000"/>
-                </a:solidFill>
-                <a:effectLst/>
-                <a:latin typeface="Courier New" panose="02070309020205020404" pitchFamily="49" charset="0"/>
-                <a:cs typeface="Courier New" panose="02070309020205020404" pitchFamily="49" charset="0"/>
-              </a:rPr>
-              <a:t/>
-            </a:r>
-            <a:br>
-              <a:rPr kumimoji="0" lang="en-US" altLang="en-US" sz="2200" b="0" i="0" u="none" strike="noStrike" cap="none" normalizeH="0" baseline="0" dirty="0" smtClean="0">
-                <a:ln>
-                  <a:noFill/>
-                </a:ln>
-                <a:solidFill>
-                  <a:srgbClr val="000000"/>
-                </a:solidFill>
-                <a:effectLst/>
-                <a:latin typeface="Courier New" panose="02070309020205020404" pitchFamily="49" charset="0"/>
-                <a:cs typeface="Courier New" panose="02070309020205020404" pitchFamily="49" charset="0"/>
-              </a:rPr>
-            </a:br>
-            <a:r>
-              <a:rPr kumimoji="0" lang="en-US" altLang="en-US" sz="2200" b="1" i="0" u="none" strike="noStrike" cap="none" normalizeH="0" baseline="0" dirty="0" err="1" smtClean="0">
-                <a:ln>
-                  <a:noFill/>
-                </a:ln>
-                <a:solidFill>
-                  <a:srgbClr val="000080"/>
-                </a:solidFill>
-                <a:effectLst/>
-                <a:latin typeface="Courier New" panose="02070309020205020404" pitchFamily="49" charset="0"/>
-                <a:cs typeface="Courier New" panose="02070309020205020404" pitchFamily="49" charset="0"/>
-              </a:rPr>
-              <a:t>async</a:t>
-            </a:r>
-            <a:r>
-              <a:rPr kumimoji="0" lang="en-US" altLang="en-US" sz="2200" b="1" i="0" u="none" strike="noStrike" cap="none" normalizeH="0" baseline="0" dirty="0" smtClean="0">
-                <a:ln>
-                  <a:noFill/>
-                </a:ln>
-                <a:solidFill>
-                  <a:srgbClr val="000080"/>
-                </a:solidFill>
-                <a:effectLst/>
-                <a:latin typeface="Courier New" panose="02070309020205020404" pitchFamily="49" charset="0"/>
-                <a:cs typeface="Courier New" panose="02070309020205020404" pitchFamily="49" charset="0"/>
-              </a:rPr>
-              <a:t> </a:t>
-            </a:r>
-            <a:r>
-              <a:rPr kumimoji="0" lang="en-US" altLang="en-US" sz="2200" b="1" i="0" u="none" strike="noStrike" cap="none" normalizeH="0" baseline="0" dirty="0" err="1" smtClean="0">
-                <a:ln>
-                  <a:noFill/>
-                </a:ln>
-                <a:solidFill>
-                  <a:srgbClr val="000080"/>
-                </a:solidFill>
-                <a:effectLst/>
-                <a:latin typeface="Courier New" panose="02070309020205020404" pitchFamily="49" charset="0"/>
-                <a:cs typeface="Courier New" panose="02070309020205020404" pitchFamily="49" charset="0"/>
-              </a:rPr>
-              <a:t>def</a:t>
-            </a:r>
-            <a:r>
-              <a:rPr kumimoji="0" lang="en-US" altLang="en-US" sz="2200" b="1" i="0" u="none" strike="noStrike" cap="none" normalizeH="0" baseline="0" dirty="0" smtClean="0">
-                <a:ln>
-                  <a:noFill/>
-                </a:ln>
-                <a:solidFill>
-                  <a:srgbClr val="000080"/>
-                </a:solidFill>
-                <a:effectLst/>
-                <a:latin typeface="Courier New" panose="02070309020205020404" pitchFamily="49" charset="0"/>
-                <a:cs typeface="Courier New" panose="02070309020205020404" pitchFamily="49" charset="0"/>
-              </a:rPr>
-              <a:t> </a:t>
-            </a:r>
-            <a:r>
-              <a:rPr kumimoji="0" lang="en-US" altLang="en-US" sz="2200" b="0" i="0" u="none" strike="noStrike" cap="none" normalizeH="0" baseline="0" dirty="0" smtClean="0">
-                <a:ln>
-                  <a:noFill/>
-                </a:ln>
-                <a:solidFill>
-                  <a:srgbClr val="000000"/>
-                </a:solidFill>
-                <a:effectLst/>
-                <a:latin typeface="Courier New" panose="02070309020205020404" pitchFamily="49" charset="0"/>
-                <a:cs typeface="Courier New" panose="02070309020205020404" pitchFamily="49" charset="0"/>
-              </a:rPr>
-              <a:t>bar():</a:t>
-            </a:r>
-            <a:br>
-              <a:rPr kumimoji="0" lang="en-US" altLang="en-US" sz="2200" b="0" i="0" u="none" strike="noStrike" cap="none" normalizeH="0" baseline="0" dirty="0" smtClean="0">
-                <a:ln>
-                  <a:noFill/>
-                </a:ln>
-                <a:solidFill>
-                  <a:srgbClr val="000000"/>
-                </a:solidFill>
-                <a:effectLst/>
-                <a:latin typeface="Courier New" panose="02070309020205020404" pitchFamily="49" charset="0"/>
-                <a:cs typeface="Courier New" panose="02070309020205020404" pitchFamily="49" charset="0"/>
-              </a:rPr>
-            </a:br>
-            <a:r>
-              <a:rPr kumimoji="0" lang="en-US" altLang="en-US" sz="2200" b="0" i="0" u="none" strike="noStrike" cap="none" normalizeH="0" baseline="0" dirty="0" smtClean="0">
-                <a:ln>
-                  <a:noFill/>
-                </a:ln>
-                <a:solidFill>
-                  <a:srgbClr val="000000"/>
-                </a:solidFill>
-                <a:effectLst/>
-                <a:latin typeface="Courier New" panose="02070309020205020404" pitchFamily="49" charset="0"/>
-                <a:cs typeface="Courier New" panose="02070309020205020404" pitchFamily="49" charset="0"/>
-              </a:rPr>
-              <a:t>    </a:t>
-            </a:r>
-            <a:r>
-              <a:rPr kumimoji="0" lang="en-US" altLang="en-US" sz="2200" b="0" i="0" u="none" strike="noStrike" cap="none" normalizeH="0" baseline="0" dirty="0" smtClean="0">
-                <a:ln>
-                  <a:noFill/>
-                </a:ln>
-                <a:solidFill>
-                  <a:srgbClr val="000080"/>
-                </a:solidFill>
-                <a:effectLst/>
-                <a:latin typeface="Courier New" panose="02070309020205020404" pitchFamily="49" charset="0"/>
-                <a:cs typeface="Courier New" panose="02070309020205020404" pitchFamily="49" charset="0"/>
-              </a:rPr>
-              <a:t>print</a:t>
-            </a:r>
-            <a:r>
-              <a:rPr kumimoji="0" lang="en-US" altLang="en-US" sz="2200" b="0" i="0" u="none" strike="noStrike" cap="none" normalizeH="0" baseline="0" dirty="0" smtClean="0">
-                <a:ln>
-                  <a:noFill/>
-                </a:ln>
-                <a:solidFill>
-                  <a:srgbClr val="000000"/>
-                </a:solidFill>
-                <a:effectLst/>
-                <a:latin typeface="Courier New" panose="02070309020205020404" pitchFamily="49" charset="0"/>
-                <a:cs typeface="Courier New" panose="02070309020205020404" pitchFamily="49" charset="0"/>
-              </a:rPr>
-              <a:t>(</a:t>
-            </a:r>
-            <a:r>
-              <a:rPr kumimoji="0" lang="en-US" altLang="en-US" sz="2200" b="1" i="0" u="none" strike="noStrike" cap="none" normalizeH="0" baseline="0" dirty="0" smtClean="0">
-                <a:ln>
-                  <a:noFill/>
-                </a:ln>
-                <a:solidFill>
-                  <a:srgbClr val="008080"/>
-                </a:solidFill>
-                <a:effectLst/>
-                <a:latin typeface="Courier New" panose="02070309020205020404" pitchFamily="49" charset="0"/>
-                <a:cs typeface="Courier New" panose="02070309020205020404" pitchFamily="49" charset="0"/>
-              </a:rPr>
-              <a:t>'Explicit context to bar'</a:t>
-            </a:r>
-            <a:r>
-              <a:rPr kumimoji="0" lang="en-US" altLang="en-US" sz="2200" b="0" i="0" u="none" strike="noStrike" cap="none" normalizeH="0" baseline="0" dirty="0" smtClean="0">
-                <a:ln>
-                  <a:noFill/>
-                </a:ln>
-                <a:solidFill>
-                  <a:srgbClr val="000000"/>
-                </a:solidFill>
-                <a:effectLst/>
-                <a:latin typeface="Courier New" panose="02070309020205020404" pitchFamily="49" charset="0"/>
-                <a:cs typeface="Courier New" panose="02070309020205020404" pitchFamily="49" charset="0"/>
-              </a:rPr>
-              <a:t>)</a:t>
-            </a:r>
-            <a:br>
-              <a:rPr kumimoji="0" lang="en-US" altLang="en-US" sz="2200" b="0" i="0" u="none" strike="noStrike" cap="none" normalizeH="0" baseline="0" dirty="0" smtClean="0">
-                <a:ln>
-                  <a:noFill/>
-                </a:ln>
-                <a:solidFill>
-                  <a:srgbClr val="000000"/>
-                </a:solidFill>
-                <a:effectLst/>
-                <a:latin typeface="Courier New" panose="02070309020205020404" pitchFamily="49" charset="0"/>
-                <a:cs typeface="Courier New" panose="02070309020205020404" pitchFamily="49" charset="0"/>
-              </a:rPr>
-            </a:br>
-            <a:r>
-              <a:rPr kumimoji="0" lang="en-US" altLang="en-US" sz="2200" b="0" i="0" u="none" strike="noStrike" cap="none" normalizeH="0" baseline="0" dirty="0" smtClean="0">
-                <a:ln>
-                  <a:noFill/>
-                </a:ln>
-                <a:solidFill>
-                  <a:srgbClr val="000000"/>
-                </a:solidFill>
-                <a:effectLst/>
-                <a:latin typeface="Courier New" panose="02070309020205020404" pitchFamily="49" charset="0"/>
-                <a:cs typeface="Courier New" panose="02070309020205020404" pitchFamily="49" charset="0"/>
-              </a:rPr>
-              <a:t>    </a:t>
-            </a:r>
-            <a:r>
-              <a:rPr kumimoji="0" lang="en-US" altLang="en-US" sz="2200" b="1" i="0" u="none" strike="noStrike" cap="none" normalizeH="0" baseline="0" dirty="0" smtClean="0">
-                <a:ln>
-                  <a:noFill/>
-                </a:ln>
-                <a:solidFill>
-                  <a:srgbClr val="000080"/>
-                </a:solidFill>
-                <a:effectLst/>
-                <a:latin typeface="Courier New" panose="02070309020205020404" pitchFamily="49" charset="0"/>
-                <a:cs typeface="Courier New" panose="02070309020205020404" pitchFamily="49" charset="0"/>
-              </a:rPr>
-              <a:t>await </a:t>
-            </a:r>
-            <a:r>
-              <a:rPr kumimoji="0" lang="en-US" altLang="en-US" sz="2200" b="0" i="0" u="none" strike="noStrike" cap="none" normalizeH="0" baseline="0" dirty="0" err="1" smtClean="0">
-                <a:ln>
-                  <a:noFill/>
-                </a:ln>
-                <a:solidFill>
-                  <a:srgbClr val="000000"/>
-                </a:solidFill>
-                <a:effectLst/>
-                <a:latin typeface="Courier New" panose="02070309020205020404" pitchFamily="49" charset="0"/>
-                <a:cs typeface="Courier New" panose="02070309020205020404" pitchFamily="49" charset="0"/>
-              </a:rPr>
-              <a:t>asyncio.sleep</a:t>
-            </a:r>
-            <a:r>
-              <a:rPr kumimoji="0" lang="en-US" altLang="en-US" sz="2200" b="0" i="0" u="none" strike="noStrike" cap="none" normalizeH="0" baseline="0" dirty="0" smtClean="0">
-                <a:ln>
-                  <a:noFill/>
-                </a:ln>
-                <a:solidFill>
-                  <a:srgbClr val="000000"/>
-                </a:solidFill>
-                <a:effectLst/>
-                <a:latin typeface="Courier New" panose="02070309020205020404" pitchFamily="49" charset="0"/>
-                <a:cs typeface="Courier New" panose="02070309020205020404" pitchFamily="49" charset="0"/>
-              </a:rPr>
-              <a:t>(</a:t>
-            </a:r>
-            <a:r>
-              <a:rPr kumimoji="0" lang="en-US" altLang="en-US" sz="2200" b="0" i="0" u="none" strike="noStrike" cap="none" normalizeH="0" baseline="0" dirty="0" smtClean="0">
-                <a:ln>
-                  <a:noFill/>
-                </a:ln>
-                <a:solidFill>
-                  <a:srgbClr val="0000FF"/>
-                </a:solidFill>
-                <a:effectLst/>
-                <a:latin typeface="Courier New" panose="02070309020205020404" pitchFamily="49" charset="0"/>
-                <a:cs typeface="Courier New" panose="02070309020205020404" pitchFamily="49" charset="0"/>
-              </a:rPr>
-              <a:t>0</a:t>
-            </a:r>
-            <a:r>
-              <a:rPr kumimoji="0" lang="en-US" altLang="en-US" sz="2200" b="0" i="0" u="none" strike="noStrike" cap="none" normalizeH="0" baseline="0" dirty="0" smtClean="0">
-                <a:ln>
-                  <a:noFill/>
-                </a:ln>
-                <a:solidFill>
-                  <a:srgbClr val="000000"/>
-                </a:solidFill>
-                <a:effectLst/>
-                <a:latin typeface="Courier New" panose="02070309020205020404" pitchFamily="49" charset="0"/>
-                <a:cs typeface="Courier New" panose="02070309020205020404" pitchFamily="49" charset="0"/>
-              </a:rPr>
-              <a:t>)</a:t>
-            </a:r>
-            <a:br>
-              <a:rPr kumimoji="0" lang="en-US" altLang="en-US" sz="2200" b="0" i="0" u="none" strike="noStrike" cap="none" normalizeH="0" baseline="0" dirty="0" smtClean="0">
-                <a:ln>
-                  <a:noFill/>
-                </a:ln>
-                <a:solidFill>
-                  <a:srgbClr val="000000"/>
-                </a:solidFill>
-                <a:effectLst/>
-                <a:latin typeface="Courier New" panose="02070309020205020404" pitchFamily="49" charset="0"/>
-                <a:cs typeface="Courier New" panose="02070309020205020404" pitchFamily="49" charset="0"/>
-              </a:rPr>
-            </a:br>
-            <a:r>
-              <a:rPr kumimoji="0" lang="en-US" altLang="en-US" sz="2200" b="0" i="0" u="none" strike="noStrike" cap="none" normalizeH="0" baseline="0" dirty="0" smtClean="0">
-                <a:ln>
-                  <a:noFill/>
-                </a:ln>
-                <a:solidFill>
-                  <a:srgbClr val="000000"/>
-                </a:solidFill>
-                <a:effectLst/>
-                <a:latin typeface="Courier New" panose="02070309020205020404" pitchFamily="49" charset="0"/>
-                <a:cs typeface="Courier New" panose="02070309020205020404" pitchFamily="49" charset="0"/>
-              </a:rPr>
-              <a:t>    </a:t>
-            </a:r>
-            <a:r>
-              <a:rPr kumimoji="0" lang="en-US" altLang="en-US" sz="2200" b="0" i="0" u="none" strike="noStrike" cap="none" normalizeH="0" baseline="0" dirty="0" smtClean="0">
-                <a:ln>
-                  <a:noFill/>
-                </a:ln>
-                <a:solidFill>
-                  <a:srgbClr val="000080"/>
-                </a:solidFill>
-                <a:effectLst/>
-                <a:latin typeface="Courier New" panose="02070309020205020404" pitchFamily="49" charset="0"/>
-                <a:cs typeface="Courier New" panose="02070309020205020404" pitchFamily="49" charset="0"/>
-              </a:rPr>
-              <a:t>print</a:t>
-            </a:r>
-            <a:r>
-              <a:rPr kumimoji="0" lang="en-US" altLang="en-US" sz="2200" b="0" i="0" u="none" strike="noStrike" cap="none" normalizeH="0" baseline="0" dirty="0" smtClean="0">
-                <a:ln>
-                  <a:noFill/>
-                </a:ln>
-                <a:solidFill>
-                  <a:srgbClr val="000000"/>
-                </a:solidFill>
-                <a:effectLst/>
-                <a:latin typeface="Courier New" panose="02070309020205020404" pitchFamily="49" charset="0"/>
-                <a:cs typeface="Courier New" panose="02070309020205020404" pitchFamily="49" charset="0"/>
-              </a:rPr>
-              <a:t>(</a:t>
-            </a:r>
-            <a:r>
-              <a:rPr kumimoji="0" lang="en-US" altLang="en-US" sz="2200" b="1" i="0" u="none" strike="noStrike" cap="none" normalizeH="0" baseline="0" dirty="0" smtClean="0">
-                <a:ln>
-                  <a:noFill/>
-                </a:ln>
-                <a:solidFill>
-                  <a:srgbClr val="008080"/>
-                </a:solidFill>
-                <a:effectLst/>
-                <a:latin typeface="Courier New" panose="02070309020205020404" pitchFamily="49" charset="0"/>
-                <a:cs typeface="Courier New" panose="02070309020205020404" pitchFamily="49" charset="0"/>
-              </a:rPr>
-              <a:t>'Implicit context switch back to bar'</a:t>
-            </a:r>
-            <a:r>
-              <a:rPr kumimoji="0" lang="en-US" altLang="en-US" sz="2200" b="0" i="0" u="none" strike="noStrike" cap="none" normalizeH="0" baseline="0" dirty="0" smtClean="0">
-                <a:ln>
-                  <a:noFill/>
-                </a:ln>
-                <a:solidFill>
-                  <a:srgbClr val="000000"/>
-                </a:solidFill>
-                <a:effectLst/>
-                <a:latin typeface="Courier New" panose="02070309020205020404" pitchFamily="49" charset="0"/>
-                <a:cs typeface="Courier New" panose="02070309020205020404" pitchFamily="49" charset="0"/>
-              </a:rPr>
-              <a:t>)</a:t>
-            </a:r>
-            <a:br>
-              <a:rPr kumimoji="0" lang="en-US" altLang="en-US" sz="2200" b="0" i="0" u="none" strike="noStrike" cap="none" normalizeH="0" baseline="0" dirty="0" smtClean="0">
-                <a:ln>
-                  <a:noFill/>
-                </a:ln>
-                <a:solidFill>
-                  <a:srgbClr val="000000"/>
-                </a:solidFill>
-                <a:effectLst/>
-                <a:latin typeface="Courier New" panose="02070309020205020404" pitchFamily="49" charset="0"/>
-                <a:cs typeface="Courier New" panose="02070309020205020404" pitchFamily="49" charset="0"/>
-              </a:rPr>
-            </a:br>
-            <a:r>
-              <a:rPr kumimoji="0" lang="en-US" altLang="en-US" sz="2200" b="0" i="0" u="none" strike="noStrike" cap="none" normalizeH="0" baseline="0" dirty="0" smtClean="0">
-                <a:ln>
-                  <a:noFill/>
-                </a:ln>
-                <a:solidFill>
-                  <a:srgbClr val="000000"/>
-                </a:solidFill>
-                <a:effectLst/>
-                <a:latin typeface="Courier New" panose="02070309020205020404" pitchFamily="49" charset="0"/>
-                <a:cs typeface="Courier New" panose="02070309020205020404" pitchFamily="49" charset="0"/>
-              </a:rPr>
-              <a:t/>
-            </a:r>
-            <a:br>
-              <a:rPr kumimoji="0" lang="en-US" altLang="en-US" sz="2200" b="0" i="0" u="none" strike="noStrike" cap="none" normalizeH="0" baseline="0" dirty="0" smtClean="0">
-                <a:ln>
-                  <a:noFill/>
-                </a:ln>
-                <a:solidFill>
-                  <a:srgbClr val="000000"/>
-                </a:solidFill>
-                <a:effectLst/>
-                <a:latin typeface="Courier New" panose="02070309020205020404" pitchFamily="49" charset="0"/>
-                <a:cs typeface="Courier New" panose="02070309020205020404" pitchFamily="49" charset="0"/>
-              </a:rPr>
-            </a:br>
-            <a:r>
-              <a:rPr kumimoji="0" lang="en-US" altLang="en-US" sz="2200" b="0" i="0" u="none" strike="noStrike" cap="none" normalizeH="0" baseline="0" dirty="0" err="1" smtClean="0">
-                <a:ln>
-                  <a:noFill/>
-                </a:ln>
-                <a:solidFill>
-                  <a:srgbClr val="000000"/>
-                </a:solidFill>
-                <a:effectLst/>
-                <a:latin typeface="Courier New" panose="02070309020205020404" pitchFamily="49" charset="0"/>
-                <a:cs typeface="Courier New" panose="02070309020205020404" pitchFamily="49" charset="0"/>
-              </a:rPr>
-              <a:t>ioloop</a:t>
-            </a:r>
-            <a:r>
-              <a:rPr kumimoji="0" lang="en-US" altLang="en-US" sz="2200" b="0" i="0" u="none" strike="noStrike" cap="none" normalizeH="0" baseline="0" dirty="0" smtClean="0">
-                <a:ln>
-                  <a:noFill/>
-                </a:ln>
-                <a:solidFill>
-                  <a:srgbClr val="000000"/>
-                </a:solidFill>
-                <a:effectLst/>
-                <a:latin typeface="Courier New" panose="02070309020205020404" pitchFamily="49" charset="0"/>
-                <a:cs typeface="Courier New" panose="02070309020205020404" pitchFamily="49" charset="0"/>
-              </a:rPr>
-              <a:t> = </a:t>
-            </a:r>
-            <a:r>
-              <a:rPr kumimoji="0" lang="en-US" altLang="en-US" sz="2200" b="0" i="0" u="none" strike="noStrike" cap="none" normalizeH="0" baseline="0" dirty="0" err="1" smtClean="0">
-                <a:ln>
-                  <a:noFill/>
-                </a:ln>
-                <a:solidFill>
-                  <a:srgbClr val="000000"/>
-                </a:solidFill>
-                <a:effectLst/>
-                <a:latin typeface="Courier New" panose="02070309020205020404" pitchFamily="49" charset="0"/>
-                <a:cs typeface="Courier New" panose="02070309020205020404" pitchFamily="49" charset="0"/>
-              </a:rPr>
-              <a:t>asyncio.get_event_loop</a:t>
-            </a:r>
-            <a:r>
-              <a:rPr kumimoji="0" lang="en-US" altLang="en-US" sz="2200" b="0" i="0" u="none" strike="noStrike" cap="none" normalizeH="0" baseline="0" dirty="0" smtClean="0">
-                <a:ln>
-                  <a:noFill/>
-                </a:ln>
-                <a:solidFill>
-                  <a:srgbClr val="000000"/>
-                </a:solidFill>
-                <a:effectLst/>
-                <a:latin typeface="Courier New" panose="02070309020205020404" pitchFamily="49" charset="0"/>
-                <a:cs typeface="Courier New" panose="02070309020205020404" pitchFamily="49" charset="0"/>
-              </a:rPr>
-              <a:t>()</a:t>
-            </a:r>
-            <a:br>
-              <a:rPr kumimoji="0" lang="en-US" altLang="en-US" sz="2200" b="0" i="0" u="none" strike="noStrike" cap="none" normalizeH="0" baseline="0" dirty="0" smtClean="0">
-                <a:ln>
-                  <a:noFill/>
-                </a:ln>
-                <a:solidFill>
-                  <a:srgbClr val="000000"/>
-                </a:solidFill>
-                <a:effectLst/>
-                <a:latin typeface="Courier New" panose="02070309020205020404" pitchFamily="49" charset="0"/>
-                <a:cs typeface="Courier New" panose="02070309020205020404" pitchFamily="49" charset="0"/>
-              </a:rPr>
-            </a:br>
-            <a:r>
-              <a:rPr kumimoji="0" lang="en-US" altLang="en-US" sz="2200" b="0" i="0" u="none" strike="noStrike" cap="none" normalizeH="0" baseline="0" dirty="0" smtClean="0">
-                <a:ln>
-                  <a:noFill/>
-                </a:ln>
-                <a:solidFill>
-                  <a:srgbClr val="000000"/>
-                </a:solidFill>
-                <a:effectLst/>
-                <a:latin typeface="Courier New" panose="02070309020205020404" pitchFamily="49" charset="0"/>
-                <a:cs typeface="Courier New" panose="02070309020205020404" pitchFamily="49" charset="0"/>
-              </a:rPr>
-              <a:t>tasks = [</a:t>
-            </a:r>
-            <a:r>
-              <a:rPr kumimoji="0" lang="en-US" altLang="en-US" sz="2200" b="0" i="0" u="none" strike="noStrike" cap="none" normalizeH="0" baseline="0" dirty="0" err="1" smtClean="0">
-                <a:ln>
-                  <a:noFill/>
-                </a:ln>
-                <a:solidFill>
-                  <a:srgbClr val="000000"/>
-                </a:solidFill>
-                <a:effectLst/>
-                <a:latin typeface="Courier New" panose="02070309020205020404" pitchFamily="49" charset="0"/>
-                <a:cs typeface="Courier New" panose="02070309020205020404" pitchFamily="49" charset="0"/>
-              </a:rPr>
-              <a:t>ioloop.create_task</a:t>
-            </a:r>
-            <a:r>
-              <a:rPr kumimoji="0" lang="en-US" altLang="en-US" sz="2200" b="0" i="0" u="none" strike="noStrike" cap="none" normalizeH="0" baseline="0" dirty="0" smtClean="0">
-                <a:ln>
-                  <a:noFill/>
-                </a:ln>
-                <a:solidFill>
-                  <a:srgbClr val="000000"/>
-                </a:solidFill>
-                <a:effectLst/>
-                <a:latin typeface="Courier New" panose="02070309020205020404" pitchFamily="49" charset="0"/>
-                <a:cs typeface="Courier New" panose="02070309020205020404" pitchFamily="49" charset="0"/>
-              </a:rPr>
-              <a:t>(foo()), </a:t>
-            </a:r>
-            <a:r>
-              <a:rPr kumimoji="0" lang="en-US" altLang="en-US" sz="2200" b="0" i="0" u="none" strike="noStrike" cap="none" normalizeH="0" baseline="0" dirty="0" err="1" smtClean="0">
-                <a:ln>
-                  <a:noFill/>
-                </a:ln>
-                <a:solidFill>
-                  <a:srgbClr val="000000"/>
-                </a:solidFill>
-                <a:effectLst/>
-                <a:latin typeface="Courier New" panose="02070309020205020404" pitchFamily="49" charset="0"/>
-                <a:cs typeface="Courier New" panose="02070309020205020404" pitchFamily="49" charset="0"/>
-              </a:rPr>
-              <a:t>ioloop.create_task</a:t>
-            </a:r>
-            <a:r>
-              <a:rPr kumimoji="0" lang="en-US" altLang="en-US" sz="2200" b="0" i="0" u="none" strike="noStrike" cap="none" normalizeH="0" baseline="0" dirty="0" smtClean="0">
-                <a:ln>
-                  <a:noFill/>
-                </a:ln>
-                <a:solidFill>
-                  <a:srgbClr val="000000"/>
-                </a:solidFill>
-                <a:effectLst/>
-                <a:latin typeface="Courier New" panose="02070309020205020404" pitchFamily="49" charset="0"/>
-                <a:cs typeface="Courier New" panose="02070309020205020404" pitchFamily="49" charset="0"/>
-              </a:rPr>
-              <a:t>(bar())]</a:t>
-            </a:r>
-            <a:br>
-              <a:rPr kumimoji="0" lang="en-US" altLang="en-US" sz="2200" b="0" i="0" u="none" strike="noStrike" cap="none" normalizeH="0" baseline="0" dirty="0" smtClean="0">
-                <a:ln>
-                  <a:noFill/>
-                </a:ln>
-                <a:solidFill>
-                  <a:srgbClr val="000000"/>
-                </a:solidFill>
-                <a:effectLst/>
-                <a:latin typeface="Courier New" panose="02070309020205020404" pitchFamily="49" charset="0"/>
-                <a:cs typeface="Courier New" panose="02070309020205020404" pitchFamily="49" charset="0"/>
-              </a:rPr>
-            </a:br>
-            <a:r>
-              <a:rPr kumimoji="0" lang="en-US" altLang="en-US" sz="2200" b="0" i="0" u="none" strike="noStrike" cap="none" normalizeH="0" baseline="0" dirty="0" err="1" smtClean="0">
-                <a:ln>
-                  <a:noFill/>
-                </a:ln>
-                <a:solidFill>
-                  <a:srgbClr val="000000"/>
-                </a:solidFill>
-                <a:effectLst/>
-                <a:latin typeface="Courier New" panose="02070309020205020404" pitchFamily="49" charset="0"/>
-                <a:cs typeface="Courier New" panose="02070309020205020404" pitchFamily="49" charset="0"/>
-              </a:rPr>
-              <a:t>wait_tasks</a:t>
-            </a:r>
-            <a:r>
-              <a:rPr kumimoji="0" lang="en-US" altLang="en-US" sz="2200" b="0" i="0" u="none" strike="noStrike" cap="none" normalizeH="0" baseline="0" dirty="0" smtClean="0">
-                <a:ln>
-                  <a:noFill/>
-                </a:ln>
-                <a:solidFill>
-                  <a:srgbClr val="000000"/>
-                </a:solidFill>
-                <a:effectLst/>
-                <a:latin typeface="Courier New" panose="02070309020205020404" pitchFamily="49" charset="0"/>
-                <a:cs typeface="Courier New" panose="02070309020205020404" pitchFamily="49" charset="0"/>
-              </a:rPr>
-              <a:t> = </a:t>
-            </a:r>
-            <a:r>
-              <a:rPr kumimoji="0" lang="en-US" altLang="en-US" sz="2200" b="0" i="0" u="none" strike="noStrike" cap="none" normalizeH="0" baseline="0" dirty="0" err="1" smtClean="0">
-                <a:ln>
-                  <a:noFill/>
-                </a:ln>
-                <a:solidFill>
-                  <a:srgbClr val="000000"/>
-                </a:solidFill>
-                <a:effectLst/>
-                <a:latin typeface="Courier New" panose="02070309020205020404" pitchFamily="49" charset="0"/>
-                <a:cs typeface="Courier New" panose="02070309020205020404" pitchFamily="49" charset="0"/>
-              </a:rPr>
-              <a:t>asyncio.wait</a:t>
-            </a:r>
-            <a:r>
-              <a:rPr kumimoji="0" lang="en-US" altLang="en-US" sz="2200" b="0" i="0" u="none" strike="noStrike" cap="none" normalizeH="0" baseline="0" dirty="0" smtClean="0">
-                <a:ln>
-                  <a:noFill/>
-                </a:ln>
-                <a:solidFill>
-                  <a:srgbClr val="000000"/>
-                </a:solidFill>
-                <a:effectLst/>
-                <a:latin typeface="Courier New" panose="02070309020205020404" pitchFamily="49" charset="0"/>
-                <a:cs typeface="Courier New" panose="02070309020205020404" pitchFamily="49" charset="0"/>
-              </a:rPr>
-              <a:t>(tasks)</a:t>
-            </a:r>
-            <a:br>
-              <a:rPr kumimoji="0" lang="en-US" altLang="en-US" sz="2200" b="0" i="0" u="none" strike="noStrike" cap="none" normalizeH="0" baseline="0" dirty="0" smtClean="0">
-                <a:ln>
-                  <a:noFill/>
-                </a:ln>
-                <a:solidFill>
-                  <a:srgbClr val="000000"/>
-                </a:solidFill>
-                <a:effectLst/>
-                <a:latin typeface="Courier New" panose="02070309020205020404" pitchFamily="49" charset="0"/>
-                <a:cs typeface="Courier New" panose="02070309020205020404" pitchFamily="49" charset="0"/>
-              </a:rPr>
-            </a:br>
-            <a:r>
-              <a:rPr kumimoji="0" lang="en-US" altLang="en-US" sz="2200" b="0" i="0" u="none" strike="noStrike" cap="none" normalizeH="0" baseline="0" dirty="0" err="1" smtClean="0">
-                <a:ln>
-                  <a:noFill/>
-                </a:ln>
-                <a:solidFill>
-                  <a:srgbClr val="000000"/>
-                </a:solidFill>
-                <a:effectLst/>
-                <a:latin typeface="Courier New" panose="02070309020205020404" pitchFamily="49" charset="0"/>
-                <a:cs typeface="Courier New" panose="02070309020205020404" pitchFamily="49" charset="0"/>
-              </a:rPr>
-              <a:t>ioloop.run_until_complete</a:t>
-            </a:r>
-            <a:r>
-              <a:rPr kumimoji="0" lang="en-US" altLang="en-US" sz="2200" b="0" i="0" u="none" strike="noStrike" cap="none" normalizeH="0" baseline="0" dirty="0" smtClean="0">
-                <a:ln>
-                  <a:noFill/>
-                </a:ln>
-                <a:solidFill>
-                  <a:srgbClr val="000000"/>
-                </a:solidFill>
-                <a:effectLst/>
-                <a:latin typeface="Courier New" panose="02070309020205020404" pitchFamily="49" charset="0"/>
-                <a:cs typeface="Courier New" panose="02070309020205020404" pitchFamily="49" charset="0"/>
-              </a:rPr>
-              <a:t>(</a:t>
-            </a:r>
-            <a:r>
-              <a:rPr kumimoji="0" lang="en-US" altLang="en-US" sz="2200" b="0" i="0" u="none" strike="noStrike" cap="none" normalizeH="0" baseline="0" dirty="0" err="1" smtClean="0">
-                <a:ln>
-                  <a:noFill/>
-                </a:ln>
-                <a:solidFill>
-                  <a:srgbClr val="000000"/>
-                </a:solidFill>
-                <a:effectLst/>
-                <a:latin typeface="Courier New" panose="02070309020205020404" pitchFamily="49" charset="0"/>
-                <a:cs typeface="Courier New" panose="02070309020205020404" pitchFamily="49" charset="0"/>
-              </a:rPr>
-              <a:t>wait_tasks</a:t>
-            </a:r>
-            <a:r>
-              <a:rPr kumimoji="0" lang="en-US" altLang="en-US" sz="2200" b="0" i="0" u="none" strike="noStrike" cap="none" normalizeH="0" baseline="0" dirty="0" smtClean="0">
-                <a:ln>
-                  <a:noFill/>
-                </a:ln>
-                <a:solidFill>
-                  <a:srgbClr val="000000"/>
-                </a:solidFill>
-                <a:effectLst/>
-                <a:latin typeface="Courier New" panose="02070309020205020404" pitchFamily="49" charset="0"/>
-                <a:cs typeface="Courier New" panose="02070309020205020404" pitchFamily="49" charset="0"/>
-              </a:rPr>
-              <a:t>)</a:t>
-            </a:r>
-            <a:br>
-              <a:rPr kumimoji="0" lang="en-US" altLang="en-US" sz="2200" b="0" i="0" u="none" strike="noStrike" cap="none" normalizeH="0" baseline="0" dirty="0" smtClean="0">
-                <a:ln>
-                  <a:noFill/>
-                </a:ln>
-                <a:solidFill>
-                  <a:srgbClr val="000000"/>
-                </a:solidFill>
-                <a:effectLst/>
-                <a:latin typeface="Courier New" panose="02070309020205020404" pitchFamily="49" charset="0"/>
-                <a:cs typeface="Courier New" panose="02070309020205020404" pitchFamily="49" charset="0"/>
-              </a:rPr>
-            </a:br>
-            <a:r>
-              <a:rPr kumimoji="0" lang="en-US" altLang="en-US" sz="2200" b="0" i="0" u="none" strike="noStrike" cap="none" normalizeH="0" baseline="0" dirty="0" err="1" smtClean="0">
-                <a:ln>
-                  <a:noFill/>
-                </a:ln>
-                <a:solidFill>
-                  <a:srgbClr val="000000"/>
-                </a:solidFill>
-                <a:effectLst/>
-                <a:latin typeface="Courier New" panose="02070309020205020404" pitchFamily="49" charset="0"/>
-                <a:cs typeface="Courier New" panose="02070309020205020404" pitchFamily="49" charset="0"/>
-              </a:rPr>
-              <a:t>ioloop.close</a:t>
-            </a:r>
-            <a:r>
-              <a:rPr kumimoji="0" lang="en-US" altLang="en-US" sz="2200" b="0" i="0" u="none" strike="noStrike" cap="none" normalizeH="0" baseline="0" dirty="0" smtClean="0">
-                <a:ln>
-                  <a:noFill/>
-                </a:ln>
-                <a:solidFill>
-                  <a:srgbClr val="000000"/>
-                </a:solidFill>
-                <a:effectLst/>
-                <a:latin typeface="Courier New" panose="02070309020205020404" pitchFamily="49" charset="0"/>
-                <a:cs typeface="Courier New" panose="02070309020205020404" pitchFamily="49" charset="0"/>
-              </a:rPr>
-              <a:t>()</a:t>
-            </a:r>
-            <a:endParaRPr kumimoji="0" lang="en-US" altLang="en-US" sz="2200" b="0" i="0" u="none" strike="noStrike" cap="none" normalizeH="0" baseline="0" dirty="0" smtClean="0">
-              <a:ln>
-                <a:noFill/>
-              </a:ln>
-              <a:solidFill>
-                <a:schemeClr val="tx1"/>
-              </a:solidFill>
-              <a:effectLst/>
-              <a:latin typeface="Arial" panose="020B0604020202020204" pitchFamily="34" charset="0"/>
-            </a:endParaRPr>
+              <a:rPr lang="en-US" sz="2800" dirty="0" err="1"/>
+              <a:t>Coroutines</a:t>
+            </a:r>
+            <a:r>
+              <a:rPr lang="en-US" sz="2800" dirty="0"/>
+              <a:t> are special functions that work similarly to Python generators, on await they release the flow of control back to the event loop. A </a:t>
+            </a:r>
+            <a:r>
+              <a:rPr lang="en-US" sz="2800" dirty="0" err="1"/>
+              <a:t>coroutine</a:t>
+            </a:r>
+            <a:r>
+              <a:rPr lang="en-US" sz="2800" dirty="0"/>
+              <a:t> needs to be scheduled to run on the event loop, once scheduled </a:t>
+            </a:r>
+            <a:r>
+              <a:rPr lang="en-US" sz="2800" dirty="0" err="1"/>
+              <a:t>coroutines</a:t>
+            </a:r>
+            <a:r>
+              <a:rPr lang="en-US" sz="2800" dirty="0"/>
+              <a:t> are wrapped in Tasks which is a type of Future.</a:t>
+            </a:r>
+          </a:p>
+          <a:p>
+            <a:pPr marL="457200" indent="-457200">
+              <a:lnSpc>
+                <a:spcPct val="150000"/>
+              </a:lnSpc>
+              <a:buFont typeface="Arial" panose="020B0604020202020204" pitchFamily="34" charset="0"/>
+              <a:buChar char="•"/>
+            </a:pPr>
+            <a:r>
+              <a:rPr lang="en-US" sz="2800" dirty="0"/>
+              <a:t>Futures are objects that represent the result of a task that may or may not have been executed. This result may be an exception.</a:t>
+            </a:r>
           </a:p>
         </p:txBody>
       </p:sp>
     </p:spTree>
     <p:extLst>
       <p:ext uri="{BB962C8B-B14F-4D97-AF65-F5344CB8AC3E}">
-        <p14:creationId xmlns:p14="http://schemas.microsoft.com/office/powerpoint/2010/main" val="2016140997"/>
+        <p14:creationId xmlns:p14="http://schemas.microsoft.com/office/powerpoint/2010/main" val="308581619"/>
       </p:ext>
     </p:extLst>
   </p:cSld>
@@ -7912,12 +7688,8 @@
               <a:buChar char="•"/>
             </a:pPr>
             <a:r>
-              <a:rPr lang="en-US" sz="2800" dirty="0" err="1"/>
-              <a:t>Coroutines</a:t>
-            </a:r>
-            <a:r>
               <a:rPr lang="en-US" sz="2800" dirty="0"/>
-              <a:t> are special functions that work similarly to Python generators, on await they release the flow of control back to the event loop. A </a:t>
+              <a:t>By using await on another </a:t>
             </a:r>
             <a:r>
               <a:rPr lang="en-US" sz="2800" dirty="0" err="1"/>
@@ -7925,28 +7697,31 @@
             </a:r>
             <a:r>
               <a:rPr lang="en-US" sz="2800" dirty="0"/>
-              <a:t> needs to be scheduled to run on the event loop, once scheduled </a:t>
+              <a:t> we declare that the </a:t>
             </a:r>
             <a:r>
               <a:rPr lang="en-US" sz="2800" dirty="0" err="1"/>
-              <a:t>coroutines</a:t>
+              <a:t>coroutine</a:t>
             </a:r>
             <a:r>
               <a:rPr lang="en-US" sz="2800" dirty="0"/>
-              <a:t> are wrapped in Tasks which is a type of Future.</a:t>
-            </a:r>
-          </a:p>
-          <a:p>
-            <a:pPr marL="457200" indent="-457200">
-              <a:lnSpc>
-                <a:spcPct val="150000"/>
-              </a:lnSpc>
-              <a:buFont typeface="Arial" panose="020B0604020202020204" pitchFamily="34" charset="0"/>
-              <a:buChar char="•"/>
-            </a:pPr>
+              <a:t> may give the control back to the event loop, in this case sleep. The </a:t>
+            </a:r>
+            <a:r>
+              <a:rPr lang="en-US" sz="2800" dirty="0" err="1"/>
+              <a:t>coroutine</a:t>
+            </a:r>
             <a:r>
               <a:rPr lang="en-US" sz="2800" dirty="0"/>
-              <a:t>Futures are objects that represent the result of a task that may or may not have been executed. This result may be an exception.</a:t>
+              <a:t> will yield and the event loop will switch contexts to the next task scheduled for execution: bar. Similarly the bar </a:t>
+            </a:r>
+            <a:r>
+              <a:rPr lang="en-US" sz="2800" dirty="0" err="1"/>
+              <a:t>coroutine</a:t>
+            </a:r>
+            <a:r>
+              <a:rPr lang="en-US" sz="2800" dirty="0"/>
+              <a:t> uses await sleep which allows the event loop to pass control back to foo at the point where it yielded before, just as normal Python generators.</a:t>
             </a:r>
           </a:p>
         </p:txBody>
@@ -7954,7 +7729,7 @@
     </p:spTree>
     <p:extLst>
       <p:ext uri="{BB962C8B-B14F-4D97-AF65-F5344CB8AC3E}">
-        <p14:creationId xmlns:p14="http://schemas.microsoft.com/office/powerpoint/2010/main" val="308581619"/>
+        <p14:creationId xmlns:p14="http://schemas.microsoft.com/office/powerpoint/2010/main" val="3613110455"/>
       </p:ext>
     </p:extLst>
   </p:cSld>

</xml_diff>